<commit_message>
Changed GUI window name, continued presentation.
</commit_message>
<xml_diff>
--- a/docs/presentation/SurgeryRecognitionTool.pptx
+++ b/docs/presentation/SurgeryRecognitionTool.pptx
@@ -5,10 +5,10 @@
     <p:sldMasterId id="2147483648" r:id="rId1"/>
   </p:sldMasterIdLst>
   <p:notesMasterIdLst>
-    <p:notesMasterId r:id="rId13"/>
+    <p:notesMasterId r:id="rId21"/>
   </p:notesMasterIdLst>
   <p:handoutMasterIdLst>
-    <p:handoutMasterId r:id="rId14"/>
+    <p:handoutMasterId r:id="rId22"/>
   </p:handoutMasterIdLst>
   <p:sldIdLst>
     <p:sldId id="256" r:id="rId2"/>
@@ -18,10 +18,18 @@
     <p:sldId id="267" r:id="rId6"/>
     <p:sldId id="262" r:id="rId7"/>
     <p:sldId id="259" r:id="rId8"/>
-    <p:sldId id="257" r:id="rId9"/>
-    <p:sldId id="258" r:id="rId10"/>
+    <p:sldId id="258" r:id="rId9"/>
+    <p:sldId id="257" r:id="rId10"/>
     <p:sldId id="263" r:id="rId11"/>
     <p:sldId id="261" r:id="rId12"/>
+    <p:sldId id="268" r:id="rId13"/>
+    <p:sldId id="269" r:id="rId14"/>
+    <p:sldId id="270" r:id="rId15"/>
+    <p:sldId id="271" r:id="rId16"/>
+    <p:sldId id="272" r:id="rId17"/>
+    <p:sldId id="273" r:id="rId18"/>
+    <p:sldId id="274" r:id="rId19"/>
+    <p:sldId id="276" r:id="rId20"/>
   </p:sldIdLst>
   <p:sldSz cx="9144000" cy="5143500" type="screen16x9"/>
   <p:notesSz cx="6858000" cy="9144000"/>
@@ -1644,6 +1652,84 @@
         </a:p>
       </dgm:t>
     </dgm:pt>
+    <dgm:pt modelId="{63ACACD4-D005-0549-A41E-DC279683A356}">
+      <dgm:prSet phldrT="[Text]"/>
+      <dgm:spPr>
+        <a:ln>
+          <a:solidFill>
+            <a:srgbClr val="A10000"/>
+          </a:solidFill>
+        </a:ln>
+      </dgm:spPr>
+      <dgm:t>
+        <a:bodyPr/>
+        <a:lstStyle/>
+        <a:p>
+          <a:endParaRPr lang="en-GB" dirty="0"/>
+        </a:p>
+      </dgm:t>
+    </dgm:pt>
+    <dgm:pt modelId="{BBD61516-FAF7-6A43-945F-0A3FF479204B}" type="parTrans" cxnId="{A4021CA7-5750-FB4B-80C1-484E247C81E6}">
+      <dgm:prSet/>
+      <dgm:spPr/>
+      <dgm:t>
+        <a:bodyPr/>
+        <a:lstStyle/>
+        <a:p>
+          <a:endParaRPr lang="en-GB"/>
+        </a:p>
+      </dgm:t>
+    </dgm:pt>
+    <dgm:pt modelId="{57B6B6ED-EC1D-A541-8925-34BC3AF9FD58}" type="sibTrans" cxnId="{A4021CA7-5750-FB4B-80C1-484E247C81E6}">
+      <dgm:prSet/>
+      <dgm:spPr/>
+      <dgm:t>
+        <a:bodyPr/>
+        <a:lstStyle/>
+        <a:p>
+          <a:endParaRPr lang="en-GB"/>
+        </a:p>
+      </dgm:t>
+    </dgm:pt>
+    <dgm:pt modelId="{F4EB1CC7-1167-A64E-81C7-B051A5B638A3}">
+      <dgm:prSet phldrT="[Text]"/>
+      <dgm:spPr>
+        <a:ln>
+          <a:solidFill>
+            <a:srgbClr val="A10000"/>
+          </a:solidFill>
+        </a:ln>
+      </dgm:spPr>
+      <dgm:t>
+        <a:bodyPr/>
+        <a:lstStyle/>
+        <a:p>
+          <a:endParaRPr lang="en-GB" dirty="0"/>
+        </a:p>
+      </dgm:t>
+    </dgm:pt>
+    <dgm:pt modelId="{FC7CC929-9C34-B543-97D6-0414B06E2D8E}" type="parTrans" cxnId="{5EEED870-56E6-5147-82AB-D509D2EA6EC4}">
+      <dgm:prSet/>
+      <dgm:spPr/>
+      <dgm:t>
+        <a:bodyPr/>
+        <a:lstStyle/>
+        <a:p>
+          <a:endParaRPr lang="en-GB"/>
+        </a:p>
+      </dgm:t>
+    </dgm:pt>
+    <dgm:pt modelId="{6BE71261-DFAE-C944-BB7F-618EA1095307}" type="sibTrans" cxnId="{5EEED870-56E6-5147-82AB-D509D2EA6EC4}">
+      <dgm:prSet/>
+      <dgm:spPr/>
+      <dgm:t>
+        <a:bodyPr/>
+        <a:lstStyle/>
+        <a:p>
+          <a:endParaRPr lang="en-GB"/>
+        </a:p>
+      </dgm:t>
+    </dgm:pt>
     <dgm:pt modelId="{49C7970E-9111-044B-BC0B-926C58AEC0B7}" type="pres">
       <dgm:prSet presAssocID="{4C705FA1-45EB-7940-9273-F3FA944379BF}" presName="Name0" presStyleCnt="0">
         <dgm:presLayoutVars>
@@ -1829,51 +1915,57 @@
   </dgm:ptLst>
   <dgm:cxnLst>
     <dgm:cxn modelId="{1FBCF102-C4ED-644A-B2CF-DC4A636414E7}" srcId="{CA8DBF4C-A94E-8747-B0E4-575F872F6D76}" destId="{75C76659-C2ED-7F41-815A-65861ECC3246}" srcOrd="0" destOrd="0" parTransId="{8B1A1DBC-482E-554E-BCD3-CBEDCA685371}" sibTransId="{7683843D-3987-A344-8BFB-D43E65573661}"/>
-    <dgm:cxn modelId="{11C6EE03-A2BC-2D45-9BFC-6ABDAD644396}" type="presOf" srcId="{3FA482C1-3611-8D4B-9D28-E3669850CF40}" destId="{6E0B9BC4-476D-8B44-9203-B6AA0152981F}" srcOrd="1" destOrd="1" presId="urn:microsoft.com/office/officeart/2005/8/layout/hProcess4"/>
-    <dgm:cxn modelId="{F849C113-5E19-6849-BA02-D492E14FF5EF}" type="presOf" srcId="{6921D94F-FA6C-5A43-9DA5-5DE84C1DE566}" destId="{F15982F7-08FC-5B42-9828-0DBB2AE9A18C}" srcOrd="0" destOrd="2" presId="urn:microsoft.com/office/officeart/2005/8/layout/hProcess4"/>
+    <dgm:cxn modelId="{11C6EE03-A2BC-2D45-9BFC-6ABDAD644396}" type="presOf" srcId="{3FA482C1-3611-8D4B-9D28-E3669850CF40}" destId="{6E0B9BC4-476D-8B44-9203-B6AA0152981F}" srcOrd="1" destOrd="2" presId="urn:microsoft.com/office/officeart/2005/8/layout/hProcess4"/>
+    <dgm:cxn modelId="{A010F807-49A1-EF49-BC31-D5469C724C3D}" type="presOf" srcId="{63ACACD4-D005-0549-A41E-DC279683A356}" destId="{6E0B9BC4-476D-8B44-9203-B6AA0152981F}" srcOrd="1" destOrd="0" presId="urn:microsoft.com/office/officeart/2005/8/layout/hProcess4"/>
+    <dgm:cxn modelId="{F849C113-5E19-6849-BA02-D492E14FF5EF}" type="presOf" srcId="{6921D94F-FA6C-5A43-9DA5-5DE84C1DE566}" destId="{F15982F7-08FC-5B42-9828-0DBB2AE9A18C}" srcOrd="0" destOrd="3" presId="urn:microsoft.com/office/officeart/2005/8/layout/hProcess4"/>
     <dgm:cxn modelId="{97B9B322-B380-344E-8DD0-383713B5B35E}" srcId="{4C705FA1-45EB-7940-9273-F3FA944379BF}" destId="{CA8DBF4C-A94E-8747-B0E4-575F872F6D76}" srcOrd="3" destOrd="0" parTransId="{5E807CC3-2EC5-3648-8E29-9C908BBD7F40}" sibTransId="{F4D70DA7-4728-E440-8B9F-6F0A7113E5FF}"/>
     <dgm:cxn modelId="{826B6924-BA09-DA4B-A23A-2DD01DCA18F3}" type="presOf" srcId="{6AB8C29E-C821-9441-8D69-D11E60C12379}" destId="{160740E6-5943-DE44-8DD7-41A238F6E3E6}" srcOrd="1" destOrd="0" presId="urn:microsoft.com/office/officeart/2005/8/layout/hProcess4"/>
+    <dgm:cxn modelId="{6AA4ED2A-A193-264F-9EE7-314EAF27BB13}" type="presOf" srcId="{63ACACD4-D005-0549-A41E-DC279683A356}" destId="{6F429DD6-ACBB-4B46-903C-B6A30912498D}" srcOrd="0" destOrd="0" presId="urn:microsoft.com/office/officeart/2005/8/layout/hProcess4"/>
     <dgm:cxn modelId="{1AF41237-F898-444E-8B7A-D9C8B95C6DDE}" type="presOf" srcId="{98EFE217-8A95-7B41-A335-EEC6310D3AC0}" destId="{7723C491-08B3-114D-B60E-A5A695136ADC}" srcOrd="1" destOrd="2" presId="urn:microsoft.com/office/officeart/2005/8/layout/hProcess4"/>
-    <dgm:cxn modelId="{959AD53A-1F40-134D-AAEE-47E6BBB0C542}" type="presOf" srcId="{58798110-E8CF-2B4B-9DD1-795B99788647}" destId="{6E0B9BC4-476D-8B44-9203-B6AA0152981F}" srcOrd="1" destOrd="0" presId="urn:microsoft.com/office/officeart/2005/8/layout/hProcess4"/>
-    <dgm:cxn modelId="{E598793B-12AA-EE4D-BC7D-A11BAF05A48E}" type="presOf" srcId="{8D9CCA83-3F9D-E042-B142-B6402E71D822}" destId="{F15982F7-08FC-5B42-9828-0DBB2AE9A18C}" srcOrd="0" destOrd="1" presId="urn:microsoft.com/office/officeart/2005/8/layout/hProcess4"/>
-    <dgm:cxn modelId="{7069B23D-AF44-7244-B9C9-45F87C6243B7}" type="presOf" srcId="{7803FDA3-AB1C-6249-9CC9-C6079A27ED7F}" destId="{FEF5AD3D-8426-0849-9CBC-6ED869D5F50E}" srcOrd="1" destOrd="0" presId="urn:microsoft.com/office/officeart/2005/8/layout/hProcess4"/>
+    <dgm:cxn modelId="{959AD53A-1F40-134D-AAEE-47E6BBB0C542}" type="presOf" srcId="{58798110-E8CF-2B4B-9DD1-795B99788647}" destId="{6E0B9BC4-476D-8B44-9203-B6AA0152981F}" srcOrd="1" destOrd="1" presId="urn:microsoft.com/office/officeart/2005/8/layout/hProcess4"/>
+    <dgm:cxn modelId="{E598793B-12AA-EE4D-BC7D-A11BAF05A48E}" type="presOf" srcId="{8D9CCA83-3F9D-E042-B142-B6402E71D822}" destId="{F15982F7-08FC-5B42-9828-0DBB2AE9A18C}" srcOrd="0" destOrd="2" presId="urn:microsoft.com/office/officeart/2005/8/layout/hProcess4"/>
+    <dgm:cxn modelId="{7069B23D-AF44-7244-B9C9-45F87C6243B7}" type="presOf" srcId="{7803FDA3-AB1C-6249-9CC9-C6079A27ED7F}" destId="{FEF5AD3D-8426-0849-9CBC-6ED869D5F50E}" srcOrd="1" destOrd="1" presId="urn:microsoft.com/office/officeart/2005/8/layout/hProcess4"/>
+    <dgm:cxn modelId="{4E2D033F-3EE3-E446-9E1C-0E27726AF227}" type="presOf" srcId="{F4EB1CC7-1167-A64E-81C7-B051A5B638A3}" destId="{F15982F7-08FC-5B42-9828-0DBB2AE9A18C}" srcOrd="0" destOrd="0" presId="urn:microsoft.com/office/officeart/2005/8/layout/hProcess4"/>
     <dgm:cxn modelId="{8FF36C44-20EA-C549-A347-0CD38152C6A4}" srcId="{BE092173-DE25-E840-9F5E-FAF6365B4DAA}" destId="{7BFFBDE4-F869-0441-BE19-8EBF1BEE37D6}" srcOrd="1" destOrd="0" parTransId="{A39A3349-1A01-C949-901E-3E27C9A560CD}" sibTransId="{88E0646B-2013-464E-9648-92BEEFC2266E}"/>
-    <dgm:cxn modelId="{C4F0FC47-A40F-B641-9B97-B694B923FA6D}" type="presOf" srcId="{8D9CCA83-3F9D-E042-B142-B6402E71D822}" destId="{FEF5AD3D-8426-0849-9CBC-6ED869D5F50E}" srcOrd="1" destOrd="1" presId="urn:microsoft.com/office/officeart/2005/8/layout/hProcess4"/>
+    <dgm:cxn modelId="{C4F0FC47-A40F-B641-9B97-B694B923FA6D}" type="presOf" srcId="{8D9CCA83-3F9D-E042-B142-B6402E71D822}" destId="{FEF5AD3D-8426-0849-9CBC-6ED869D5F50E}" srcOrd="1" destOrd="2" presId="urn:microsoft.com/office/officeart/2005/8/layout/hProcess4"/>
     <dgm:cxn modelId="{2595A348-4C37-D24E-903E-13423FE54B01}" type="presOf" srcId="{B9BA3439-C1B2-6347-A9DF-23C740900B13}" destId="{7723C491-08B3-114D-B60E-A5A695136ADC}" srcOrd="1" destOrd="1" presId="urn:microsoft.com/office/officeart/2005/8/layout/hProcess4"/>
-    <dgm:cxn modelId="{C34B9250-339A-AB42-AC7F-178FF1C56A6D}" srcId="{00482432-2ED3-7E41-937F-FA20EB00C7EC}" destId="{7C6FD755-BE76-F446-A9B9-27997D8BC77E}" srcOrd="2" destOrd="0" parTransId="{B21ECD86-8472-2E44-B5ED-6AEBE3030787}" sibTransId="{EDEAACDE-8D6A-404D-AC07-142B2A75E6A3}"/>
-    <dgm:cxn modelId="{5933C754-717F-E04A-B4FE-B4259940E352}" type="presOf" srcId="{3FA482C1-3611-8D4B-9D28-E3669850CF40}" destId="{6F429DD6-ACBB-4B46-903C-B6A30912498D}" srcOrd="0" destOrd="1" presId="urn:microsoft.com/office/officeart/2005/8/layout/hProcess4"/>
+    <dgm:cxn modelId="{C34B9250-339A-AB42-AC7F-178FF1C56A6D}" srcId="{00482432-2ED3-7E41-937F-FA20EB00C7EC}" destId="{7C6FD755-BE76-F446-A9B9-27997D8BC77E}" srcOrd="3" destOrd="0" parTransId="{B21ECD86-8472-2E44-B5ED-6AEBE3030787}" sibTransId="{EDEAACDE-8D6A-404D-AC07-142B2A75E6A3}"/>
+    <dgm:cxn modelId="{5933C754-717F-E04A-B4FE-B4259940E352}" type="presOf" srcId="{3FA482C1-3611-8D4B-9D28-E3669850CF40}" destId="{6F429DD6-ACBB-4B46-903C-B6A30912498D}" srcOrd="0" destOrd="2" presId="urn:microsoft.com/office/officeart/2005/8/layout/hProcess4"/>
     <dgm:cxn modelId="{3E7D7655-B68E-1A40-AD39-2EFFB49E3F49}" type="presOf" srcId="{98EFE217-8A95-7B41-A335-EEC6310D3AC0}" destId="{BF6B3C28-AD73-B246-9FB4-9B1CB333178A}" srcOrd="0" destOrd="2" presId="urn:microsoft.com/office/officeart/2005/8/layout/hProcess4"/>
-    <dgm:cxn modelId="{4250835B-B6DE-224B-83EE-9E77D53C4164}" type="presOf" srcId="{7803FDA3-AB1C-6249-9CC9-C6079A27ED7F}" destId="{F15982F7-08FC-5B42-9828-0DBB2AE9A18C}" srcOrd="0" destOrd="0" presId="urn:microsoft.com/office/officeart/2005/8/layout/hProcess4"/>
+    <dgm:cxn modelId="{4250835B-B6DE-224B-83EE-9E77D53C4164}" type="presOf" srcId="{7803FDA3-AB1C-6249-9CC9-C6079A27ED7F}" destId="{F15982F7-08FC-5B42-9828-0DBB2AE9A18C}" srcOrd="0" destOrd="1" presId="urn:microsoft.com/office/officeart/2005/8/layout/hProcess4"/>
     <dgm:cxn modelId="{1A4C4064-3AB5-564C-A502-4285CA5F908D}" type="presOf" srcId="{BE092173-DE25-E840-9F5E-FAF6365B4DAA}" destId="{9F72D2DF-8999-6F41-8711-6B2EB2EC5C31}" srcOrd="0" destOrd="0" presId="urn:microsoft.com/office/officeart/2005/8/layout/hProcess4"/>
     <dgm:cxn modelId="{88DE6668-58FC-B448-8EE8-B19BA63B352F}" srcId="{4C705FA1-45EB-7940-9273-F3FA944379BF}" destId="{B4EE4B88-B864-B54A-BC18-5E688B00DB20}" srcOrd="2" destOrd="0" parTransId="{CEA91DC9-F063-BE4C-A8F5-BF68EB27B04E}" sibTransId="{056F7F34-6B1B-AF44-81AA-3170B9A74E82}"/>
     <dgm:cxn modelId="{88C55C6A-AC50-B943-BCE8-D665FDD5FEA4}" type="presOf" srcId="{7BFFBDE4-F869-0441-BE19-8EBF1BEE37D6}" destId="{160740E6-5943-DE44-8DD7-41A238F6E3E6}" srcOrd="1" destOrd="1" presId="urn:microsoft.com/office/officeart/2005/8/layout/hProcess4"/>
-    <dgm:cxn modelId="{6421AE70-50F0-4444-98B2-290D6C005C46}" type="presOf" srcId="{7C6FD755-BE76-F446-A9B9-27997D8BC77E}" destId="{6F429DD6-ACBB-4B46-903C-B6A30912498D}" srcOrd="0" destOrd="2" presId="urn:microsoft.com/office/officeart/2005/8/layout/hProcess4"/>
-    <dgm:cxn modelId="{BD483E7D-161E-164F-8A9F-240537B38345}" srcId="{00482432-2ED3-7E41-937F-FA20EB00C7EC}" destId="{58798110-E8CF-2B4B-9DD1-795B99788647}" srcOrd="0" destOrd="0" parTransId="{D226A1FA-119B-6D4D-AE02-44CB91525264}" sibTransId="{FDC34271-CA54-B546-8FE0-2CAD339E2B91}"/>
-    <dgm:cxn modelId="{57D82080-3FDF-124D-BE67-9EB8915A347A}" type="presOf" srcId="{58798110-E8CF-2B4B-9DD1-795B99788647}" destId="{6F429DD6-ACBB-4B46-903C-B6A30912498D}" srcOrd="0" destOrd="0" presId="urn:microsoft.com/office/officeart/2005/8/layout/hProcess4"/>
+    <dgm:cxn modelId="{6421AE70-50F0-4444-98B2-290D6C005C46}" type="presOf" srcId="{7C6FD755-BE76-F446-A9B9-27997D8BC77E}" destId="{6F429DD6-ACBB-4B46-903C-B6A30912498D}" srcOrd="0" destOrd="3" presId="urn:microsoft.com/office/officeart/2005/8/layout/hProcess4"/>
+    <dgm:cxn modelId="{5EEED870-56E6-5147-82AB-D509D2EA6EC4}" srcId="{B4EE4B88-B864-B54A-BC18-5E688B00DB20}" destId="{F4EB1CC7-1167-A64E-81C7-B051A5B638A3}" srcOrd="0" destOrd="0" parTransId="{FC7CC929-9C34-B543-97D6-0414B06E2D8E}" sibTransId="{6BE71261-DFAE-C944-BB7F-618EA1095307}"/>
+    <dgm:cxn modelId="{BD483E7D-161E-164F-8A9F-240537B38345}" srcId="{00482432-2ED3-7E41-937F-FA20EB00C7EC}" destId="{58798110-E8CF-2B4B-9DD1-795B99788647}" srcOrd="1" destOrd="0" parTransId="{D226A1FA-119B-6D4D-AE02-44CB91525264}" sibTransId="{FDC34271-CA54-B546-8FE0-2CAD339E2B91}"/>
+    <dgm:cxn modelId="{57D82080-3FDF-124D-BE67-9EB8915A347A}" type="presOf" srcId="{58798110-E8CF-2B4B-9DD1-795B99788647}" destId="{6F429DD6-ACBB-4B46-903C-B6A30912498D}" srcOrd="0" destOrd="1" presId="urn:microsoft.com/office/officeart/2005/8/layout/hProcess4"/>
     <dgm:cxn modelId="{AF5EB381-CBF6-BB4F-A99C-13FEF79FA2E0}" type="presOf" srcId="{056F7F34-6B1B-AF44-81AA-3170B9A74E82}" destId="{80AE8339-76D0-6444-99B2-A4722F9F3EA7}" srcOrd="0" destOrd="0" presId="urn:microsoft.com/office/officeart/2005/8/layout/hProcess4"/>
     <dgm:cxn modelId="{BCCA4C93-FDC0-664C-9FCD-A9331C5FDE08}" type="presOf" srcId="{75C76659-C2ED-7F41-815A-65861ECC3246}" destId="{7723C491-08B3-114D-B60E-A5A695136ADC}" srcOrd="1" destOrd="0" presId="urn:microsoft.com/office/officeart/2005/8/layout/hProcess4"/>
-    <dgm:cxn modelId="{8EC5DB9F-3C77-CC45-AC19-6F4DEFED2C3E}" srcId="{B4EE4B88-B864-B54A-BC18-5E688B00DB20}" destId="{6921D94F-FA6C-5A43-9DA5-5DE84C1DE566}" srcOrd="2" destOrd="0" parTransId="{8CF857CD-907F-BD43-9555-88F870FB95AA}" sibTransId="{41D76859-76A8-FC42-B932-F7DF7C061DAD}"/>
+    <dgm:cxn modelId="{8EC5DB9F-3C77-CC45-AC19-6F4DEFED2C3E}" srcId="{B4EE4B88-B864-B54A-BC18-5E688B00DB20}" destId="{6921D94F-FA6C-5A43-9DA5-5DE84C1DE566}" srcOrd="3" destOrd="0" parTransId="{8CF857CD-907F-BD43-9555-88F870FB95AA}" sibTransId="{41D76859-76A8-FC42-B932-F7DF7C061DAD}"/>
     <dgm:cxn modelId="{4AA0B9A3-DAFE-9D4E-ACC2-17CCA3B486D5}" srcId="{4C705FA1-45EB-7940-9273-F3FA944379BF}" destId="{00482432-2ED3-7E41-937F-FA20EB00C7EC}" srcOrd="0" destOrd="0" parTransId="{BB8A1A15-EDB1-A048-8FF3-98A8CCB27332}" sibTransId="{11CF1A45-8A97-7747-9D85-6811FD1B4A25}"/>
+    <dgm:cxn modelId="{A4021CA7-5750-FB4B-80C1-484E247C81E6}" srcId="{00482432-2ED3-7E41-937F-FA20EB00C7EC}" destId="{63ACACD4-D005-0549-A41E-DC279683A356}" srcOrd="0" destOrd="0" parTransId="{BBD61516-FAF7-6A43-945F-0A3FF479204B}" sibTransId="{57B6B6ED-EC1D-A541-8925-34BC3AF9FD58}"/>
     <dgm:cxn modelId="{2638C0A8-7099-0D49-B9D1-DD69E917C9F9}" type="presOf" srcId="{B9BA3439-C1B2-6347-A9DF-23C740900B13}" destId="{BF6B3C28-AD73-B246-9FB4-9B1CB333178A}" srcOrd="0" destOrd="1" presId="urn:microsoft.com/office/officeart/2005/8/layout/hProcess4"/>
     <dgm:cxn modelId="{DC3679AA-C497-EE43-B152-6AD38F9AF577}" type="presOf" srcId="{00482432-2ED3-7E41-937F-FA20EB00C7EC}" destId="{9C52D241-56B2-C847-8EE5-8CAF49A654F2}" srcOrd="0" destOrd="0" presId="urn:microsoft.com/office/officeart/2005/8/layout/hProcess4"/>
     <dgm:cxn modelId="{891A26AB-F935-554B-9134-6BF1473F3C24}" srcId="{CA8DBF4C-A94E-8747-B0E4-575F872F6D76}" destId="{98EFE217-8A95-7B41-A335-EEC6310D3AC0}" srcOrd="2" destOrd="0" parTransId="{2D5E5CF1-51F7-1240-9E39-DF4B1CCECB5A}" sibTransId="{8AEBEEFB-A4E1-1743-80A0-3EB51CF1660F}"/>
     <dgm:cxn modelId="{E88675AE-DD2C-8046-8F19-88D881BA9BA7}" type="presOf" srcId="{CA8DBF4C-A94E-8747-B0E4-575F872F6D76}" destId="{16867BDF-E13D-EB45-B420-D5FC4AE9AA8C}" srcOrd="0" destOrd="0" presId="urn:microsoft.com/office/officeart/2005/8/layout/hProcess4"/>
     <dgm:cxn modelId="{FDCE49B3-6647-F84F-8203-5B86B35B48AA}" type="presOf" srcId="{6AB8C29E-C821-9441-8D69-D11E60C12379}" destId="{C3FE3A39-D2B1-6D49-8F09-2264CFD849F3}" srcOrd="0" destOrd="0" presId="urn:microsoft.com/office/officeart/2005/8/layout/hProcess4"/>
-    <dgm:cxn modelId="{23E5B7B6-D4B4-CC40-8600-EB83F468CD45}" type="presOf" srcId="{6921D94F-FA6C-5A43-9DA5-5DE84C1DE566}" destId="{FEF5AD3D-8426-0849-9CBC-6ED869D5F50E}" srcOrd="1" destOrd="2" presId="urn:microsoft.com/office/officeart/2005/8/layout/hProcess4"/>
+    <dgm:cxn modelId="{23E5B7B6-D4B4-CC40-8600-EB83F468CD45}" type="presOf" srcId="{6921D94F-FA6C-5A43-9DA5-5DE84C1DE566}" destId="{FEF5AD3D-8426-0849-9CBC-6ED869D5F50E}" srcOrd="1" destOrd="3" presId="urn:microsoft.com/office/officeart/2005/8/layout/hProcess4"/>
     <dgm:cxn modelId="{F502E8BD-5241-C74B-8DA1-5C758E80D6B8}" type="presOf" srcId="{7BFFBDE4-F869-0441-BE19-8EBF1BEE37D6}" destId="{C3FE3A39-D2B1-6D49-8F09-2264CFD849F3}" srcOrd="0" destOrd="1" presId="urn:microsoft.com/office/officeart/2005/8/layout/hProcess4"/>
-    <dgm:cxn modelId="{FBE2D5C3-C80F-C944-9DA2-E7B8CF1EEEB2}" type="presOf" srcId="{7C6FD755-BE76-F446-A9B9-27997D8BC77E}" destId="{6E0B9BC4-476D-8B44-9203-B6AA0152981F}" srcOrd="1" destOrd="2" presId="urn:microsoft.com/office/officeart/2005/8/layout/hProcess4"/>
+    <dgm:cxn modelId="{FBE2D5C3-C80F-C944-9DA2-E7B8CF1EEEB2}" type="presOf" srcId="{7C6FD755-BE76-F446-A9B9-27997D8BC77E}" destId="{6E0B9BC4-476D-8B44-9203-B6AA0152981F}" srcOrd="1" destOrd="3" presId="urn:microsoft.com/office/officeart/2005/8/layout/hProcess4"/>
     <dgm:cxn modelId="{6D6594C5-3D7E-2848-99CB-2A389CFDF44B}" type="presOf" srcId="{B4EE4B88-B864-B54A-BC18-5E688B00DB20}" destId="{F215E689-BBF0-9148-B8DE-5996CFB44A81}" srcOrd="0" destOrd="0" presId="urn:microsoft.com/office/officeart/2005/8/layout/hProcess4"/>
-    <dgm:cxn modelId="{434900C9-2C2F-F04D-B98B-1CF69C36F7EC}" srcId="{B4EE4B88-B864-B54A-BC18-5E688B00DB20}" destId="{8D9CCA83-3F9D-E042-B142-B6402E71D822}" srcOrd="1" destOrd="0" parTransId="{D798EFDA-E5D5-7F4B-9F66-B0CE59C4C8E4}" sibTransId="{9256C1FD-CEFA-7848-BF3F-270FC713230E}"/>
+    <dgm:cxn modelId="{434900C9-2C2F-F04D-B98B-1CF69C36F7EC}" srcId="{B4EE4B88-B864-B54A-BC18-5E688B00DB20}" destId="{8D9CCA83-3F9D-E042-B142-B6402E71D822}" srcOrd="2" destOrd="0" parTransId="{D798EFDA-E5D5-7F4B-9F66-B0CE59C4C8E4}" sibTransId="{9256C1FD-CEFA-7848-BF3F-270FC713230E}"/>
     <dgm:cxn modelId="{00CE89C9-E089-9245-8257-2AB096C9DEBB}" type="presOf" srcId="{307D6957-B8E5-1D4A-9BF8-F7654B59510C}" destId="{160740E6-5943-DE44-8DD7-41A238F6E3E6}" srcOrd="1" destOrd="2" presId="urn:microsoft.com/office/officeart/2005/8/layout/hProcess4"/>
     <dgm:cxn modelId="{0EEF2FCE-912C-8042-88ED-AFBD84ECCEB8}" srcId="{BE092173-DE25-E840-9F5E-FAF6365B4DAA}" destId="{307D6957-B8E5-1D4A-9BF8-F7654B59510C}" srcOrd="2" destOrd="0" parTransId="{9FC46591-615B-5A4A-9AC2-CAE4125BAC0B}" sibTransId="{5602C1B5-1033-B942-8624-E838E0ED7207}"/>
+    <dgm:cxn modelId="{6CCE3BD1-66F0-6746-8B7C-0D373CA3F6A9}" type="presOf" srcId="{F4EB1CC7-1167-A64E-81C7-B051A5B638A3}" destId="{FEF5AD3D-8426-0849-9CBC-6ED869D5F50E}" srcOrd="1" destOrd="0" presId="urn:microsoft.com/office/officeart/2005/8/layout/hProcess4"/>
     <dgm:cxn modelId="{189686D4-8686-E442-B015-996D7E10D125}" srcId="{4C705FA1-45EB-7940-9273-F3FA944379BF}" destId="{BE092173-DE25-E840-9F5E-FAF6365B4DAA}" srcOrd="1" destOrd="0" parTransId="{8D47672C-350C-CA40-B3BB-36EE8D483869}" sibTransId="{40D848DC-7DDE-6840-B08A-EB0CF39E5D4D}"/>
-    <dgm:cxn modelId="{D8A921D9-59A4-8840-9175-84606B7B42C9}" srcId="{00482432-2ED3-7E41-937F-FA20EB00C7EC}" destId="{3FA482C1-3611-8D4B-9D28-E3669850CF40}" srcOrd="1" destOrd="0" parTransId="{ABA028C2-F360-124D-985F-B29FF52D0101}" sibTransId="{E7142B34-177A-D34E-8788-EB75EA38B32C}"/>
+    <dgm:cxn modelId="{D8A921D9-59A4-8840-9175-84606B7B42C9}" srcId="{00482432-2ED3-7E41-937F-FA20EB00C7EC}" destId="{3FA482C1-3611-8D4B-9D28-E3669850CF40}" srcOrd="2" destOrd="0" parTransId="{ABA028C2-F360-124D-985F-B29FF52D0101}" sibTransId="{E7142B34-177A-D34E-8788-EB75EA38B32C}"/>
     <dgm:cxn modelId="{05C521D9-4529-CA4B-A8ED-7072F985A875}" type="presOf" srcId="{4C705FA1-45EB-7940-9273-F3FA944379BF}" destId="{49C7970E-9111-044B-BC0B-926C58AEC0B7}" srcOrd="0" destOrd="0" presId="urn:microsoft.com/office/officeart/2005/8/layout/hProcess4"/>
     <dgm:cxn modelId="{967CF4E1-6AFC-8944-BD41-D391F556340B}" srcId="{BE092173-DE25-E840-9F5E-FAF6365B4DAA}" destId="{6AB8C29E-C821-9441-8D69-D11E60C12379}" srcOrd="0" destOrd="0" parTransId="{A09D5D75-CE9F-6546-9A2F-90822D9A9857}" sibTransId="{C6273B36-6126-3B4C-812C-CD92D30608C8}"/>
     <dgm:cxn modelId="{049A0DE3-9C1C-BE41-8658-016A92A228A8}" srcId="{CA8DBF4C-A94E-8747-B0E4-575F872F6D76}" destId="{B9BA3439-C1B2-6347-A9DF-23C740900B13}" srcOrd="1" destOrd="0" parTransId="{BF5A707C-C51A-5747-90B3-BD1815B2EDCB}" sibTransId="{70C07C2D-50A2-4645-A049-B6FEF78868F7}"/>
     <dgm:cxn modelId="{0E4389E6-595C-3943-BFF9-9A13C6E713B6}" type="presOf" srcId="{307D6957-B8E5-1D4A-9BF8-F7654B59510C}" destId="{C3FE3A39-D2B1-6D49-8F09-2264CFD849F3}" srcOrd="0" destOrd="2" presId="urn:microsoft.com/office/officeart/2005/8/layout/hProcess4"/>
     <dgm:cxn modelId="{1FD9FCE7-F6AB-5F43-AF2D-D5957688C7F5}" type="presOf" srcId="{75C76659-C2ED-7F41-815A-65861ECC3246}" destId="{BF6B3C28-AD73-B246-9FB4-9B1CB333178A}" srcOrd="0" destOrd="0" presId="urn:microsoft.com/office/officeart/2005/8/layout/hProcess4"/>
-    <dgm:cxn modelId="{B9D7B8F3-4C5E-164F-8E8F-C251FCA85385}" srcId="{B4EE4B88-B864-B54A-BC18-5E688B00DB20}" destId="{7803FDA3-AB1C-6249-9CC9-C6079A27ED7F}" srcOrd="0" destOrd="0" parTransId="{6E9F02F9-D9B8-6646-8F76-CBB61069FB95}" sibTransId="{41E9E420-EF10-2E4F-9958-925E73372874}"/>
+    <dgm:cxn modelId="{B9D7B8F3-4C5E-164F-8E8F-C251FCA85385}" srcId="{B4EE4B88-B864-B54A-BC18-5E688B00DB20}" destId="{7803FDA3-AB1C-6249-9CC9-C6079A27ED7F}" srcOrd="1" destOrd="0" parTransId="{6E9F02F9-D9B8-6646-8F76-CBB61069FB95}" sibTransId="{41E9E420-EF10-2E4F-9958-925E73372874}"/>
     <dgm:cxn modelId="{46DEBFF5-B447-334C-80D2-82D8BA3C9D63}" type="presOf" srcId="{11CF1A45-8A97-7747-9D85-6811FD1B4A25}" destId="{F9D39D65-CD0D-A34D-AA7B-F43B535DCAF6}" srcOrd="0" destOrd="0" presId="urn:microsoft.com/office/officeart/2005/8/layout/hProcess4"/>
     <dgm:cxn modelId="{DF5F0CF7-CA43-C745-B682-A048C5F8060F}" type="presOf" srcId="{40D848DC-7DDE-6840-B08A-EB0CF39E5D4D}" destId="{5D50D682-E537-CB47-8453-87EFF522EF29}" srcOrd="0" destOrd="0" presId="urn:microsoft.com/office/officeart/2005/8/layout/hProcess4"/>
     <dgm:cxn modelId="{B4ECA4D4-40DB-494B-B8F4-8BC7C6A98EA7}" type="presParOf" srcId="{49C7970E-9111-044B-BC0B-926C58AEC0B7}" destId="{B59ADF40-DE97-8A40-95D1-C98734DEB221}" srcOrd="0" destOrd="0" presId="urn:microsoft.com/office/officeart/2005/8/layout/hProcess4"/>
@@ -1974,6 +2066,21 @@
           <a:noAutofit/>
         </a:bodyPr>
         <a:lstStyle/>
+        <a:p>
+          <a:pPr marL="57150" lvl="1" indent="-57150" algn="l" defTabSz="444500">
+            <a:lnSpc>
+              <a:spcPct val="90000"/>
+            </a:lnSpc>
+            <a:spcBef>
+              <a:spcPct val="0"/>
+            </a:spcBef>
+            <a:spcAft>
+              <a:spcPct val="15000"/>
+            </a:spcAft>
+            <a:buChar char="•"/>
+          </a:pPr>
+          <a:endParaRPr lang="en-GB" sz="1000" kern="1200" dirty="0"/>
+        </a:p>
         <a:p>
           <a:pPr marL="57150" lvl="1" indent="-57150" algn="l" defTabSz="444500">
             <a:lnSpc>
@@ -2437,6 +2544,21 @@
           <a:noAutofit/>
         </a:bodyPr>
         <a:lstStyle/>
+        <a:p>
+          <a:pPr marL="57150" lvl="1" indent="-57150" algn="l" defTabSz="444500">
+            <a:lnSpc>
+              <a:spcPct val="90000"/>
+            </a:lnSpc>
+            <a:spcBef>
+              <a:spcPct val="0"/>
+            </a:spcBef>
+            <a:spcAft>
+              <a:spcPct val="15000"/>
+            </a:spcAft>
+            <a:buChar char="•"/>
+          </a:pPr>
+          <a:endParaRPr lang="en-GB" sz="1000" kern="1200" dirty="0"/>
+        </a:p>
         <a:p>
           <a:pPr marL="57150" lvl="1" indent="-57150" algn="l" defTabSz="444500">
             <a:lnSpc>
@@ -4520,7 +4642,7 @@
               <a:pPr>
                 <a:defRPr/>
               </a:pPr>
-              <a:t>7. Februar 2021</a:t>
+              <a:t>10. Februar 2021</a:t>
             </a:fld>
             <a:endParaRPr lang="de-DE"/>
           </a:p>
@@ -5149,7 +5271,7 @@
               <a:pPr>
                 <a:defRPr/>
               </a:pPr>
-              <a:t>7. Februar 2021</a:t>
+              <a:t>10. Februar 2021</a:t>
             </a:fld>
             <a:endParaRPr lang="de-DE"/>
           </a:p>
@@ -6023,6 +6145,149 @@
     </a:lvl9pPr>
   </p:notesStyle>
 </p:notesMaster>
+</file>
+
+<file path=ppt/notesSlides/notesSlide1.xml><?xml version="1.0" encoding="utf-8"?>
+<p:notes xmlns:a="http://schemas.openxmlformats.org/drawingml/2006/main" xmlns:r="http://schemas.openxmlformats.org/officeDocument/2006/relationships" xmlns:p="http://schemas.openxmlformats.org/presentationml/2006/main">
+  <p:cSld>
+    <p:spTree>
+      <p:nvGrpSpPr>
+        <p:cNvPr id="1" name=""/>
+        <p:cNvGrpSpPr/>
+        <p:nvPr/>
+      </p:nvGrpSpPr>
+      <p:grpSpPr>
+        <a:xfrm>
+          <a:off x="0" y="0"/>
+          <a:ext cx="0" cy="0"/>
+          <a:chOff x="0" y="0"/>
+          <a:chExt cx="0" cy="0"/>
+        </a:xfrm>
+      </p:grpSpPr>
+      <p:sp>
+        <p:nvSpPr>
+          <p:cNvPr id="2" name="Slide Image Placeholder 1"/>
+          <p:cNvSpPr>
+            <a:spLocks noGrp="1" noRot="1" noChangeAspect="1"/>
+          </p:cNvSpPr>
+          <p:nvPr>
+            <p:ph type="sldImg"/>
+          </p:nvPr>
+        </p:nvSpPr>
+        <p:spPr/>
+      </p:sp>
+      <p:sp>
+        <p:nvSpPr>
+          <p:cNvPr id="3" name="Notes Placeholder 2"/>
+          <p:cNvSpPr>
+            <a:spLocks noGrp="1"/>
+          </p:cNvSpPr>
+          <p:nvPr>
+            <p:ph type="body" idx="1"/>
+          </p:nvPr>
+        </p:nvSpPr>
+        <p:spPr/>
+        <p:txBody>
+          <a:bodyPr/>
+          <a:lstStyle/>
+          <a:p>
+            <a:endParaRPr lang="en-DE" dirty="0"/>
+          </a:p>
+        </p:txBody>
+      </p:sp>
+      <p:sp>
+        <p:nvSpPr>
+          <p:cNvPr id="4" name="Date Placeholder 3"/>
+          <p:cNvSpPr>
+            <a:spLocks noGrp="1"/>
+          </p:cNvSpPr>
+          <p:nvPr>
+            <p:ph type="dt" idx="1"/>
+          </p:nvPr>
+        </p:nvSpPr>
+        <p:spPr/>
+        <p:txBody>
+          <a:bodyPr/>
+          <a:lstStyle/>
+          <a:p>
+            <a:pPr>
+              <a:defRPr/>
+            </a:pPr>
+            <a:fld id="{457AE8EF-E871-46D0-AD98-1F6D460EB5F2}" type="datetime4">
+              <a:rPr lang="de-DE" smtClean="0"/>
+              <a:pPr>
+                <a:defRPr/>
+              </a:pPr>
+              <a:t>10. Februar 2021</a:t>
+            </a:fld>
+            <a:endParaRPr lang="de-DE"/>
+          </a:p>
+        </p:txBody>
+      </p:sp>
+      <p:sp>
+        <p:nvSpPr>
+          <p:cNvPr id="5" name="Footer Placeholder 4"/>
+          <p:cNvSpPr>
+            <a:spLocks noGrp="1"/>
+          </p:cNvSpPr>
+          <p:nvPr>
+            <p:ph type="ftr" sz="quarter" idx="4"/>
+          </p:nvPr>
+        </p:nvSpPr>
+        <p:spPr/>
+        <p:txBody>
+          <a:bodyPr/>
+          <a:lstStyle/>
+          <a:p>
+            <a:pPr>
+              <a:defRPr/>
+            </a:pPr>
+            <a:r>
+              <a:rPr lang="de-DE"/>
+              <a:t>|  </a:t>
+            </a:r>
+          </a:p>
+        </p:txBody>
+      </p:sp>
+      <p:sp>
+        <p:nvSpPr>
+          <p:cNvPr id="6" name="Slide Number Placeholder 5"/>
+          <p:cNvSpPr>
+            <a:spLocks noGrp="1"/>
+          </p:cNvSpPr>
+          <p:nvPr>
+            <p:ph type="sldNum" sz="quarter" idx="5"/>
+          </p:nvPr>
+        </p:nvSpPr>
+        <p:spPr/>
+        <p:txBody>
+          <a:bodyPr/>
+          <a:lstStyle/>
+          <a:p>
+            <a:r>
+              <a:rPr lang="de-DE" altLang="de-DE"/>
+              <a:t>|  </a:t>
+            </a:r>
+            <a:fld id="{E526A819-9FA5-480B-AA80-B0EE2CE4290D}" type="slidenum">
+              <a:rPr lang="de-DE" altLang="de-DE" smtClean="0"/>
+              <a:pPr/>
+              <a:t>7</a:t>
+            </a:fld>
+            <a:endParaRPr lang="de-DE" altLang="de-DE"/>
+          </a:p>
+        </p:txBody>
+      </p:sp>
+    </p:spTree>
+    <p:extLst>
+      <p:ext uri="{BB962C8B-B14F-4D97-AF65-F5344CB8AC3E}">
+        <p14:creationId xmlns:p14="http://schemas.microsoft.com/office/powerpoint/2010/main" val="4218010409"/>
+      </p:ext>
+    </p:extLst>
+  </p:cSld>
+  <p:clrMapOvr>
+    <a:masterClrMapping/>
+  </p:clrMapOvr>
+</p:notes>
 </file>
 
 <file path=ppt/slideLayouts/slideLayout1.xml><?xml version="1.0" encoding="utf-8"?>
@@ -8641,7 +8906,7 @@
                 <a:cs typeface="Tahoma" panose="020B0604030504040204" pitchFamily="34" charset="0"/>
               </a:rPr>
               <a:pPr eaLnBrk="1" hangingPunct="1"/>
-              <a:t>07.02.21</a:t>
+              <a:t>10.02.21</a:t>
             </a:fld>
             <a:r>
               <a:rPr lang="de-DE" altLang="de-DE" sz="1000" dirty="0">
@@ -9572,6 +9837,1310 @@
 </p:sld>
 </file>
 
+<file path=ppt/slides/slide12.xml><?xml version="1.0" encoding="utf-8"?>
+<p:sld xmlns:a="http://schemas.openxmlformats.org/drawingml/2006/main" xmlns:r="http://schemas.openxmlformats.org/officeDocument/2006/relationships" xmlns:p="http://schemas.openxmlformats.org/presentationml/2006/main">
+  <p:cSld>
+    <p:spTree>
+      <p:nvGrpSpPr>
+        <p:cNvPr id="1" name=""/>
+        <p:cNvGrpSpPr/>
+        <p:nvPr/>
+      </p:nvGrpSpPr>
+      <p:grpSpPr>
+        <a:xfrm>
+          <a:off x="0" y="0"/>
+          <a:ext cx="0" cy="0"/>
+          <a:chOff x="0" y="0"/>
+          <a:chExt cx="0" cy="0"/>
+        </a:xfrm>
+      </p:grpSpPr>
+      <p:sp>
+        <p:nvSpPr>
+          <p:cNvPr id="2" name="Title 1">
+            <a:extLst>
+              <a:ext uri="{FF2B5EF4-FFF2-40B4-BE49-F238E27FC236}">
+                <a16:creationId xmlns:a16="http://schemas.microsoft.com/office/drawing/2014/main" id="{05F1E304-987A-524A-AD6E-CF09A0BFAD55}"/>
+              </a:ext>
+            </a:extLst>
+          </p:cNvPr>
+          <p:cNvSpPr>
+            <a:spLocks noGrp="1"/>
+          </p:cNvSpPr>
+          <p:nvPr>
+            <p:ph type="title"/>
+          </p:nvPr>
+        </p:nvSpPr>
+        <p:spPr/>
+        <p:txBody>
+          <a:bodyPr/>
+          <a:lstStyle/>
+          <a:p>
+            <a:r>
+              <a:rPr lang="en-DE" dirty="0"/>
+              <a:t>Graphical User Interface: </a:t>
+            </a:r>
+            <a:r>
+              <a:rPr lang="en-GB" dirty="0" err="1"/>
+              <a:t>WelcomeWindow</a:t>
+            </a:r>
+            <a:endParaRPr lang="en-DE" dirty="0"/>
+          </a:p>
+        </p:txBody>
+      </p:sp>
+      <p:pic>
+        <p:nvPicPr>
+          <p:cNvPr id="11" name="Content Placeholder 10">
+            <a:extLst>
+              <a:ext uri="{FF2B5EF4-FFF2-40B4-BE49-F238E27FC236}">
+                <a16:creationId xmlns:a16="http://schemas.microsoft.com/office/drawing/2014/main" id="{8CE9149F-FB83-A544-BDC5-71CB19F5837B}"/>
+              </a:ext>
+            </a:extLst>
+          </p:cNvPr>
+          <p:cNvPicPr>
+            <a:picLocks noGrp="1" noChangeAspect="1"/>
+          </p:cNvPicPr>
+          <p:nvPr>
+            <p:ph sz="half" idx="10"/>
+          </p:nvPr>
+        </p:nvPicPr>
+        <p:blipFill>
+          <a:blip r:embed="rId2">
+            <a:extLst>
+              <a:ext uri="{28A0092B-C50C-407E-A947-70E740481C1C}">
+                <a14:useLocalDpi xmlns:a14="http://schemas.microsoft.com/office/drawing/2010/main" val="0"/>
+              </a:ext>
+            </a:extLst>
+          </a:blip>
+          <a:stretch>
+            <a:fillRect/>
+          </a:stretch>
+        </p:blipFill>
+        <p:spPr>
+          <a:xfrm>
+            <a:off x="2421731" y="1417439"/>
+            <a:ext cx="4300538" cy="2967435"/>
+          </a:xfrm>
+          <a:noFill/>
+          <a:ln>
+            <a:noFill/>
+          </a:ln>
+          <a:extLst>
+            <a:ext uri="{909E8E84-426E-40DD-AFC4-6F175D3DCCD1}">
+              <a14:hiddenFill xmlns:a14="http://schemas.microsoft.com/office/drawing/2010/main">
+                <a:solidFill>
+                  <a:srgbClr val="FFFFFF"/>
+                </a:solidFill>
+              </a14:hiddenFill>
+            </a:ext>
+            <a:ext uri="{91240B29-F687-4F45-9708-019B960494DF}">
+              <a14:hiddenLine xmlns:a14="http://schemas.microsoft.com/office/drawing/2010/main" w="9525">
+                <a:solidFill>
+                  <a:srgbClr val="000000"/>
+                </a:solidFill>
+                <a:miter lim="800000"/>
+                <a:headEnd/>
+                <a:tailEnd/>
+              </a14:hiddenLine>
+            </a:ext>
+          </a:extLst>
+        </p:spPr>
+      </p:pic>
+    </p:spTree>
+    <p:extLst>
+      <p:ext uri="{BB962C8B-B14F-4D97-AF65-F5344CB8AC3E}">
+        <p14:creationId xmlns:p14="http://schemas.microsoft.com/office/powerpoint/2010/main" val="1607356138"/>
+      </p:ext>
+    </p:extLst>
+  </p:cSld>
+  <p:clrMapOvr>
+    <a:masterClrMapping/>
+  </p:clrMapOvr>
+</p:sld>
+</file>
+
+<file path=ppt/slides/slide13.xml><?xml version="1.0" encoding="utf-8"?>
+<p:sld xmlns:a="http://schemas.openxmlformats.org/drawingml/2006/main" xmlns:r="http://schemas.openxmlformats.org/officeDocument/2006/relationships" xmlns:p="http://schemas.openxmlformats.org/presentationml/2006/main">
+  <p:cSld>
+    <p:spTree>
+      <p:nvGrpSpPr>
+        <p:cNvPr id="1" name=""/>
+        <p:cNvGrpSpPr/>
+        <p:nvPr/>
+      </p:nvGrpSpPr>
+      <p:grpSpPr>
+        <a:xfrm>
+          <a:off x="0" y="0"/>
+          <a:ext cx="0" cy="0"/>
+          <a:chOff x="0" y="0"/>
+          <a:chExt cx="0" cy="0"/>
+        </a:xfrm>
+      </p:grpSpPr>
+      <p:sp>
+        <p:nvSpPr>
+          <p:cNvPr id="2" name="Title 1">
+            <a:extLst>
+              <a:ext uri="{FF2B5EF4-FFF2-40B4-BE49-F238E27FC236}">
+                <a16:creationId xmlns:a16="http://schemas.microsoft.com/office/drawing/2014/main" id="{05F1E304-987A-524A-AD6E-CF09A0BFAD55}"/>
+              </a:ext>
+            </a:extLst>
+          </p:cNvPr>
+          <p:cNvSpPr>
+            <a:spLocks noGrp="1"/>
+          </p:cNvSpPr>
+          <p:nvPr>
+            <p:ph type="title"/>
+          </p:nvPr>
+        </p:nvSpPr>
+        <p:spPr/>
+        <p:txBody>
+          <a:bodyPr/>
+          <a:lstStyle/>
+          <a:p>
+            <a:r>
+              <a:rPr lang="en-DE" dirty="0"/>
+              <a:t>Graphical User Interface: </a:t>
+            </a:r>
+            <a:r>
+              <a:rPr lang="en-GB" dirty="0" err="1"/>
+              <a:t>StartWindow</a:t>
+            </a:r>
+            <a:endParaRPr lang="en-DE" dirty="0"/>
+          </a:p>
+        </p:txBody>
+      </p:sp>
+      <p:pic>
+        <p:nvPicPr>
+          <p:cNvPr id="5" name="Content Placeholder 4">
+            <a:extLst>
+              <a:ext uri="{FF2B5EF4-FFF2-40B4-BE49-F238E27FC236}">
+                <a16:creationId xmlns:a16="http://schemas.microsoft.com/office/drawing/2014/main" id="{809F9A18-368D-C44F-902D-9F597C77E6B4}"/>
+              </a:ext>
+            </a:extLst>
+          </p:cNvPr>
+          <p:cNvPicPr>
+            <a:picLocks noGrp="1" noChangeAspect="1"/>
+          </p:cNvPicPr>
+          <p:nvPr>
+            <p:ph sz="half" idx="10"/>
+          </p:nvPr>
+        </p:nvPicPr>
+        <p:blipFill>
+          <a:blip r:embed="rId2">
+            <a:extLst>
+              <a:ext uri="{28A0092B-C50C-407E-A947-70E740481C1C}">
+                <a14:useLocalDpi xmlns:a14="http://schemas.microsoft.com/office/drawing/2010/main" val="0"/>
+              </a:ext>
+            </a:extLst>
+          </a:blip>
+          <a:stretch>
+            <a:fillRect/>
+          </a:stretch>
+        </p:blipFill>
+        <p:spPr>
+          <a:xfrm>
+            <a:off x="2421731" y="2160950"/>
+            <a:ext cx="4300538" cy="1480412"/>
+          </a:xfrm>
+        </p:spPr>
+      </p:pic>
+      <p:sp>
+        <p:nvSpPr>
+          <p:cNvPr id="6" name="TextBox 5">
+            <a:extLst>
+              <a:ext uri="{FF2B5EF4-FFF2-40B4-BE49-F238E27FC236}">
+                <a16:creationId xmlns:a16="http://schemas.microsoft.com/office/drawing/2014/main" id="{06936E78-D8E1-0447-9271-EA7F6776295D}"/>
+              </a:ext>
+            </a:extLst>
+          </p:cNvPr>
+          <p:cNvSpPr txBox="1"/>
+          <p:nvPr/>
+        </p:nvSpPr>
+        <p:spPr>
+          <a:xfrm>
+            <a:off x="1033210" y="1393490"/>
+            <a:ext cx="7077579" cy="369332"/>
+          </a:xfrm>
+          <a:prstGeom prst="rect">
+            <a:avLst/>
+          </a:prstGeom>
+          <a:noFill/>
+        </p:spPr>
+        <p:txBody>
+          <a:bodyPr wrap="none" rtlCol="0">
+            <a:spAutoFit/>
+          </a:bodyPr>
+          <a:lstStyle/>
+          <a:p>
+            <a:pPr marL="285750" indent="-285750">
+              <a:buFont typeface="Arial" panose="020B0604020202020204" pitchFamily="34" charset="0"/>
+              <a:buChar char="•"/>
+            </a:pPr>
+            <a:r>
+              <a:rPr lang="en-DE" dirty="0"/>
+              <a:t>User needs to specify path to desired video he/she wants to use </a:t>
+            </a:r>
+          </a:p>
+        </p:txBody>
+      </p:sp>
+    </p:spTree>
+    <p:extLst>
+      <p:ext uri="{BB962C8B-B14F-4D97-AF65-F5344CB8AC3E}">
+        <p14:creationId xmlns:p14="http://schemas.microsoft.com/office/powerpoint/2010/main" val="2281355345"/>
+      </p:ext>
+    </p:extLst>
+  </p:cSld>
+  <p:clrMapOvr>
+    <a:masterClrMapping/>
+  </p:clrMapOvr>
+</p:sld>
+</file>
+
+<file path=ppt/slides/slide14.xml><?xml version="1.0" encoding="utf-8"?>
+<p:sld xmlns:a="http://schemas.openxmlformats.org/drawingml/2006/main" xmlns:r="http://schemas.openxmlformats.org/officeDocument/2006/relationships" xmlns:p="http://schemas.openxmlformats.org/presentationml/2006/main">
+  <p:cSld>
+    <p:spTree>
+      <p:nvGrpSpPr>
+        <p:cNvPr id="1" name=""/>
+        <p:cNvGrpSpPr/>
+        <p:nvPr/>
+      </p:nvGrpSpPr>
+      <p:grpSpPr>
+        <a:xfrm>
+          <a:off x="0" y="0"/>
+          <a:ext cx="0" cy="0"/>
+          <a:chOff x="0" y="0"/>
+          <a:chExt cx="0" cy="0"/>
+        </a:xfrm>
+      </p:grpSpPr>
+      <p:sp>
+        <p:nvSpPr>
+          <p:cNvPr id="2" name="Title 1">
+            <a:extLst>
+              <a:ext uri="{FF2B5EF4-FFF2-40B4-BE49-F238E27FC236}">
+                <a16:creationId xmlns:a16="http://schemas.microsoft.com/office/drawing/2014/main" id="{05F1E304-987A-524A-AD6E-CF09A0BFAD55}"/>
+              </a:ext>
+            </a:extLst>
+          </p:cNvPr>
+          <p:cNvSpPr>
+            <a:spLocks noGrp="1"/>
+          </p:cNvSpPr>
+          <p:nvPr>
+            <p:ph type="title"/>
+          </p:nvPr>
+        </p:nvSpPr>
+        <p:spPr/>
+        <p:txBody>
+          <a:bodyPr/>
+          <a:lstStyle/>
+          <a:p>
+            <a:r>
+              <a:rPr lang="en-DE" dirty="0"/>
+              <a:t>Graphical User Interface: </a:t>
+            </a:r>
+            <a:r>
+              <a:rPr lang="en-GB" dirty="0" err="1"/>
+              <a:t>ConfirmationPopUp</a:t>
+            </a:r>
+            <a:endParaRPr lang="en-DE" dirty="0"/>
+          </a:p>
+        </p:txBody>
+      </p:sp>
+      <p:pic>
+        <p:nvPicPr>
+          <p:cNvPr id="5" name="Content Placeholder 4">
+            <a:extLst>
+              <a:ext uri="{FF2B5EF4-FFF2-40B4-BE49-F238E27FC236}">
+                <a16:creationId xmlns:a16="http://schemas.microsoft.com/office/drawing/2014/main" id="{7855036F-CF33-8B42-BB3C-372A05CDF13C}"/>
+              </a:ext>
+            </a:extLst>
+          </p:cNvPr>
+          <p:cNvPicPr>
+            <a:picLocks noGrp="1" noChangeAspect="1"/>
+          </p:cNvPicPr>
+          <p:nvPr>
+            <p:ph sz="half" idx="10"/>
+          </p:nvPr>
+        </p:nvPicPr>
+        <p:blipFill>
+          <a:blip r:embed="rId2">
+            <a:extLst>
+              <a:ext uri="{28A0092B-C50C-407E-A947-70E740481C1C}">
+                <a14:useLocalDpi xmlns:a14="http://schemas.microsoft.com/office/drawing/2010/main" val="0"/>
+              </a:ext>
+            </a:extLst>
+          </a:blip>
+          <a:stretch>
+            <a:fillRect/>
+          </a:stretch>
+        </p:blipFill>
+        <p:spPr>
+          <a:xfrm>
+            <a:off x="2421731" y="1917700"/>
+            <a:ext cx="4300538" cy="1966912"/>
+          </a:xfrm>
+        </p:spPr>
+      </p:pic>
+    </p:spTree>
+    <p:extLst>
+      <p:ext uri="{BB962C8B-B14F-4D97-AF65-F5344CB8AC3E}">
+        <p14:creationId xmlns:p14="http://schemas.microsoft.com/office/powerpoint/2010/main" val="1468724249"/>
+      </p:ext>
+    </p:extLst>
+  </p:cSld>
+  <p:clrMapOvr>
+    <a:masterClrMapping/>
+  </p:clrMapOvr>
+</p:sld>
+</file>
+
+<file path=ppt/slides/slide15.xml><?xml version="1.0" encoding="utf-8"?>
+<p:sld xmlns:a="http://schemas.openxmlformats.org/drawingml/2006/main" xmlns:r="http://schemas.openxmlformats.org/officeDocument/2006/relationships" xmlns:p="http://schemas.openxmlformats.org/presentationml/2006/main">
+  <p:cSld>
+    <p:spTree>
+      <p:nvGrpSpPr>
+        <p:cNvPr id="1" name=""/>
+        <p:cNvGrpSpPr/>
+        <p:nvPr/>
+      </p:nvGrpSpPr>
+      <p:grpSpPr>
+        <a:xfrm>
+          <a:off x="0" y="0"/>
+          <a:ext cx="0" cy="0"/>
+          <a:chOff x="0" y="0"/>
+          <a:chExt cx="0" cy="0"/>
+        </a:xfrm>
+      </p:grpSpPr>
+      <p:sp>
+        <p:nvSpPr>
+          <p:cNvPr id="2" name="Title 1">
+            <a:extLst>
+              <a:ext uri="{FF2B5EF4-FFF2-40B4-BE49-F238E27FC236}">
+                <a16:creationId xmlns:a16="http://schemas.microsoft.com/office/drawing/2014/main" id="{05F1E304-987A-524A-AD6E-CF09A0BFAD55}"/>
+              </a:ext>
+            </a:extLst>
+          </p:cNvPr>
+          <p:cNvSpPr>
+            <a:spLocks noGrp="1"/>
+          </p:cNvSpPr>
+          <p:nvPr>
+            <p:ph type="title"/>
+          </p:nvPr>
+        </p:nvSpPr>
+        <p:spPr/>
+        <p:txBody>
+          <a:bodyPr/>
+          <a:lstStyle/>
+          <a:p>
+            <a:r>
+              <a:rPr lang="en-DE" dirty="0"/>
+              <a:t>Graphical User Interface: </a:t>
+            </a:r>
+            <a:r>
+              <a:rPr lang="en-GB" dirty="0" err="1"/>
+              <a:t>TransformVideo</a:t>
+            </a:r>
+            <a:endParaRPr lang="en-DE" dirty="0"/>
+          </a:p>
+        </p:txBody>
+      </p:sp>
+      <p:pic>
+        <p:nvPicPr>
+          <p:cNvPr id="7" name="Content Placeholder 6">
+            <a:extLst>
+              <a:ext uri="{FF2B5EF4-FFF2-40B4-BE49-F238E27FC236}">
+                <a16:creationId xmlns:a16="http://schemas.microsoft.com/office/drawing/2014/main" id="{DA789B8C-1AEF-964E-9C62-279FFA15FD1A}"/>
+              </a:ext>
+            </a:extLst>
+          </p:cNvPr>
+          <p:cNvPicPr>
+            <a:picLocks noGrp="1" noChangeAspect="1"/>
+          </p:cNvPicPr>
+          <p:nvPr>
+            <p:ph sz="half" idx="10"/>
+          </p:nvPr>
+        </p:nvPicPr>
+        <p:blipFill>
+          <a:blip r:embed="rId2">
+            <a:extLst>
+              <a:ext uri="{28A0092B-C50C-407E-A947-70E740481C1C}">
+                <a14:useLocalDpi xmlns:a14="http://schemas.microsoft.com/office/drawing/2010/main" val="0"/>
+              </a:ext>
+            </a:extLst>
+          </a:blip>
+          <a:stretch>
+            <a:fillRect/>
+          </a:stretch>
+        </p:blipFill>
+        <p:spPr>
+          <a:xfrm>
+            <a:off x="180974" y="1731089"/>
+            <a:ext cx="4302000" cy="2358396"/>
+          </a:xfrm>
+        </p:spPr>
+      </p:pic>
+      <p:pic>
+        <p:nvPicPr>
+          <p:cNvPr id="13" name="Picture 12">
+            <a:extLst>
+              <a:ext uri="{FF2B5EF4-FFF2-40B4-BE49-F238E27FC236}">
+                <a16:creationId xmlns:a16="http://schemas.microsoft.com/office/drawing/2014/main" id="{E682320B-262D-3E41-AF60-4B33EBBABBE4}"/>
+              </a:ext>
+            </a:extLst>
+          </p:cNvPr>
+          <p:cNvPicPr>
+            <a:picLocks noChangeAspect="1"/>
+          </p:cNvPicPr>
+          <p:nvPr/>
+        </p:nvPicPr>
+        <p:blipFill>
+          <a:blip r:embed="rId3">
+            <a:extLst>
+              <a:ext uri="{28A0092B-C50C-407E-A947-70E740481C1C}">
+                <a14:useLocalDpi xmlns:a14="http://schemas.microsoft.com/office/drawing/2010/main" val="0"/>
+              </a:ext>
+            </a:extLst>
+          </a:blip>
+          <a:stretch>
+            <a:fillRect/>
+          </a:stretch>
+        </p:blipFill>
+        <p:spPr>
+          <a:xfrm>
+            <a:off x="4658430" y="1577022"/>
+            <a:ext cx="4302000" cy="2666529"/>
+          </a:xfrm>
+          <a:prstGeom prst="rect">
+            <a:avLst/>
+          </a:prstGeom>
+        </p:spPr>
+      </p:pic>
+      <p:sp>
+        <p:nvSpPr>
+          <p:cNvPr id="14" name="TextBox 13">
+            <a:extLst>
+              <a:ext uri="{FF2B5EF4-FFF2-40B4-BE49-F238E27FC236}">
+                <a16:creationId xmlns:a16="http://schemas.microsoft.com/office/drawing/2014/main" id="{377D783E-5598-6946-88C7-DC4684890F2A}"/>
+              </a:ext>
+            </a:extLst>
+          </p:cNvPr>
+          <p:cNvSpPr txBox="1"/>
+          <p:nvPr/>
+        </p:nvSpPr>
+        <p:spPr>
+          <a:xfrm>
+            <a:off x="795816" y="1361757"/>
+            <a:ext cx="3072316" cy="369332"/>
+          </a:xfrm>
+          <a:prstGeom prst="rect">
+            <a:avLst/>
+          </a:prstGeom>
+          <a:noFill/>
+        </p:spPr>
+        <p:txBody>
+          <a:bodyPr wrap="none" rtlCol="0">
+            <a:spAutoFit/>
+          </a:bodyPr>
+          <a:lstStyle/>
+          <a:p>
+            <a:pPr marL="285750" indent="-285750">
+              <a:buFont typeface="Arial" panose="020B0604020202020204" pitchFamily="34" charset="0"/>
+              <a:buChar char="•"/>
+            </a:pPr>
+            <a:r>
+              <a:rPr lang="en-DE" dirty="0"/>
+              <a:t>Video is in desired format</a:t>
+            </a:r>
+          </a:p>
+        </p:txBody>
+      </p:sp>
+      <p:cxnSp>
+        <p:nvCxnSpPr>
+          <p:cNvPr id="16" name="Straight Connector 15">
+            <a:extLst>
+              <a:ext uri="{FF2B5EF4-FFF2-40B4-BE49-F238E27FC236}">
+                <a16:creationId xmlns:a16="http://schemas.microsoft.com/office/drawing/2014/main" id="{FBBA8E2F-D5A0-8C4E-9FB5-73A44F78393A}"/>
+              </a:ext>
+            </a:extLst>
+          </p:cNvPr>
+          <p:cNvCxnSpPr/>
+          <p:nvPr/>
+        </p:nvCxnSpPr>
+        <p:spPr>
+          <a:xfrm>
+            <a:off x="4572000" y="1110086"/>
+            <a:ext cx="0" cy="3600400"/>
+          </a:xfrm>
+          <a:prstGeom prst="line">
+            <a:avLst/>
+          </a:prstGeom>
+        </p:spPr>
+        <p:style>
+          <a:lnRef idx="1">
+            <a:schemeClr val="dk1"/>
+          </a:lnRef>
+          <a:fillRef idx="0">
+            <a:schemeClr val="dk1"/>
+          </a:fillRef>
+          <a:effectRef idx="0">
+            <a:schemeClr val="dk1"/>
+          </a:effectRef>
+          <a:fontRef idx="minor">
+            <a:schemeClr val="tx1"/>
+          </a:fontRef>
+        </p:style>
+      </p:cxnSp>
+      <p:sp>
+        <p:nvSpPr>
+          <p:cNvPr id="17" name="TextBox 16">
+            <a:extLst>
+              <a:ext uri="{FF2B5EF4-FFF2-40B4-BE49-F238E27FC236}">
+                <a16:creationId xmlns:a16="http://schemas.microsoft.com/office/drawing/2014/main" id="{200FC0D4-6A2C-8A41-AB0F-E49C6E104EBB}"/>
+              </a:ext>
+            </a:extLst>
+          </p:cNvPr>
+          <p:cNvSpPr txBox="1"/>
+          <p:nvPr/>
+        </p:nvSpPr>
+        <p:spPr>
+          <a:xfrm>
+            <a:off x="4997555" y="1392356"/>
+            <a:ext cx="3623749" cy="369332"/>
+          </a:xfrm>
+          <a:prstGeom prst="rect">
+            <a:avLst/>
+          </a:prstGeom>
+          <a:noFill/>
+        </p:spPr>
+        <p:txBody>
+          <a:bodyPr wrap="none" rtlCol="0">
+            <a:spAutoFit/>
+          </a:bodyPr>
+          <a:lstStyle/>
+          <a:p>
+            <a:pPr marL="285750" indent="-285750">
+              <a:buFont typeface="Arial" panose="020B0604020202020204" pitchFamily="34" charset="0"/>
+              <a:buChar char="•"/>
+            </a:pPr>
+            <a:r>
+              <a:rPr lang="en-DE" dirty="0"/>
+              <a:t>Video needs to be transformed</a:t>
+            </a:r>
+          </a:p>
+        </p:txBody>
+      </p:sp>
+      <p:sp>
+        <p:nvSpPr>
+          <p:cNvPr id="18" name="Rounded Rectangle 17">
+            <a:extLst>
+              <a:ext uri="{FF2B5EF4-FFF2-40B4-BE49-F238E27FC236}">
+                <a16:creationId xmlns:a16="http://schemas.microsoft.com/office/drawing/2014/main" id="{1614D991-0E91-D240-A72A-E18921678363}"/>
+              </a:ext>
+            </a:extLst>
+          </p:cNvPr>
+          <p:cNvSpPr/>
+          <p:nvPr/>
+        </p:nvSpPr>
+        <p:spPr>
+          <a:xfrm>
+            <a:off x="6876256" y="366712"/>
+            <a:ext cx="1745048" cy="1025644"/>
+          </a:xfrm>
+          <a:prstGeom prst="roundRect">
+            <a:avLst/>
+          </a:prstGeom>
+        </p:spPr>
+        <p:style>
+          <a:lnRef idx="2">
+            <a:schemeClr val="accent1">
+              <a:shade val="50000"/>
+            </a:schemeClr>
+          </a:lnRef>
+          <a:fillRef idx="1">
+            <a:schemeClr val="accent1"/>
+          </a:fillRef>
+          <a:effectRef idx="0">
+            <a:schemeClr val="accent1"/>
+          </a:effectRef>
+          <a:fontRef idx="minor">
+            <a:schemeClr val="lt1"/>
+          </a:fontRef>
+        </p:style>
+        <p:txBody>
+          <a:bodyPr rtlCol="0" anchor="ctr"/>
+          <a:lstStyle/>
+          <a:p>
+            <a:pPr algn="ctr"/>
+            <a:r>
+              <a:rPr lang="en-DE" dirty="0"/>
+              <a:t>Change screenshots – Title is wrong!</a:t>
+            </a:r>
+          </a:p>
+        </p:txBody>
+      </p:sp>
+    </p:spTree>
+    <p:extLst>
+      <p:ext uri="{BB962C8B-B14F-4D97-AF65-F5344CB8AC3E}">
+        <p14:creationId xmlns:p14="http://schemas.microsoft.com/office/powerpoint/2010/main" val="3881359317"/>
+      </p:ext>
+    </p:extLst>
+  </p:cSld>
+  <p:clrMapOvr>
+    <a:masterClrMapping/>
+  </p:clrMapOvr>
+  <p:timing>
+    <p:tnLst>
+      <p:par>
+        <p:cTn id="1" dur="indefinite" restart="never" nodeType="tmRoot">
+          <p:childTnLst>
+            <p:seq concurrent="1" nextAc="seek">
+              <p:cTn id="2" dur="indefinite" nodeType="mainSeq">
+                <p:childTnLst>
+                  <p:par>
+                    <p:cTn id="3" fill="hold">
+                      <p:stCondLst>
+                        <p:cond delay="indefinite"/>
+                      </p:stCondLst>
+                      <p:childTnLst>
+                        <p:par>
+                          <p:cTn id="4" fill="hold">
+                            <p:stCondLst>
+                              <p:cond delay="0"/>
+                            </p:stCondLst>
+                            <p:childTnLst>
+                              <p:par>
+                                <p:cTn id="5" presetID="1" presetClass="entr" presetSubtype="0" fill="hold" grpId="0" nodeType="clickEffect">
+                                  <p:stCondLst>
+                                    <p:cond delay="0"/>
+                                  </p:stCondLst>
+                                  <p:childTnLst>
+                                    <p:set>
+                                      <p:cBhvr>
+                                        <p:cTn id="6" dur="1" fill="hold">
+                                          <p:stCondLst>
+                                            <p:cond delay="0"/>
+                                          </p:stCondLst>
+                                        </p:cTn>
+                                        <p:tgtEl>
+                                          <p:spTgt spid="14"/>
+                                        </p:tgtEl>
+                                        <p:attrNameLst>
+                                          <p:attrName>style.visibility</p:attrName>
+                                        </p:attrNameLst>
+                                      </p:cBhvr>
+                                      <p:to>
+                                        <p:strVal val="visible"/>
+                                      </p:to>
+                                    </p:set>
+                                  </p:childTnLst>
+                                </p:cTn>
+                              </p:par>
+                              <p:par>
+                                <p:cTn id="7" presetID="1" presetClass="entr" presetSubtype="0" fill="hold" nodeType="withEffect">
+                                  <p:stCondLst>
+                                    <p:cond delay="0"/>
+                                  </p:stCondLst>
+                                  <p:childTnLst>
+                                    <p:set>
+                                      <p:cBhvr>
+                                        <p:cTn id="8" dur="1" fill="hold">
+                                          <p:stCondLst>
+                                            <p:cond delay="0"/>
+                                          </p:stCondLst>
+                                        </p:cTn>
+                                        <p:tgtEl>
+                                          <p:spTgt spid="7"/>
+                                        </p:tgtEl>
+                                        <p:attrNameLst>
+                                          <p:attrName>style.visibility</p:attrName>
+                                        </p:attrNameLst>
+                                      </p:cBhvr>
+                                      <p:to>
+                                        <p:strVal val="visible"/>
+                                      </p:to>
+                                    </p:set>
+                                  </p:childTnLst>
+                                </p:cTn>
+                              </p:par>
+                            </p:childTnLst>
+                          </p:cTn>
+                        </p:par>
+                      </p:childTnLst>
+                    </p:cTn>
+                  </p:par>
+                  <p:par>
+                    <p:cTn id="9" fill="hold">
+                      <p:stCondLst>
+                        <p:cond delay="indefinite"/>
+                      </p:stCondLst>
+                      <p:childTnLst>
+                        <p:par>
+                          <p:cTn id="10" fill="hold">
+                            <p:stCondLst>
+                              <p:cond delay="0"/>
+                            </p:stCondLst>
+                            <p:childTnLst>
+                              <p:par>
+                                <p:cTn id="11" presetID="1" presetClass="entr" presetSubtype="0" fill="hold" nodeType="clickEffect">
+                                  <p:stCondLst>
+                                    <p:cond delay="0"/>
+                                  </p:stCondLst>
+                                  <p:childTnLst>
+                                    <p:set>
+                                      <p:cBhvr>
+                                        <p:cTn id="12" dur="1" fill="hold">
+                                          <p:stCondLst>
+                                            <p:cond delay="0"/>
+                                          </p:stCondLst>
+                                        </p:cTn>
+                                        <p:tgtEl>
+                                          <p:spTgt spid="16"/>
+                                        </p:tgtEl>
+                                        <p:attrNameLst>
+                                          <p:attrName>style.visibility</p:attrName>
+                                        </p:attrNameLst>
+                                      </p:cBhvr>
+                                      <p:to>
+                                        <p:strVal val="visible"/>
+                                      </p:to>
+                                    </p:set>
+                                  </p:childTnLst>
+                                </p:cTn>
+                              </p:par>
+                              <p:par>
+                                <p:cTn id="13" presetID="1" presetClass="entr" presetSubtype="0" fill="hold" grpId="0" nodeType="withEffect">
+                                  <p:stCondLst>
+                                    <p:cond delay="0"/>
+                                  </p:stCondLst>
+                                  <p:childTnLst>
+                                    <p:set>
+                                      <p:cBhvr>
+                                        <p:cTn id="14" dur="1" fill="hold">
+                                          <p:stCondLst>
+                                            <p:cond delay="0"/>
+                                          </p:stCondLst>
+                                        </p:cTn>
+                                        <p:tgtEl>
+                                          <p:spTgt spid="17"/>
+                                        </p:tgtEl>
+                                        <p:attrNameLst>
+                                          <p:attrName>style.visibility</p:attrName>
+                                        </p:attrNameLst>
+                                      </p:cBhvr>
+                                      <p:to>
+                                        <p:strVal val="visible"/>
+                                      </p:to>
+                                    </p:set>
+                                  </p:childTnLst>
+                                </p:cTn>
+                              </p:par>
+                              <p:par>
+                                <p:cTn id="15" presetID="1" presetClass="entr" presetSubtype="0" fill="hold" nodeType="withEffect">
+                                  <p:stCondLst>
+                                    <p:cond delay="0"/>
+                                  </p:stCondLst>
+                                  <p:childTnLst>
+                                    <p:set>
+                                      <p:cBhvr>
+                                        <p:cTn id="16" dur="1" fill="hold">
+                                          <p:stCondLst>
+                                            <p:cond delay="0"/>
+                                          </p:stCondLst>
+                                        </p:cTn>
+                                        <p:tgtEl>
+                                          <p:spTgt spid="13"/>
+                                        </p:tgtEl>
+                                        <p:attrNameLst>
+                                          <p:attrName>style.visibility</p:attrName>
+                                        </p:attrNameLst>
+                                      </p:cBhvr>
+                                      <p:to>
+                                        <p:strVal val="visible"/>
+                                      </p:to>
+                                    </p:set>
+                                  </p:childTnLst>
+                                </p:cTn>
+                              </p:par>
+                            </p:childTnLst>
+                          </p:cTn>
+                        </p:par>
+                      </p:childTnLst>
+                    </p:cTn>
+                  </p:par>
+                </p:childTnLst>
+              </p:cTn>
+              <p:prevCondLst>
+                <p:cond evt="onPrev" delay="0">
+                  <p:tgtEl>
+                    <p:sldTgt/>
+                  </p:tgtEl>
+                </p:cond>
+              </p:prevCondLst>
+              <p:nextCondLst>
+                <p:cond evt="onNext" delay="0">
+                  <p:tgtEl>
+                    <p:sldTgt/>
+                  </p:tgtEl>
+                </p:cond>
+              </p:nextCondLst>
+            </p:seq>
+          </p:childTnLst>
+        </p:cTn>
+      </p:par>
+    </p:tnLst>
+    <p:bldLst>
+      <p:bldP spid="14" grpId="0"/>
+      <p:bldP spid="17" grpId="0"/>
+    </p:bldLst>
+  </p:timing>
+</p:sld>
+</file>
+
+<file path=ppt/slides/slide16.xml><?xml version="1.0" encoding="utf-8"?>
+<p:sld xmlns:a="http://schemas.openxmlformats.org/drawingml/2006/main" xmlns:r="http://schemas.openxmlformats.org/officeDocument/2006/relationships" xmlns:p="http://schemas.openxmlformats.org/presentationml/2006/main">
+  <p:cSld>
+    <p:spTree>
+      <p:nvGrpSpPr>
+        <p:cNvPr id="1" name=""/>
+        <p:cNvGrpSpPr/>
+        <p:nvPr/>
+      </p:nvGrpSpPr>
+      <p:grpSpPr>
+        <a:xfrm>
+          <a:off x="0" y="0"/>
+          <a:ext cx="0" cy="0"/>
+          <a:chOff x="0" y="0"/>
+          <a:chExt cx="0" cy="0"/>
+        </a:xfrm>
+      </p:grpSpPr>
+      <p:sp>
+        <p:nvSpPr>
+          <p:cNvPr id="2" name="Title 1">
+            <a:extLst>
+              <a:ext uri="{FF2B5EF4-FFF2-40B4-BE49-F238E27FC236}">
+                <a16:creationId xmlns:a16="http://schemas.microsoft.com/office/drawing/2014/main" id="{05F1E304-987A-524A-AD6E-CF09A0BFAD55}"/>
+              </a:ext>
+            </a:extLst>
+          </p:cNvPr>
+          <p:cNvSpPr>
+            <a:spLocks noGrp="1"/>
+          </p:cNvSpPr>
+          <p:nvPr>
+            <p:ph type="title"/>
+          </p:nvPr>
+        </p:nvSpPr>
+        <p:spPr>
+          <a:xfrm>
+            <a:off x="181122" y="366712"/>
+            <a:ext cx="7415214" cy="628650"/>
+          </a:xfrm>
+        </p:spPr>
+        <p:txBody>
+          <a:bodyPr/>
+          <a:lstStyle/>
+          <a:p>
+            <a:r>
+              <a:rPr lang="en-DE" dirty="0"/>
+              <a:t>Graphical User Interface: </a:t>
+            </a:r>
+            <a:r>
+              <a:rPr lang="en-GB" dirty="0" err="1"/>
+              <a:t>ChooseModelAndDevice</a:t>
+            </a:r>
+            <a:endParaRPr lang="en-DE" dirty="0"/>
+          </a:p>
+        </p:txBody>
+      </p:sp>
+      <p:pic>
+        <p:nvPicPr>
+          <p:cNvPr id="5" name="Content Placeholder 4">
+            <a:extLst>
+              <a:ext uri="{FF2B5EF4-FFF2-40B4-BE49-F238E27FC236}">
+                <a16:creationId xmlns:a16="http://schemas.microsoft.com/office/drawing/2014/main" id="{38C0F33E-264A-CB4C-BC50-7F00E9B068E7}"/>
+              </a:ext>
+            </a:extLst>
+          </p:cNvPr>
+          <p:cNvPicPr>
+            <a:picLocks noGrp="1" noChangeAspect="1"/>
+          </p:cNvPicPr>
+          <p:nvPr>
+            <p:ph sz="half" idx="10"/>
+          </p:nvPr>
+        </p:nvPicPr>
+        <p:blipFill>
+          <a:blip r:embed="rId2">
+            <a:extLst>
+              <a:ext uri="{28A0092B-C50C-407E-A947-70E740481C1C}">
+                <a14:useLocalDpi xmlns:a14="http://schemas.microsoft.com/office/drawing/2010/main" val="0"/>
+              </a:ext>
+            </a:extLst>
+          </a:blip>
+          <a:stretch>
+            <a:fillRect/>
+          </a:stretch>
+        </p:blipFill>
+        <p:spPr>
+          <a:xfrm>
+            <a:off x="2421731" y="1619862"/>
+            <a:ext cx="4300538" cy="2562588"/>
+          </a:xfrm>
+        </p:spPr>
+      </p:pic>
+    </p:spTree>
+    <p:extLst>
+      <p:ext uri="{BB962C8B-B14F-4D97-AF65-F5344CB8AC3E}">
+        <p14:creationId xmlns:p14="http://schemas.microsoft.com/office/powerpoint/2010/main" val="3860221759"/>
+      </p:ext>
+    </p:extLst>
+  </p:cSld>
+  <p:clrMapOvr>
+    <a:masterClrMapping/>
+  </p:clrMapOvr>
+</p:sld>
+</file>
+
+<file path=ppt/slides/slide17.xml><?xml version="1.0" encoding="utf-8"?>
+<p:sld xmlns:a="http://schemas.openxmlformats.org/drawingml/2006/main" xmlns:r="http://schemas.openxmlformats.org/officeDocument/2006/relationships" xmlns:p="http://schemas.openxmlformats.org/presentationml/2006/main">
+  <p:cSld>
+    <p:spTree>
+      <p:nvGrpSpPr>
+        <p:cNvPr id="1" name=""/>
+        <p:cNvGrpSpPr/>
+        <p:nvPr/>
+      </p:nvGrpSpPr>
+      <p:grpSpPr>
+        <a:xfrm>
+          <a:off x="0" y="0"/>
+          <a:ext cx="0" cy="0"/>
+          <a:chOff x="0" y="0"/>
+          <a:chExt cx="0" cy="0"/>
+        </a:xfrm>
+      </p:grpSpPr>
+      <p:sp>
+        <p:nvSpPr>
+          <p:cNvPr id="2" name="Title 1">
+            <a:extLst>
+              <a:ext uri="{FF2B5EF4-FFF2-40B4-BE49-F238E27FC236}">
+                <a16:creationId xmlns:a16="http://schemas.microsoft.com/office/drawing/2014/main" id="{05F1E304-987A-524A-AD6E-CF09A0BFAD55}"/>
+              </a:ext>
+            </a:extLst>
+          </p:cNvPr>
+          <p:cNvSpPr>
+            <a:spLocks noGrp="1"/>
+          </p:cNvSpPr>
+          <p:nvPr>
+            <p:ph type="title"/>
+          </p:nvPr>
+        </p:nvSpPr>
+        <p:spPr/>
+        <p:txBody>
+          <a:bodyPr/>
+          <a:lstStyle/>
+          <a:p>
+            <a:r>
+              <a:rPr lang="en-DE" dirty="0"/>
+              <a:t>Graphical User Interface: </a:t>
+            </a:r>
+            <a:r>
+              <a:rPr lang="en-GB" dirty="0" err="1"/>
+              <a:t>ModelSpecs</a:t>
+            </a:r>
+            <a:endParaRPr lang="en-DE" dirty="0"/>
+          </a:p>
+        </p:txBody>
+      </p:sp>
+      <p:pic>
+        <p:nvPicPr>
+          <p:cNvPr id="5" name="Content Placeholder 4">
+            <a:extLst>
+              <a:ext uri="{FF2B5EF4-FFF2-40B4-BE49-F238E27FC236}">
+                <a16:creationId xmlns:a16="http://schemas.microsoft.com/office/drawing/2014/main" id="{3F9F3144-4ECD-0840-A0ED-EC773C4B2E49}"/>
+              </a:ext>
+            </a:extLst>
+          </p:cNvPr>
+          <p:cNvPicPr>
+            <a:picLocks noGrp="1" noChangeAspect="1"/>
+          </p:cNvPicPr>
+          <p:nvPr>
+            <p:ph sz="half" idx="10"/>
+          </p:nvPr>
+        </p:nvPicPr>
+        <p:blipFill>
+          <a:blip r:embed="rId2">
+            <a:extLst>
+              <a:ext uri="{28A0092B-C50C-407E-A947-70E740481C1C}">
+                <a14:useLocalDpi xmlns:a14="http://schemas.microsoft.com/office/drawing/2010/main" val="0"/>
+              </a:ext>
+            </a:extLst>
+          </a:blip>
+          <a:stretch>
+            <a:fillRect/>
+          </a:stretch>
+        </p:blipFill>
+        <p:spPr>
+          <a:xfrm>
+            <a:off x="3064283" y="1193800"/>
+            <a:ext cx="3015435" cy="3414713"/>
+          </a:xfrm>
+        </p:spPr>
+      </p:pic>
+      <p:sp>
+        <p:nvSpPr>
+          <p:cNvPr id="7" name="Rounded Rectangle 6">
+            <a:extLst>
+              <a:ext uri="{FF2B5EF4-FFF2-40B4-BE49-F238E27FC236}">
+                <a16:creationId xmlns:a16="http://schemas.microsoft.com/office/drawing/2014/main" id="{9D547D32-C4B5-A246-BEF2-AA833D6E9B36}"/>
+              </a:ext>
+            </a:extLst>
+          </p:cNvPr>
+          <p:cNvSpPr/>
+          <p:nvPr/>
+        </p:nvSpPr>
+        <p:spPr>
+          <a:xfrm>
+            <a:off x="6876256" y="366712"/>
+            <a:ext cx="1745048" cy="1025644"/>
+          </a:xfrm>
+          <a:prstGeom prst="roundRect">
+            <a:avLst/>
+          </a:prstGeom>
+        </p:spPr>
+        <p:style>
+          <a:lnRef idx="2">
+            <a:schemeClr val="accent1">
+              <a:shade val="50000"/>
+            </a:schemeClr>
+          </a:lnRef>
+          <a:fillRef idx="1">
+            <a:schemeClr val="accent1"/>
+          </a:fillRef>
+          <a:effectRef idx="0">
+            <a:schemeClr val="accent1"/>
+          </a:effectRef>
+          <a:fontRef idx="minor">
+            <a:schemeClr val="lt1"/>
+          </a:fontRef>
+        </p:style>
+        <p:txBody>
+          <a:bodyPr rtlCol="0" anchor="ctr"/>
+          <a:lstStyle/>
+          <a:p>
+            <a:pPr algn="ctr"/>
+            <a:r>
+              <a:rPr lang="en-DE" dirty="0"/>
+              <a:t>Change screenshot – Model param settingswrong</a:t>
+            </a:r>
+          </a:p>
+        </p:txBody>
+      </p:sp>
+    </p:spTree>
+    <p:extLst>
+      <p:ext uri="{BB962C8B-B14F-4D97-AF65-F5344CB8AC3E}">
+        <p14:creationId xmlns:p14="http://schemas.microsoft.com/office/powerpoint/2010/main" val="2747204293"/>
+      </p:ext>
+    </p:extLst>
+  </p:cSld>
+  <p:clrMapOvr>
+    <a:masterClrMapping/>
+  </p:clrMapOvr>
+</p:sld>
+</file>
+
+<file path=ppt/slides/slide18.xml><?xml version="1.0" encoding="utf-8"?>
+<p:sld xmlns:a="http://schemas.openxmlformats.org/drawingml/2006/main" xmlns:r="http://schemas.openxmlformats.org/officeDocument/2006/relationships" xmlns:p="http://schemas.openxmlformats.org/presentationml/2006/main">
+  <p:cSld>
+    <p:spTree>
+      <p:nvGrpSpPr>
+        <p:cNvPr id="1" name=""/>
+        <p:cNvGrpSpPr/>
+        <p:nvPr/>
+      </p:nvGrpSpPr>
+      <p:grpSpPr>
+        <a:xfrm>
+          <a:off x="0" y="0"/>
+          <a:ext cx="0" cy="0"/>
+          <a:chOff x="0" y="0"/>
+          <a:chExt cx="0" cy="0"/>
+        </a:xfrm>
+      </p:grpSpPr>
+      <p:sp>
+        <p:nvSpPr>
+          <p:cNvPr id="2" name="Title 1">
+            <a:extLst>
+              <a:ext uri="{FF2B5EF4-FFF2-40B4-BE49-F238E27FC236}">
+                <a16:creationId xmlns:a16="http://schemas.microsoft.com/office/drawing/2014/main" id="{05F1E304-987A-524A-AD6E-CF09A0BFAD55}"/>
+              </a:ext>
+            </a:extLst>
+          </p:cNvPr>
+          <p:cNvSpPr>
+            <a:spLocks noGrp="1"/>
+          </p:cNvSpPr>
+          <p:nvPr>
+            <p:ph type="title"/>
+          </p:nvPr>
+        </p:nvSpPr>
+        <p:spPr/>
+        <p:txBody>
+          <a:bodyPr/>
+          <a:lstStyle/>
+          <a:p>
+            <a:r>
+              <a:rPr lang="en-DE" dirty="0"/>
+              <a:t>Graphical User Interface: </a:t>
+            </a:r>
+            <a:r>
+              <a:rPr lang="en-GB" dirty="0" err="1"/>
+              <a:t>PredictVideoTools</a:t>
+            </a:r>
+            <a:endParaRPr lang="en-DE" dirty="0"/>
+          </a:p>
+        </p:txBody>
+      </p:sp>
+      <p:pic>
+        <p:nvPicPr>
+          <p:cNvPr id="5" name="Content Placeholder 4">
+            <a:extLst>
+              <a:ext uri="{FF2B5EF4-FFF2-40B4-BE49-F238E27FC236}">
+                <a16:creationId xmlns:a16="http://schemas.microsoft.com/office/drawing/2014/main" id="{1A084323-82D8-7E48-BCDA-5AEE85F65D61}"/>
+              </a:ext>
+            </a:extLst>
+          </p:cNvPr>
+          <p:cNvPicPr>
+            <a:picLocks noGrp="1" noChangeAspect="1"/>
+          </p:cNvPicPr>
+          <p:nvPr>
+            <p:ph sz="half" idx="10"/>
+          </p:nvPr>
+        </p:nvPicPr>
+        <p:blipFill>
+          <a:blip r:embed="rId2">
+            <a:extLst>
+              <a:ext uri="{28A0092B-C50C-407E-A947-70E740481C1C}">
+                <a14:useLocalDpi xmlns:a14="http://schemas.microsoft.com/office/drawing/2010/main" val="0"/>
+              </a:ext>
+            </a:extLst>
+          </a:blip>
+          <a:stretch>
+            <a:fillRect/>
+          </a:stretch>
+        </p:blipFill>
+        <p:spPr>
+          <a:xfrm>
+            <a:off x="2421731" y="1724044"/>
+            <a:ext cx="4300538" cy="2354224"/>
+          </a:xfrm>
+        </p:spPr>
+      </p:pic>
+    </p:spTree>
+    <p:extLst>
+      <p:ext uri="{BB962C8B-B14F-4D97-AF65-F5344CB8AC3E}">
+        <p14:creationId xmlns:p14="http://schemas.microsoft.com/office/powerpoint/2010/main" val="4105111904"/>
+      </p:ext>
+    </p:extLst>
+  </p:cSld>
+  <p:clrMapOvr>
+    <a:masterClrMapping/>
+  </p:clrMapOvr>
+</p:sld>
+</file>
+
+<file path=ppt/slides/slide19.xml><?xml version="1.0" encoding="utf-8"?>
+<p:sld xmlns:a="http://schemas.openxmlformats.org/drawingml/2006/main" xmlns:r="http://schemas.openxmlformats.org/officeDocument/2006/relationships" xmlns:p="http://schemas.openxmlformats.org/presentationml/2006/main">
+  <p:cSld>
+    <p:spTree>
+      <p:nvGrpSpPr>
+        <p:cNvPr id="1" name=""/>
+        <p:cNvGrpSpPr/>
+        <p:nvPr/>
+      </p:nvGrpSpPr>
+      <p:grpSpPr>
+        <a:xfrm>
+          <a:off x="0" y="0"/>
+          <a:ext cx="0" cy="0"/>
+          <a:chOff x="0" y="0"/>
+          <a:chExt cx="0" cy="0"/>
+        </a:xfrm>
+      </p:grpSpPr>
+      <p:sp>
+        <p:nvSpPr>
+          <p:cNvPr id="2" name="Title 1">
+            <a:extLst>
+              <a:ext uri="{FF2B5EF4-FFF2-40B4-BE49-F238E27FC236}">
+                <a16:creationId xmlns:a16="http://schemas.microsoft.com/office/drawing/2014/main" id="{05F1E304-987A-524A-AD6E-CF09A0BFAD55}"/>
+              </a:ext>
+            </a:extLst>
+          </p:cNvPr>
+          <p:cNvSpPr>
+            <a:spLocks noGrp="1"/>
+          </p:cNvSpPr>
+          <p:nvPr>
+            <p:ph type="title"/>
+          </p:nvPr>
+        </p:nvSpPr>
+        <p:spPr/>
+        <p:txBody>
+          <a:bodyPr/>
+          <a:lstStyle/>
+          <a:p>
+            <a:r>
+              <a:rPr lang="en-DE" dirty="0"/>
+              <a:t>Graphical User Interface: </a:t>
+            </a:r>
+            <a:r>
+              <a:rPr lang="en-GB" dirty="0" err="1"/>
+              <a:t>ResultWindow</a:t>
+            </a:r>
+            <a:endParaRPr lang="en-DE" dirty="0"/>
+          </a:p>
+        </p:txBody>
+      </p:sp>
+      <p:pic>
+        <p:nvPicPr>
+          <p:cNvPr id="7" name="Content Placeholder 6">
+            <a:extLst>
+              <a:ext uri="{FF2B5EF4-FFF2-40B4-BE49-F238E27FC236}">
+                <a16:creationId xmlns:a16="http://schemas.microsoft.com/office/drawing/2014/main" id="{F618EBCF-7D68-8042-BA74-E57E87AF566D}"/>
+              </a:ext>
+            </a:extLst>
+          </p:cNvPr>
+          <p:cNvPicPr>
+            <a:picLocks noGrp="1" noChangeAspect="1"/>
+          </p:cNvPicPr>
+          <p:nvPr>
+            <p:ph sz="half" idx="10"/>
+          </p:nvPr>
+        </p:nvPicPr>
+        <p:blipFill>
+          <a:blip r:embed="rId2">
+            <a:extLst>
+              <a:ext uri="{28A0092B-C50C-407E-A947-70E740481C1C}">
+                <a14:useLocalDpi xmlns:a14="http://schemas.microsoft.com/office/drawing/2010/main" val="0"/>
+              </a:ext>
+            </a:extLst>
+          </a:blip>
+          <a:stretch>
+            <a:fillRect/>
+          </a:stretch>
+        </p:blipFill>
+        <p:spPr>
+          <a:xfrm>
+            <a:off x="2421731" y="1268092"/>
+            <a:ext cx="4300538" cy="3266128"/>
+          </a:xfrm>
+        </p:spPr>
+      </p:pic>
+    </p:spTree>
+    <p:extLst>
+      <p:ext uri="{BB962C8B-B14F-4D97-AF65-F5344CB8AC3E}">
+        <p14:creationId xmlns:p14="http://schemas.microsoft.com/office/powerpoint/2010/main" val="2613544693"/>
+      </p:ext>
+    </p:extLst>
+  </p:cSld>
+  <p:clrMapOvr>
+    <a:masterClrMapping/>
+  </p:clrMapOvr>
+</p:sld>
+</file>
+
 <file path=ppt/slides/slide2.xml><?xml version="1.0" encoding="utf-8"?>
 <p:sld xmlns:a="http://schemas.openxmlformats.org/drawingml/2006/main" xmlns:r="http://schemas.openxmlformats.org/officeDocument/2006/relationships" xmlns:p="http://schemas.openxmlformats.org/presentationml/2006/main">
   <p:cSld>
@@ -10101,7 +11670,7 @@
                                           </p:stCondLst>
                                         </p:cTn>
                                         <p:tgtEl>
-                                          <p:spTgt spid="4">
+                                          <p:spTgt spid="3">
                                             <p:txEl>
                                               <p:pRg st="0" end="0"/>
                                             </p:txEl>
@@ -10132,7 +11701,7 @@
                                           </p:stCondLst>
                                         </p:cTn>
                                         <p:tgtEl>
-                                          <p:spTgt spid="4">
+                                          <p:spTgt spid="3">
                                             <p:txEl>
                                               <p:pRg st="3" end="3"/>
                                             </p:txEl>
@@ -10163,6 +11732,113 @@
                                           </p:stCondLst>
                                         </p:cTn>
                                         <p:tgtEl>
+                                          <p:spTgt spid="7"/>
+                                        </p:tgtEl>
+                                        <p:attrNameLst>
+                                          <p:attrName>style.visibility</p:attrName>
+                                        </p:attrNameLst>
+                                      </p:cBhvr>
+                                      <p:to>
+                                        <p:strVal val="visible"/>
+                                      </p:to>
+                                    </p:set>
+                                  </p:childTnLst>
+                                </p:cTn>
+                              </p:par>
+                            </p:childTnLst>
+                          </p:cTn>
+                        </p:par>
+                      </p:childTnLst>
+                    </p:cTn>
+                  </p:par>
+                  <p:par>
+                    <p:cTn id="11" fill="hold">
+                      <p:stCondLst>
+                        <p:cond delay="indefinite"/>
+                      </p:stCondLst>
+                      <p:childTnLst>
+                        <p:par>
+                          <p:cTn id="12" fill="hold">
+                            <p:stCondLst>
+                              <p:cond delay="0"/>
+                            </p:stCondLst>
+                            <p:childTnLst>
+                              <p:par>
+                                <p:cTn id="13" presetID="1" presetClass="entr" presetSubtype="0" fill="hold" grpId="0" nodeType="clickEffect">
+                                  <p:stCondLst>
+                                    <p:cond delay="0"/>
+                                  </p:stCondLst>
+                                  <p:childTnLst>
+                                    <p:set>
+                                      <p:cBhvr>
+                                        <p:cTn id="14" dur="1" fill="hold">
+                                          <p:stCondLst>
+                                            <p:cond delay="0"/>
+                                          </p:stCondLst>
+                                        </p:cTn>
+                                        <p:tgtEl>
+                                          <p:spTgt spid="4">
+                                            <p:txEl>
+                                              <p:pRg st="0" end="0"/>
+                                            </p:txEl>
+                                          </p:spTgt>
+                                        </p:tgtEl>
+                                        <p:attrNameLst>
+                                          <p:attrName>style.visibility</p:attrName>
+                                        </p:attrNameLst>
+                                      </p:cBhvr>
+                                      <p:to>
+                                        <p:strVal val="visible"/>
+                                      </p:to>
+                                    </p:set>
+                                  </p:childTnLst>
+                                </p:cTn>
+                              </p:par>
+                              <p:par>
+                                <p:cTn id="15" presetID="1" presetClass="entr" presetSubtype="0" fill="hold" grpId="0" nodeType="withEffect">
+                                  <p:stCondLst>
+                                    <p:cond delay="0"/>
+                                  </p:stCondLst>
+                                  <p:childTnLst>
+                                    <p:set>
+                                      <p:cBhvr>
+                                        <p:cTn id="16" dur="1" fill="hold">
+                                          <p:stCondLst>
+                                            <p:cond delay="0"/>
+                                          </p:stCondLst>
+                                        </p:cTn>
+                                        <p:tgtEl>
+                                          <p:spTgt spid="4">
+                                            <p:txEl>
+                                              <p:pRg st="3" end="3"/>
+                                            </p:txEl>
+                                          </p:spTgt>
+                                        </p:tgtEl>
+                                        <p:attrNameLst>
+                                          <p:attrName>style.visibility</p:attrName>
+                                        </p:attrNameLst>
+                                      </p:cBhvr>
+                                      <p:to>
+                                        <p:strVal val="visible"/>
+                                      </p:to>
+                                    </p:set>
+                                  </p:childTnLst>
+                                </p:cTn>
+                              </p:par>
+                              <p:par>
+                                <p:cTn id="17" presetID="1" presetClass="entr" presetSubtype="0" fill="hold" nodeType="withEffect">
+                                  <p:stCondLst>
+                                    <p:cond delay="0"/>
+                                  </p:stCondLst>
+                                  <p:childTnLst>
+                                    <p:set>
+                                      <p:cBhvr>
+                                        <p:cTn id="18" dur="1" fill="hold">
+                                          <p:stCondLst>
+                                            <p:cond delay="0"/>
+                                          </p:stCondLst>
+                                        </p:cTn>
+                                        <p:tgtEl>
                                           <p:spTgt spid="15"/>
                                         </p:tgtEl>
                                         <p:attrNameLst>
@@ -10177,14 +11853,14 @@
                                 </p:cTn>
                               </p:par>
                               <p:par>
-                                <p:cTn id="11" presetID="1" presetClass="entr" presetSubtype="0" fill="hold" nodeType="withEffect">
+                                <p:cTn id="19" presetID="1" presetClass="entr" presetSubtype="0" fill="hold" nodeType="withEffect">
                                   <p:stCondLst>
                                     <p:cond delay="0"/>
                                   </p:stCondLst>
                                   <p:childTnLst>
                                     <p:set>
                                       <p:cBhvr>
-                                        <p:cTn id="12" dur="1" fill="hold">
+                                        <p:cTn id="20" dur="1" fill="hold">
                                           <p:stCondLst>
                                             <p:cond delay="0"/>
                                           </p:stCondLst>
@@ -10210,26 +11886,26 @@
                     </p:cTn>
                   </p:par>
                   <p:par>
-                    <p:cTn id="13" fill="hold">
+                    <p:cTn id="21" fill="hold">
                       <p:stCondLst>
                         <p:cond delay="indefinite"/>
                       </p:stCondLst>
                       <p:childTnLst>
                         <p:par>
-                          <p:cTn id="14" fill="hold">
+                          <p:cTn id="22" fill="hold">
                             <p:stCondLst>
                               <p:cond delay="0"/>
                             </p:stCondLst>
                             <p:childTnLst>
                               <p:par>
-                                <p:cTn id="15" presetID="1" presetClass="entr" presetSubtype="0" fill="hold" grpId="0" nodeType="clickEffect">
+                                <p:cTn id="23" presetID="1" presetClass="entr" presetSubtype="0" fill="hold" grpId="0" nodeType="clickEffect">
                                   <p:stCondLst>
                                     <p:cond delay="0"/>
                                   </p:stCondLst>
                                   <p:childTnLst>
                                     <p:set>
                                       <p:cBhvr>
-                                        <p:cTn id="16" dur="1" fill="hold">
+                                        <p:cTn id="24" dur="1" fill="hold">
                                           <p:stCondLst>
                                             <p:cond delay="0"/>
                                           </p:stCondLst>
@@ -10253,14 +11929,14 @@
                                 </p:cTn>
                               </p:par>
                               <p:par>
-                                <p:cTn id="17" presetID="1" presetClass="entr" presetSubtype="0" fill="hold" grpId="0" nodeType="withEffect">
+                                <p:cTn id="25" presetID="1" presetClass="entr" presetSubtype="0" fill="hold" grpId="0" nodeType="withEffect">
                                   <p:stCondLst>
                                     <p:cond delay="0"/>
                                   </p:stCondLst>
                                   <p:childTnLst>
                                     <p:set>
                                       <p:cBhvr>
-                                        <p:cTn id="18" dur="1" fill="hold">
+                                        <p:cTn id="26" dur="1" fill="hold">
                                           <p:stCondLst>
                                             <p:cond delay="0"/>
                                           </p:stCondLst>
@@ -10284,14 +11960,14 @@
                                 </p:cTn>
                               </p:par>
                               <p:par>
-                                <p:cTn id="19" presetID="1" presetClass="entr" presetSubtype="0" fill="hold" grpId="0" nodeType="withEffect">
+                                <p:cTn id="27" presetID="1" presetClass="entr" presetSubtype="0" fill="hold" grpId="0" nodeType="withEffect">
                                   <p:stCondLst>
                                     <p:cond delay="0"/>
                                   </p:stCondLst>
                                   <p:childTnLst>
                                     <p:set>
                                       <p:cBhvr>
-                                        <p:cTn id="20" dur="1" fill="hold">
+                                        <p:cTn id="28" dur="1" fill="hold">
                                           <p:stCondLst>
                                             <p:cond delay="0"/>
                                           </p:stCondLst>
@@ -10315,14 +11991,14 @@
                                 </p:cTn>
                               </p:par>
                               <p:par>
-                                <p:cTn id="21" presetID="1" presetClass="entr" presetSubtype="0" fill="hold" nodeType="withEffect">
+                                <p:cTn id="29" presetID="1" presetClass="entr" presetSubtype="0" fill="hold" nodeType="withEffect">
                                   <p:stCondLst>
                                     <p:cond delay="0"/>
                                   </p:stCondLst>
                                   <p:childTnLst>
                                     <p:set>
                                       <p:cBhvr>
-                                        <p:cTn id="22" dur="1" fill="hold">
+                                        <p:cTn id="30" dur="1" fill="hold">
                                           <p:stCondLst>
                                             <p:cond delay="0"/>
                                           </p:stCondLst>
@@ -10342,14 +12018,14 @@
                                 </p:cTn>
                               </p:par>
                               <p:par>
-                                <p:cTn id="23" presetID="1" presetClass="entr" presetSubtype="0" fill="hold" nodeType="withEffect">
+                                <p:cTn id="31" presetID="1" presetClass="entr" presetSubtype="0" fill="hold" nodeType="withEffect">
                                   <p:stCondLst>
                                     <p:cond delay="0"/>
                                   </p:stCondLst>
                                   <p:childTnLst>
                                     <p:set>
                                       <p:cBhvr>
-                                        <p:cTn id="24" dur="1" fill="hold">
+                                        <p:cTn id="32" dur="1" fill="hold">
                                           <p:stCondLst>
                                             <p:cond delay="0"/>
                                           </p:stCondLst>
@@ -10369,14 +12045,14 @@
                                 </p:cTn>
                               </p:par>
                               <p:par>
-                                <p:cTn id="25" presetID="1" presetClass="entr" presetSubtype="0" fill="hold" nodeType="withEffect">
+                                <p:cTn id="33" presetID="1" presetClass="entr" presetSubtype="0" fill="hold" nodeType="withEffect">
                                   <p:stCondLst>
                                     <p:cond delay="0"/>
                                   </p:stCondLst>
                                   <p:childTnLst>
                                     <p:set>
                                       <p:cBhvr>
-                                        <p:cTn id="26" dur="1" fill="hold">
+                                        <p:cTn id="34" dur="1" fill="hold">
                                           <p:stCondLst>
                                             <p:cond delay="0"/>
                                           </p:stCondLst>
@@ -10396,14 +12072,14 @@
                                 </p:cTn>
                               </p:par>
                               <p:par>
-                                <p:cTn id="27" presetID="1" presetClass="entr" presetSubtype="0" fill="hold" nodeType="withEffect">
+                                <p:cTn id="35" presetID="1" presetClass="entr" presetSubtype="0" fill="hold" nodeType="withEffect">
                                   <p:stCondLst>
                                     <p:cond delay="0"/>
                                   </p:stCondLst>
                                   <p:childTnLst>
                                     <p:set>
                                       <p:cBhvr>
-                                        <p:cTn id="28" dur="1" fill="hold">
+                                        <p:cTn id="36" dur="1" fill="hold">
                                           <p:stCondLst>
                                             <p:cond delay="0"/>
                                           </p:stCondLst>
@@ -10450,6 +12126,7 @@
       </p:par>
     </p:tnLst>
     <p:bldLst>
+      <p:bldP spid="3" grpId="0" uiExpand="1" build="p"/>
       <p:bldP spid="4" grpId="0" build="p"/>
       <p:bldP spid="5" grpId="0" uiExpand="1" build="p"/>
     </p:bldLst>
@@ -10726,7 +12403,7 @@
           <p:nvPr>
             <p:extLst>
               <p:ext uri="{D42A27DB-BD31-4B8C-83A1-F6EECF244321}">
-                <p14:modId xmlns:p14="http://schemas.microsoft.com/office/powerpoint/2010/main" val="3524627204"/>
+                <p14:modId xmlns:p14="http://schemas.microsoft.com/office/powerpoint/2010/main" val="2587939255"/>
               </p:ext>
             </p:extLst>
           </p:nvPr>
@@ -11395,12 +13072,45 @@
             <p:ph sz="half" idx="1"/>
           </p:nvPr>
         </p:nvSpPr>
-        <p:spPr/>
+        <p:spPr>
+          <a:xfrm>
+            <a:off x="181121" y="1194198"/>
+            <a:ext cx="4299258" cy="3413536"/>
+          </a:xfrm>
+        </p:spPr>
         <p:txBody>
           <a:bodyPr/>
           <a:lstStyle/>
           <a:p>
-            <a:endParaRPr lang="en-DE" dirty="0"/>
+            <a:r>
+              <a:rPr lang="en-DE" sz="1600" dirty="0"/>
+              <a:t>ResNet:</a:t>
+            </a:r>
+          </a:p>
+          <a:p>
+            <a:pPr marL="285750" indent="-285750">
+              <a:buFont typeface="Arial" panose="020B0604020202020204" pitchFamily="34" charset="0"/>
+              <a:buChar char="•"/>
+            </a:pPr>
+            <a:r>
+              <a:rPr lang="en-DE" sz="1600" dirty="0"/>
+              <a:t>Transfer learning using pre-trained ResNet50 model (PyTorch) by changing the number of output features from the last layer to 7 (number of tools).</a:t>
+            </a:r>
+          </a:p>
+          <a:p>
+            <a:pPr marL="285750" indent="-285750">
+              <a:buFont typeface="Arial" panose="020B0604020202020204" pitchFamily="34" charset="0"/>
+              <a:buChar char="•"/>
+            </a:pPr>
+            <a:r>
+              <a:rPr lang="en-DE" sz="1600" dirty="0"/>
+              <a:t>Idea based </a:t>
+            </a:r>
+            <a:r>
+              <a:rPr lang="en-GB" sz="1600" dirty="0"/>
+              <a:t>on the Cholecystectomy Cataract lecture from the Deep Learning for Medical Imaging (DLMI) course where the ZIB-Net was introduced.</a:t>
+            </a:r>
+            <a:endParaRPr lang="en-DE" sz="1600" dirty="0"/>
           </a:p>
         </p:txBody>
       </p:sp>
@@ -11425,10 +13135,91 @@
           <a:bodyPr/>
           <a:lstStyle/>
           <a:p>
-            <a:endParaRPr lang="en-DE"/>
+            <a:r>
+              <a:rPr lang="en-DE" sz="1600" dirty="0"/>
+              <a:t>AlexNet (ToolNet):</a:t>
+            </a:r>
+          </a:p>
+          <a:p>
+            <a:pPr marL="285750" indent="-285750">
+              <a:buFont typeface="Arial" panose="020B0604020202020204" pitchFamily="34" charset="0"/>
+              <a:buChar char="•"/>
+            </a:pPr>
+            <a:r>
+              <a:rPr lang="en-DE" sz="1600" dirty="0"/>
+              <a:t>Transfer learning using pre-trained AlexNet model (PyTorch) by changing the number of output features from the last layer to 7 (number of tools).</a:t>
+            </a:r>
+          </a:p>
+          <a:p>
+            <a:pPr marL="285750" indent="-285750">
+              <a:buFont typeface="Arial" panose="020B0604020202020204" pitchFamily="34" charset="0"/>
+              <a:buChar char="•"/>
+            </a:pPr>
+            <a:r>
+              <a:rPr lang="en-DE" sz="1600" dirty="0"/>
+              <a:t>Idea based on official </a:t>
+            </a:r>
+            <a:r>
+              <a:rPr lang="en-DE" sz="1600" dirty="0">
+                <a:hlinkClick r:id="rId3"/>
+              </a:rPr>
+              <a:t>Paper</a:t>
+            </a:r>
+            <a:r>
+              <a:rPr lang="en-DE" sz="1600" dirty="0"/>
+              <a:t> (EndoNet </a:t>
+            </a:r>
+            <a:r>
+              <a:rPr lang="en-DE" sz="1600" dirty="0">
+                <a:sym typeface="Wingdings" pitchFamily="2" charset="2"/>
+              </a:rPr>
+              <a:t>-- ToolNet to detect tools in a surgical video)</a:t>
+            </a:r>
+            <a:endParaRPr lang="en-DE" sz="1600" dirty="0"/>
+          </a:p>
+          <a:p>
+            <a:endParaRPr lang="en-DE" dirty="0"/>
           </a:p>
         </p:txBody>
       </p:sp>
+      <p:cxnSp>
+        <p:nvCxnSpPr>
+          <p:cNvPr id="7" name="Straight Connector 6">
+            <a:extLst>
+              <a:ext uri="{FF2B5EF4-FFF2-40B4-BE49-F238E27FC236}">
+                <a16:creationId xmlns:a16="http://schemas.microsoft.com/office/drawing/2014/main" id="{B2FA27B3-2CCD-D042-A4D5-60D241C763AA}"/>
+              </a:ext>
+            </a:extLst>
+          </p:cNvPr>
+          <p:cNvCxnSpPr>
+            <a:cxnSpLocks/>
+          </p:cNvCxnSpPr>
+          <p:nvPr/>
+        </p:nvCxnSpPr>
+        <p:spPr>
+          <a:xfrm flipV="1">
+            <a:off x="4572000" y="1131590"/>
+            <a:ext cx="0" cy="3600000"/>
+          </a:xfrm>
+          <a:prstGeom prst="line">
+            <a:avLst/>
+          </a:prstGeom>
+        </p:spPr>
+        <p:style>
+          <a:lnRef idx="1">
+            <a:schemeClr val="dk1"/>
+          </a:lnRef>
+          <a:fillRef idx="0">
+            <a:schemeClr val="dk1"/>
+          </a:fillRef>
+          <a:effectRef idx="0">
+            <a:schemeClr val="dk1"/>
+          </a:effectRef>
+          <a:fontRef idx="minor">
+            <a:schemeClr val="tx1"/>
+          </a:fontRef>
+        </p:style>
+      </p:cxnSp>
     </p:spTree>
     <p:extLst>
       <p:ext uri="{BB962C8B-B14F-4D97-AF65-F5344CB8AC3E}">
@@ -11439,10 +13230,1745 @@
   <p:clrMapOvr>
     <a:masterClrMapping/>
   </p:clrMapOvr>
+  <p:timing>
+    <p:tnLst>
+      <p:par>
+        <p:cTn id="1" dur="indefinite" restart="never" nodeType="tmRoot">
+          <p:childTnLst>
+            <p:seq concurrent="1" nextAc="seek">
+              <p:cTn id="2" dur="indefinite" nodeType="mainSeq">
+                <p:childTnLst>
+                  <p:par>
+                    <p:cTn id="3" fill="hold">
+                      <p:stCondLst>
+                        <p:cond delay="indefinite"/>
+                      </p:stCondLst>
+                      <p:childTnLst>
+                        <p:par>
+                          <p:cTn id="4" fill="hold">
+                            <p:stCondLst>
+                              <p:cond delay="0"/>
+                            </p:stCondLst>
+                            <p:childTnLst>
+                              <p:par>
+                                <p:cTn id="5" presetID="1" presetClass="entr" presetSubtype="0" fill="hold" grpId="0" nodeType="clickEffect">
+                                  <p:stCondLst>
+                                    <p:cond delay="0"/>
+                                  </p:stCondLst>
+                                  <p:childTnLst>
+                                    <p:set>
+                                      <p:cBhvr>
+                                        <p:cTn id="6" dur="1" fill="hold">
+                                          <p:stCondLst>
+                                            <p:cond delay="0"/>
+                                          </p:stCondLst>
+                                        </p:cTn>
+                                        <p:tgtEl>
+                                          <p:spTgt spid="3">
+                                            <p:txEl>
+                                              <p:pRg st="0" end="0"/>
+                                            </p:txEl>
+                                          </p:spTgt>
+                                        </p:tgtEl>
+                                        <p:attrNameLst>
+                                          <p:attrName>style.visibility</p:attrName>
+                                        </p:attrNameLst>
+                                      </p:cBhvr>
+                                      <p:to>
+                                        <p:strVal val="visible"/>
+                                      </p:to>
+                                    </p:set>
+                                  </p:childTnLst>
+                                </p:cTn>
+                              </p:par>
+                              <p:par>
+                                <p:cTn id="7" presetID="1" presetClass="entr" presetSubtype="0" fill="hold" grpId="0" nodeType="withEffect">
+                                  <p:stCondLst>
+                                    <p:cond delay="0"/>
+                                  </p:stCondLst>
+                                  <p:childTnLst>
+                                    <p:set>
+                                      <p:cBhvr>
+                                        <p:cTn id="8" dur="1" fill="hold">
+                                          <p:stCondLst>
+                                            <p:cond delay="0"/>
+                                          </p:stCondLst>
+                                        </p:cTn>
+                                        <p:tgtEl>
+                                          <p:spTgt spid="3">
+                                            <p:txEl>
+                                              <p:pRg st="1" end="1"/>
+                                            </p:txEl>
+                                          </p:spTgt>
+                                        </p:tgtEl>
+                                        <p:attrNameLst>
+                                          <p:attrName>style.visibility</p:attrName>
+                                        </p:attrNameLst>
+                                      </p:cBhvr>
+                                      <p:to>
+                                        <p:strVal val="visible"/>
+                                      </p:to>
+                                    </p:set>
+                                  </p:childTnLst>
+                                </p:cTn>
+                              </p:par>
+                              <p:par>
+                                <p:cTn id="9" presetID="1" presetClass="entr" presetSubtype="0" fill="hold" grpId="0" nodeType="withEffect">
+                                  <p:stCondLst>
+                                    <p:cond delay="0"/>
+                                  </p:stCondLst>
+                                  <p:childTnLst>
+                                    <p:set>
+                                      <p:cBhvr>
+                                        <p:cTn id="10" dur="1" fill="hold">
+                                          <p:stCondLst>
+                                            <p:cond delay="0"/>
+                                          </p:stCondLst>
+                                        </p:cTn>
+                                        <p:tgtEl>
+                                          <p:spTgt spid="3">
+                                            <p:txEl>
+                                              <p:pRg st="2" end="2"/>
+                                            </p:txEl>
+                                          </p:spTgt>
+                                        </p:tgtEl>
+                                        <p:attrNameLst>
+                                          <p:attrName>style.visibility</p:attrName>
+                                        </p:attrNameLst>
+                                      </p:cBhvr>
+                                      <p:to>
+                                        <p:strVal val="visible"/>
+                                      </p:to>
+                                    </p:set>
+                                  </p:childTnLst>
+                                </p:cTn>
+                              </p:par>
+                            </p:childTnLst>
+                          </p:cTn>
+                        </p:par>
+                      </p:childTnLst>
+                    </p:cTn>
+                  </p:par>
+                  <p:par>
+                    <p:cTn id="11" fill="hold">
+                      <p:stCondLst>
+                        <p:cond delay="indefinite"/>
+                      </p:stCondLst>
+                      <p:childTnLst>
+                        <p:par>
+                          <p:cTn id="12" fill="hold">
+                            <p:stCondLst>
+                              <p:cond delay="0"/>
+                            </p:stCondLst>
+                            <p:childTnLst>
+                              <p:par>
+                                <p:cTn id="13" presetID="1" presetClass="entr" presetSubtype="0" fill="hold" grpId="0" nodeType="clickEffect">
+                                  <p:stCondLst>
+                                    <p:cond delay="0"/>
+                                  </p:stCondLst>
+                                  <p:childTnLst>
+                                    <p:set>
+                                      <p:cBhvr>
+                                        <p:cTn id="14" dur="1" fill="hold">
+                                          <p:stCondLst>
+                                            <p:cond delay="0"/>
+                                          </p:stCondLst>
+                                        </p:cTn>
+                                        <p:tgtEl>
+                                          <p:spTgt spid="4">
+                                            <p:txEl>
+                                              <p:pRg st="0" end="0"/>
+                                            </p:txEl>
+                                          </p:spTgt>
+                                        </p:tgtEl>
+                                        <p:attrNameLst>
+                                          <p:attrName>style.visibility</p:attrName>
+                                        </p:attrNameLst>
+                                      </p:cBhvr>
+                                      <p:to>
+                                        <p:strVal val="visible"/>
+                                      </p:to>
+                                    </p:set>
+                                  </p:childTnLst>
+                                </p:cTn>
+                              </p:par>
+                              <p:par>
+                                <p:cTn id="15" presetID="1" presetClass="entr" presetSubtype="0" fill="hold" grpId="0" nodeType="withEffect">
+                                  <p:stCondLst>
+                                    <p:cond delay="0"/>
+                                  </p:stCondLst>
+                                  <p:childTnLst>
+                                    <p:set>
+                                      <p:cBhvr>
+                                        <p:cTn id="16" dur="1" fill="hold">
+                                          <p:stCondLst>
+                                            <p:cond delay="0"/>
+                                          </p:stCondLst>
+                                        </p:cTn>
+                                        <p:tgtEl>
+                                          <p:spTgt spid="4">
+                                            <p:txEl>
+                                              <p:pRg st="1" end="1"/>
+                                            </p:txEl>
+                                          </p:spTgt>
+                                        </p:tgtEl>
+                                        <p:attrNameLst>
+                                          <p:attrName>style.visibility</p:attrName>
+                                        </p:attrNameLst>
+                                      </p:cBhvr>
+                                      <p:to>
+                                        <p:strVal val="visible"/>
+                                      </p:to>
+                                    </p:set>
+                                  </p:childTnLst>
+                                </p:cTn>
+                              </p:par>
+                              <p:par>
+                                <p:cTn id="17" presetID="1" presetClass="entr" presetSubtype="0" fill="hold" grpId="0" nodeType="withEffect">
+                                  <p:stCondLst>
+                                    <p:cond delay="0"/>
+                                  </p:stCondLst>
+                                  <p:childTnLst>
+                                    <p:set>
+                                      <p:cBhvr>
+                                        <p:cTn id="18" dur="1" fill="hold">
+                                          <p:stCondLst>
+                                            <p:cond delay="0"/>
+                                          </p:stCondLst>
+                                        </p:cTn>
+                                        <p:tgtEl>
+                                          <p:spTgt spid="4">
+                                            <p:txEl>
+                                              <p:pRg st="2" end="2"/>
+                                            </p:txEl>
+                                          </p:spTgt>
+                                        </p:tgtEl>
+                                        <p:attrNameLst>
+                                          <p:attrName>style.visibility</p:attrName>
+                                        </p:attrNameLst>
+                                      </p:cBhvr>
+                                      <p:to>
+                                        <p:strVal val="visible"/>
+                                      </p:to>
+                                    </p:set>
+                                  </p:childTnLst>
+                                </p:cTn>
+                              </p:par>
+                              <p:par>
+                                <p:cTn id="19" presetID="1" presetClass="entr" presetSubtype="0" fill="hold" nodeType="withEffect">
+                                  <p:stCondLst>
+                                    <p:cond delay="0"/>
+                                  </p:stCondLst>
+                                  <p:childTnLst>
+                                    <p:set>
+                                      <p:cBhvr>
+                                        <p:cTn id="20" dur="1" fill="hold">
+                                          <p:stCondLst>
+                                            <p:cond delay="0"/>
+                                          </p:stCondLst>
+                                        </p:cTn>
+                                        <p:tgtEl>
+                                          <p:spTgt spid="7"/>
+                                        </p:tgtEl>
+                                        <p:attrNameLst>
+                                          <p:attrName>style.visibility</p:attrName>
+                                        </p:attrNameLst>
+                                      </p:cBhvr>
+                                      <p:to>
+                                        <p:strVal val="visible"/>
+                                      </p:to>
+                                    </p:set>
+                                  </p:childTnLst>
+                                </p:cTn>
+                              </p:par>
+                            </p:childTnLst>
+                          </p:cTn>
+                        </p:par>
+                      </p:childTnLst>
+                    </p:cTn>
+                  </p:par>
+                </p:childTnLst>
+              </p:cTn>
+              <p:prevCondLst>
+                <p:cond evt="onPrev" delay="0">
+                  <p:tgtEl>
+                    <p:sldTgt/>
+                  </p:tgtEl>
+                </p:cond>
+              </p:prevCondLst>
+              <p:nextCondLst>
+                <p:cond evt="onNext" delay="0">
+                  <p:tgtEl>
+                    <p:sldTgt/>
+                  </p:tgtEl>
+                </p:cond>
+              </p:nextCondLst>
+            </p:seq>
+          </p:childTnLst>
+        </p:cTn>
+      </p:par>
+    </p:tnLst>
+    <p:bldLst>
+      <p:bldP spid="3" grpId="0" uiExpand="1" build="p"/>
+      <p:bldP spid="4" grpId="0" uiExpand="1" build="p"/>
+    </p:bldLst>
+  </p:timing>
 </p:sld>
 </file>
 
 <file path=ppt/slides/slide8.xml><?xml version="1.0" encoding="utf-8"?>
+<p:sld xmlns:a="http://schemas.openxmlformats.org/drawingml/2006/main" xmlns:r="http://schemas.openxmlformats.org/officeDocument/2006/relationships" xmlns:p="http://schemas.openxmlformats.org/presentationml/2006/main">
+  <p:cSld>
+    <p:spTree>
+      <p:nvGrpSpPr>
+        <p:cNvPr id="1" name=""/>
+        <p:cNvGrpSpPr/>
+        <p:nvPr/>
+      </p:nvGrpSpPr>
+      <p:grpSpPr>
+        <a:xfrm>
+          <a:off x="0" y="0"/>
+          <a:ext cx="0" cy="0"/>
+          <a:chOff x="0" y="0"/>
+          <a:chExt cx="0" cy="0"/>
+        </a:xfrm>
+      </p:grpSpPr>
+      <p:sp>
+        <p:nvSpPr>
+          <p:cNvPr id="2" name="Title 1">
+            <a:extLst>
+              <a:ext uri="{FF2B5EF4-FFF2-40B4-BE49-F238E27FC236}">
+                <a16:creationId xmlns:a16="http://schemas.microsoft.com/office/drawing/2014/main" id="{DD40011F-06A9-3041-9E22-112104FE6225}"/>
+              </a:ext>
+            </a:extLst>
+          </p:cNvPr>
+          <p:cNvSpPr>
+            <a:spLocks noGrp="1"/>
+          </p:cNvSpPr>
+          <p:nvPr>
+            <p:ph type="title"/>
+          </p:nvPr>
+        </p:nvSpPr>
+        <p:spPr/>
+        <p:txBody>
+          <a:bodyPr/>
+          <a:lstStyle/>
+          <a:p>
+            <a:r>
+              <a:rPr lang="en-DE" dirty="0"/>
+              <a:t>Models: Configuration</a:t>
+            </a:r>
+          </a:p>
+        </p:txBody>
+      </p:sp>
+      <p:sp>
+        <p:nvSpPr>
+          <p:cNvPr id="3" name="Content Placeholder 2">
+            <a:extLst>
+              <a:ext uri="{FF2B5EF4-FFF2-40B4-BE49-F238E27FC236}">
+                <a16:creationId xmlns:a16="http://schemas.microsoft.com/office/drawing/2014/main" id="{0DD3F2C9-63B8-3449-A98F-BF228194AEC7}"/>
+              </a:ext>
+            </a:extLst>
+          </p:cNvPr>
+          <p:cNvSpPr>
+            <a:spLocks noGrp="1"/>
+          </p:cNvSpPr>
+          <p:nvPr>
+            <p:ph sz="half" idx="1"/>
+          </p:nvPr>
+        </p:nvSpPr>
+        <p:spPr>
+          <a:noFill/>
+          <a:ln>
+            <a:noFill/>
+          </a:ln>
+          <a:extLst>
+            <a:ext uri="{909E8E84-426E-40DD-AFC4-6F175D3DCCD1}">
+              <a14:hiddenFill xmlns:a14="http://schemas.microsoft.com/office/drawing/2010/main">
+                <a:solidFill>
+                  <a:srgbClr val="FFFFFF"/>
+                </a:solidFill>
+              </a14:hiddenFill>
+            </a:ext>
+            <a:ext uri="{91240B29-F687-4F45-9708-019B960494DF}">
+              <a14:hiddenLine xmlns:a14="http://schemas.microsoft.com/office/drawing/2010/main" w="9525">
+                <a:solidFill>
+                  <a:srgbClr val="000000"/>
+                </a:solidFill>
+                <a:miter lim="800000"/>
+                <a:headEnd/>
+                <a:tailEnd/>
+              </a14:hiddenLine>
+            </a:ext>
+          </a:extLst>
+        </p:spPr>
+        <p:txBody>
+          <a:bodyPr vert="horz" wrap="square" lIns="0" tIns="45720" rIns="0" bIns="45720" numCol="1" anchor="t" anchorCtr="0" compatLnSpc="1">
+            <a:prstTxWarp prst="textNoShape">
+              <a:avLst/>
+            </a:prstTxWarp>
+          </a:bodyPr>
+          <a:lstStyle/>
+          <a:p>
+            <a:r>
+              <a:rPr lang="en-DE" sz="1600" dirty="0"/>
+              <a:t>ResNet:</a:t>
+            </a:r>
+            <a:endParaRPr lang="en-DE" sz="1400" dirty="0"/>
+          </a:p>
+          <a:p>
+            <a:pPr marL="285750" indent="-285750">
+              <a:lnSpc>
+                <a:spcPct val="150000"/>
+              </a:lnSpc>
+              <a:spcBef>
+                <a:spcPts val="0"/>
+              </a:spcBef>
+              <a:spcAft>
+                <a:spcPts val="0"/>
+              </a:spcAft>
+              <a:buFont typeface="Arial" panose="020B0604020202020204" pitchFamily="34" charset="0"/>
+              <a:buChar char="•"/>
+            </a:pPr>
+            <a:r>
+              <a:rPr lang="en-GB" sz="1400" dirty="0" err="1"/>
+              <a:t>i</a:t>
+            </a:r>
+            <a:r>
+              <a:rPr lang="en-DE" sz="1400" dirty="0"/>
+              <a:t>nput_shape: (224, 224, 3)</a:t>
+            </a:r>
+          </a:p>
+          <a:p>
+            <a:pPr marL="285750" indent="-285750">
+              <a:lnSpc>
+                <a:spcPct val="150000"/>
+              </a:lnSpc>
+              <a:spcBef>
+                <a:spcPts val="0"/>
+              </a:spcBef>
+              <a:spcAft>
+                <a:spcPts val="0"/>
+              </a:spcAft>
+              <a:buFont typeface="Arial" panose="020B0604020202020204" pitchFamily="34" charset="0"/>
+              <a:buChar char="•"/>
+            </a:pPr>
+            <a:r>
+              <a:rPr lang="en-GB" sz="1400" dirty="0"/>
+              <a:t>l</a:t>
+            </a:r>
+            <a:r>
+              <a:rPr lang="en-DE" sz="1400" dirty="0"/>
+              <a:t>r: 0.0001</a:t>
+            </a:r>
+          </a:p>
+          <a:p>
+            <a:pPr marL="285750" indent="-285750">
+              <a:lnSpc>
+                <a:spcPct val="150000"/>
+              </a:lnSpc>
+              <a:spcBef>
+                <a:spcPts val="0"/>
+              </a:spcBef>
+              <a:spcAft>
+                <a:spcPts val="0"/>
+              </a:spcAft>
+              <a:buFont typeface="Arial" panose="020B0604020202020204" pitchFamily="34" charset="0"/>
+              <a:buChar char="•"/>
+            </a:pPr>
+            <a:r>
+              <a:rPr lang="en-GB" sz="1400" dirty="0"/>
+              <a:t>w</a:t>
+            </a:r>
+            <a:r>
+              <a:rPr lang="en-DE" sz="1400" dirty="0"/>
+              <a:t>eight_decay: 0.001</a:t>
+            </a:r>
+          </a:p>
+          <a:p>
+            <a:pPr marL="285750" indent="-285750">
+              <a:lnSpc>
+                <a:spcPct val="150000"/>
+              </a:lnSpc>
+              <a:spcBef>
+                <a:spcPts val="0"/>
+              </a:spcBef>
+              <a:spcAft>
+                <a:spcPts val="0"/>
+              </a:spcAft>
+              <a:buFont typeface="Arial" panose="020B0604020202020204" pitchFamily="34" charset="0"/>
+              <a:buChar char="•"/>
+            </a:pPr>
+            <a:r>
+              <a:rPr lang="en-GB" sz="1400" dirty="0"/>
+              <a:t>b</a:t>
+            </a:r>
+            <a:r>
+              <a:rPr lang="en-DE" sz="1400" dirty="0"/>
+              <a:t>atch_size: 32</a:t>
+            </a:r>
+          </a:p>
+          <a:p>
+            <a:pPr marL="285750" indent="-285750">
+              <a:lnSpc>
+                <a:spcPct val="150000"/>
+              </a:lnSpc>
+              <a:spcBef>
+                <a:spcPts val="0"/>
+              </a:spcBef>
+              <a:spcAft>
+                <a:spcPts val="0"/>
+              </a:spcAft>
+              <a:buFont typeface="Arial" panose="020B0604020202020204" pitchFamily="34" charset="0"/>
+              <a:buChar char="•"/>
+            </a:pPr>
+            <a:r>
+              <a:rPr lang="en-GB" sz="1400" dirty="0"/>
+              <a:t>n</a:t>
+            </a:r>
+            <a:r>
+              <a:rPr lang="en-DE" sz="1400" dirty="0"/>
+              <a:t>r_epochs: 300</a:t>
+            </a:r>
+          </a:p>
+          <a:p>
+            <a:pPr marL="285750" indent="-285750">
+              <a:lnSpc>
+                <a:spcPct val="150000"/>
+              </a:lnSpc>
+              <a:spcBef>
+                <a:spcPts val="0"/>
+              </a:spcBef>
+              <a:spcAft>
+                <a:spcPts val="0"/>
+              </a:spcAft>
+              <a:buFont typeface="Arial" panose="020B0604020202020204" pitchFamily="34" charset="0"/>
+              <a:buChar char="•"/>
+            </a:pPr>
+            <a:r>
+              <a:rPr lang="en-GB" sz="1400" dirty="0"/>
+              <a:t>r</a:t>
+            </a:r>
+            <a:r>
+              <a:rPr lang="en-DE" sz="1400" dirty="0"/>
+              <a:t>andom_frames: True</a:t>
+            </a:r>
+          </a:p>
+          <a:p>
+            <a:pPr marL="285750" indent="-285750">
+              <a:lnSpc>
+                <a:spcPct val="150000"/>
+              </a:lnSpc>
+              <a:spcBef>
+                <a:spcPts val="0"/>
+              </a:spcBef>
+              <a:spcAft>
+                <a:spcPts val="0"/>
+              </a:spcAft>
+              <a:buFont typeface="Arial" panose="020B0604020202020204" pitchFamily="34" charset="0"/>
+              <a:buChar char="•"/>
+            </a:pPr>
+            <a:r>
+              <a:rPr lang="en-GB" sz="1400" dirty="0"/>
+              <a:t>n</a:t>
+            </a:r>
+            <a:r>
+              <a:rPr lang="en-DE" sz="1400" dirty="0"/>
+              <a:t>r_video: 40</a:t>
+            </a:r>
+          </a:p>
+          <a:p>
+            <a:pPr marL="285750" indent="-285750">
+              <a:lnSpc>
+                <a:spcPct val="150000"/>
+              </a:lnSpc>
+              <a:spcBef>
+                <a:spcPts val="0"/>
+              </a:spcBef>
+              <a:spcAft>
+                <a:spcPts val="0"/>
+              </a:spcAft>
+              <a:buFont typeface="Arial" panose="020B0604020202020204" pitchFamily="34" charset="0"/>
+              <a:buChar char="•"/>
+            </a:pPr>
+            <a:r>
+              <a:rPr lang="en-GB" sz="1400" dirty="0"/>
+              <a:t>n</a:t>
+            </a:r>
+            <a:r>
+              <a:rPr lang="en-DE" sz="1400" dirty="0"/>
+              <a:t>r_frames: 2000</a:t>
+            </a:r>
+          </a:p>
+          <a:p>
+            <a:pPr marL="285750" indent="-285750">
+              <a:lnSpc>
+                <a:spcPct val="150000"/>
+              </a:lnSpc>
+              <a:spcBef>
+                <a:spcPts val="0"/>
+              </a:spcBef>
+              <a:spcAft>
+                <a:spcPts val="0"/>
+              </a:spcAft>
+              <a:buFont typeface="Arial" panose="020B0604020202020204" pitchFamily="34" charset="0"/>
+              <a:buChar char="•"/>
+            </a:pPr>
+            <a:r>
+              <a:rPr lang="en-GB" sz="1400" dirty="0"/>
+              <a:t>v</a:t>
+            </a:r>
+            <a:r>
+              <a:rPr lang="en-DE" sz="1400" dirty="0"/>
+              <a:t>al_ratio: 0.1</a:t>
+            </a:r>
+          </a:p>
+          <a:p>
+            <a:pPr marL="285750" indent="-285750">
+              <a:lnSpc>
+                <a:spcPct val="150000"/>
+              </a:lnSpc>
+              <a:spcBef>
+                <a:spcPts val="0"/>
+              </a:spcBef>
+              <a:spcAft>
+                <a:spcPts val="0"/>
+              </a:spcAft>
+              <a:buFont typeface="Arial" panose="020B0604020202020204" pitchFamily="34" charset="0"/>
+              <a:buChar char="•"/>
+            </a:pPr>
+            <a:r>
+              <a:rPr lang="en-GB" sz="1400" dirty="0"/>
+              <a:t>t</a:t>
+            </a:r>
+            <a:r>
+              <a:rPr lang="en-DE" sz="1400" dirty="0"/>
+              <a:t>est_ratio: 0.025</a:t>
+            </a:r>
+          </a:p>
+          <a:p>
+            <a:endParaRPr lang="en-DE" sz="1600" dirty="0"/>
+          </a:p>
+        </p:txBody>
+      </p:sp>
+      <p:sp>
+        <p:nvSpPr>
+          <p:cNvPr id="4" name="Content Placeholder 3">
+            <a:extLst>
+              <a:ext uri="{FF2B5EF4-FFF2-40B4-BE49-F238E27FC236}">
+                <a16:creationId xmlns:a16="http://schemas.microsoft.com/office/drawing/2014/main" id="{8C28C196-AC2B-744D-9978-282DEC170246}"/>
+              </a:ext>
+            </a:extLst>
+          </p:cNvPr>
+          <p:cNvSpPr>
+            <a:spLocks noGrp="1"/>
+          </p:cNvSpPr>
+          <p:nvPr>
+            <p:ph sz="half" idx="10"/>
+          </p:nvPr>
+        </p:nvSpPr>
+        <p:spPr>
+          <a:noFill/>
+          <a:ln>
+            <a:noFill/>
+          </a:ln>
+          <a:extLst>
+            <a:ext uri="{909E8E84-426E-40DD-AFC4-6F175D3DCCD1}">
+              <a14:hiddenFill xmlns:a14="http://schemas.microsoft.com/office/drawing/2010/main">
+                <a:solidFill>
+                  <a:srgbClr val="FFFFFF"/>
+                </a:solidFill>
+              </a14:hiddenFill>
+            </a:ext>
+            <a:ext uri="{91240B29-F687-4F45-9708-019B960494DF}">
+              <a14:hiddenLine xmlns:a14="http://schemas.microsoft.com/office/drawing/2010/main" w="9525">
+                <a:solidFill>
+                  <a:srgbClr val="000000"/>
+                </a:solidFill>
+                <a:miter lim="800000"/>
+                <a:headEnd/>
+                <a:tailEnd/>
+              </a14:hiddenLine>
+            </a:ext>
+          </a:extLst>
+        </p:spPr>
+        <p:txBody>
+          <a:bodyPr vert="horz" wrap="square" lIns="0" tIns="45720" rIns="0" bIns="45720" numCol="1" anchor="t" anchorCtr="0" compatLnSpc="1">
+            <a:prstTxWarp prst="textNoShape">
+              <a:avLst/>
+            </a:prstTxWarp>
+          </a:bodyPr>
+          <a:lstStyle/>
+          <a:p>
+            <a:r>
+              <a:rPr lang="en-DE" sz="1600" dirty="0"/>
+              <a:t>AlexNet (ToolNet):</a:t>
+            </a:r>
+            <a:endParaRPr lang="en-DE" sz="1400" dirty="0"/>
+          </a:p>
+          <a:p>
+            <a:pPr marL="285750" indent="-285750">
+              <a:lnSpc>
+                <a:spcPct val="150000"/>
+              </a:lnSpc>
+              <a:spcBef>
+                <a:spcPts val="0"/>
+              </a:spcBef>
+              <a:spcAft>
+                <a:spcPts val="0"/>
+              </a:spcAft>
+              <a:buFont typeface="Arial" panose="020B0604020202020204" pitchFamily="34" charset="0"/>
+              <a:buChar char="•"/>
+            </a:pPr>
+            <a:r>
+              <a:rPr lang="en-GB" sz="1400" dirty="0"/>
+              <a:t>i</a:t>
+            </a:r>
+            <a:r>
+              <a:rPr lang="en-DE" sz="1400" dirty="0"/>
+              <a:t>nput_shape: (224, 224, 3)</a:t>
+            </a:r>
+          </a:p>
+          <a:p>
+            <a:pPr marL="285750" indent="-285750">
+              <a:lnSpc>
+                <a:spcPct val="150000"/>
+              </a:lnSpc>
+              <a:spcBef>
+                <a:spcPts val="0"/>
+              </a:spcBef>
+              <a:spcAft>
+                <a:spcPts val="0"/>
+              </a:spcAft>
+              <a:buFont typeface="Arial" panose="020B0604020202020204" pitchFamily="34" charset="0"/>
+              <a:buChar char="•"/>
+            </a:pPr>
+            <a:r>
+              <a:rPr lang="en-GB" sz="1400" dirty="0"/>
+              <a:t>l</a:t>
+            </a:r>
+            <a:r>
+              <a:rPr lang="en-DE" sz="1400" dirty="0"/>
+              <a:t>r: 0.0001</a:t>
+            </a:r>
+          </a:p>
+          <a:p>
+            <a:pPr marL="285750" indent="-285750">
+              <a:lnSpc>
+                <a:spcPct val="150000"/>
+              </a:lnSpc>
+              <a:spcBef>
+                <a:spcPts val="0"/>
+              </a:spcBef>
+              <a:spcAft>
+                <a:spcPts val="0"/>
+              </a:spcAft>
+              <a:buFont typeface="Arial" panose="020B0604020202020204" pitchFamily="34" charset="0"/>
+              <a:buChar char="•"/>
+            </a:pPr>
+            <a:r>
+              <a:rPr lang="en-GB" sz="1400" dirty="0"/>
+              <a:t>w</a:t>
+            </a:r>
+            <a:r>
+              <a:rPr lang="en-DE" sz="1400" dirty="0"/>
+              <a:t>eight_decay: 0.001</a:t>
+            </a:r>
+          </a:p>
+          <a:p>
+            <a:pPr marL="285750" indent="-285750">
+              <a:lnSpc>
+                <a:spcPct val="150000"/>
+              </a:lnSpc>
+              <a:spcBef>
+                <a:spcPts val="0"/>
+              </a:spcBef>
+              <a:spcAft>
+                <a:spcPts val="0"/>
+              </a:spcAft>
+              <a:buFont typeface="Arial" panose="020B0604020202020204" pitchFamily="34" charset="0"/>
+              <a:buChar char="•"/>
+            </a:pPr>
+            <a:r>
+              <a:rPr lang="en-GB" sz="1400" dirty="0"/>
+              <a:t>b</a:t>
+            </a:r>
+            <a:r>
+              <a:rPr lang="en-DE" sz="1400" dirty="0"/>
+              <a:t>atch_size: 32</a:t>
+            </a:r>
+          </a:p>
+          <a:p>
+            <a:pPr marL="285750" indent="-285750">
+              <a:lnSpc>
+                <a:spcPct val="150000"/>
+              </a:lnSpc>
+              <a:spcBef>
+                <a:spcPts val="0"/>
+              </a:spcBef>
+              <a:spcAft>
+                <a:spcPts val="0"/>
+              </a:spcAft>
+              <a:buFont typeface="Arial" panose="020B0604020202020204" pitchFamily="34" charset="0"/>
+              <a:buChar char="•"/>
+            </a:pPr>
+            <a:r>
+              <a:rPr lang="en-GB" sz="1400" dirty="0"/>
+              <a:t>n</a:t>
+            </a:r>
+            <a:r>
+              <a:rPr lang="en-DE" sz="1400" dirty="0"/>
+              <a:t>r_epochs: 300</a:t>
+            </a:r>
+          </a:p>
+          <a:p>
+            <a:pPr marL="285750" indent="-285750">
+              <a:lnSpc>
+                <a:spcPct val="150000"/>
+              </a:lnSpc>
+              <a:spcBef>
+                <a:spcPts val="0"/>
+              </a:spcBef>
+              <a:spcAft>
+                <a:spcPts val="0"/>
+              </a:spcAft>
+              <a:buFont typeface="Arial" panose="020B0604020202020204" pitchFamily="34" charset="0"/>
+              <a:buChar char="•"/>
+            </a:pPr>
+            <a:r>
+              <a:rPr lang="en-GB" sz="1400" dirty="0"/>
+              <a:t>r</a:t>
+            </a:r>
+            <a:r>
+              <a:rPr lang="en-DE" sz="1400" dirty="0"/>
+              <a:t>andom_frames: True</a:t>
+            </a:r>
+          </a:p>
+          <a:p>
+            <a:pPr marL="285750" indent="-285750">
+              <a:lnSpc>
+                <a:spcPct val="150000"/>
+              </a:lnSpc>
+              <a:spcBef>
+                <a:spcPts val="0"/>
+              </a:spcBef>
+              <a:spcAft>
+                <a:spcPts val="0"/>
+              </a:spcAft>
+              <a:buFont typeface="Arial" panose="020B0604020202020204" pitchFamily="34" charset="0"/>
+              <a:buChar char="•"/>
+            </a:pPr>
+            <a:r>
+              <a:rPr lang="en-GB" sz="1400" dirty="0"/>
+              <a:t>n</a:t>
+            </a:r>
+            <a:r>
+              <a:rPr lang="en-DE" sz="1400" dirty="0"/>
+              <a:t>r_video: 40</a:t>
+            </a:r>
+          </a:p>
+          <a:p>
+            <a:pPr marL="285750" indent="-285750">
+              <a:lnSpc>
+                <a:spcPct val="150000"/>
+              </a:lnSpc>
+              <a:spcBef>
+                <a:spcPts val="0"/>
+              </a:spcBef>
+              <a:spcAft>
+                <a:spcPts val="0"/>
+              </a:spcAft>
+              <a:buFont typeface="Arial" panose="020B0604020202020204" pitchFamily="34" charset="0"/>
+              <a:buChar char="•"/>
+            </a:pPr>
+            <a:r>
+              <a:rPr lang="en-GB" sz="1400" dirty="0"/>
+              <a:t>n</a:t>
+            </a:r>
+            <a:r>
+              <a:rPr lang="en-DE" sz="1400" dirty="0"/>
+              <a:t>r_frames: 2000</a:t>
+            </a:r>
+          </a:p>
+          <a:p>
+            <a:pPr marL="285750" indent="-285750">
+              <a:lnSpc>
+                <a:spcPct val="150000"/>
+              </a:lnSpc>
+              <a:spcBef>
+                <a:spcPts val="0"/>
+              </a:spcBef>
+              <a:spcAft>
+                <a:spcPts val="0"/>
+              </a:spcAft>
+              <a:buFont typeface="Arial" panose="020B0604020202020204" pitchFamily="34" charset="0"/>
+              <a:buChar char="•"/>
+            </a:pPr>
+            <a:r>
+              <a:rPr lang="en-GB" sz="1400" dirty="0"/>
+              <a:t>v</a:t>
+            </a:r>
+            <a:r>
+              <a:rPr lang="en-DE" sz="1400" dirty="0"/>
+              <a:t>al_ratio: 0.1</a:t>
+            </a:r>
+          </a:p>
+          <a:p>
+            <a:pPr marL="285750" indent="-285750">
+              <a:lnSpc>
+                <a:spcPct val="150000"/>
+              </a:lnSpc>
+              <a:spcBef>
+                <a:spcPts val="0"/>
+              </a:spcBef>
+              <a:spcAft>
+                <a:spcPts val="0"/>
+              </a:spcAft>
+              <a:buFont typeface="Arial" panose="020B0604020202020204" pitchFamily="34" charset="0"/>
+              <a:buChar char="•"/>
+            </a:pPr>
+            <a:r>
+              <a:rPr lang="en-GB" sz="1400" dirty="0"/>
+              <a:t>t</a:t>
+            </a:r>
+            <a:r>
+              <a:rPr lang="en-DE" sz="1400" dirty="0"/>
+              <a:t>est_ratio: 0.025</a:t>
+            </a:r>
+          </a:p>
+        </p:txBody>
+      </p:sp>
+      <p:cxnSp>
+        <p:nvCxnSpPr>
+          <p:cNvPr id="6" name="Straight Connector 5">
+            <a:extLst>
+              <a:ext uri="{FF2B5EF4-FFF2-40B4-BE49-F238E27FC236}">
+                <a16:creationId xmlns:a16="http://schemas.microsoft.com/office/drawing/2014/main" id="{736E2483-74C0-8841-A2A3-5A38BEAE26FB}"/>
+              </a:ext>
+            </a:extLst>
+          </p:cNvPr>
+          <p:cNvCxnSpPr>
+            <a:cxnSpLocks/>
+          </p:cNvCxnSpPr>
+          <p:nvPr/>
+        </p:nvCxnSpPr>
+        <p:spPr>
+          <a:xfrm flipV="1">
+            <a:off x="4572000" y="1131590"/>
+            <a:ext cx="0" cy="3600000"/>
+          </a:xfrm>
+          <a:prstGeom prst="line">
+            <a:avLst/>
+          </a:prstGeom>
+        </p:spPr>
+        <p:style>
+          <a:lnRef idx="1">
+            <a:schemeClr val="dk1"/>
+          </a:lnRef>
+          <a:fillRef idx="0">
+            <a:schemeClr val="dk1"/>
+          </a:fillRef>
+          <a:effectRef idx="0">
+            <a:schemeClr val="dk1"/>
+          </a:effectRef>
+          <a:fontRef idx="minor">
+            <a:schemeClr val="tx1"/>
+          </a:fontRef>
+        </p:style>
+      </p:cxnSp>
+    </p:spTree>
+    <p:extLst>
+      <p:ext uri="{BB962C8B-B14F-4D97-AF65-F5344CB8AC3E}">
+        <p14:creationId xmlns:p14="http://schemas.microsoft.com/office/powerpoint/2010/main" val="2185779400"/>
+      </p:ext>
+    </p:extLst>
+  </p:cSld>
+  <p:clrMapOvr>
+    <a:masterClrMapping/>
+  </p:clrMapOvr>
+  <p:timing>
+    <p:tnLst>
+      <p:par>
+        <p:cTn id="1" dur="indefinite" restart="never" nodeType="tmRoot">
+          <p:childTnLst>
+            <p:seq concurrent="1" nextAc="seek">
+              <p:cTn id="2" dur="indefinite" nodeType="mainSeq">
+                <p:childTnLst>
+                  <p:par>
+                    <p:cTn id="3" fill="hold">
+                      <p:stCondLst>
+                        <p:cond delay="indefinite"/>
+                      </p:stCondLst>
+                      <p:childTnLst>
+                        <p:par>
+                          <p:cTn id="4" fill="hold">
+                            <p:stCondLst>
+                              <p:cond delay="0"/>
+                            </p:stCondLst>
+                            <p:childTnLst>
+                              <p:par>
+                                <p:cTn id="5" presetID="1" presetClass="entr" presetSubtype="0" fill="hold" grpId="0" nodeType="clickEffect">
+                                  <p:stCondLst>
+                                    <p:cond delay="0"/>
+                                  </p:stCondLst>
+                                  <p:childTnLst>
+                                    <p:set>
+                                      <p:cBhvr>
+                                        <p:cTn id="6" dur="1" fill="hold">
+                                          <p:stCondLst>
+                                            <p:cond delay="0"/>
+                                          </p:stCondLst>
+                                        </p:cTn>
+                                        <p:tgtEl>
+                                          <p:spTgt spid="3">
+                                            <p:txEl>
+                                              <p:pRg st="0" end="0"/>
+                                            </p:txEl>
+                                          </p:spTgt>
+                                        </p:tgtEl>
+                                        <p:attrNameLst>
+                                          <p:attrName>style.visibility</p:attrName>
+                                        </p:attrNameLst>
+                                      </p:cBhvr>
+                                      <p:to>
+                                        <p:strVal val="visible"/>
+                                      </p:to>
+                                    </p:set>
+                                  </p:childTnLst>
+                                </p:cTn>
+                              </p:par>
+                              <p:par>
+                                <p:cTn id="7" presetID="1" presetClass="entr" presetSubtype="0" fill="hold" grpId="0" nodeType="withEffect">
+                                  <p:stCondLst>
+                                    <p:cond delay="0"/>
+                                  </p:stCondLst>
+                                  <p:childTnLst>
+                                    <p:set>
+                                      <p:cBhvr>
+                                        <p:cTn id="8" dur="1" fill="hold">
+                                          <p:stCondLst>
+                                            <p:cond delay="0"/>
+                                          </p:stCondLst>
+                                        </p:cTn>
+                                        <p:tgtEl>
+                                          <p:spTgt spid="3">
+                                            <p:txEl>
+                                              <p:pRg st="1" end="1"/>
+                                            </p:txEl>
+                                          </p:spTgt>
+                                        </p:tgtEl>
+                                        <p:attrNameLst>
+                                          <p:attrName>style.visibility</p:attrName>
+                                        </p:attrNameLst>
+                                      </p:cBhvr>
+                                      <p:to>
+                                        <p:strVal val="visible"/>
+                                      </p:to>
+                                    </p:set>
+                                  </p:childTnLst>
+                                </p:cTn>
+                              </p:par>
+                              <p:par>
+                                <p:cTn id="9" presetID="1" presetClass="entr" presetSubtype="0" fill="hold" grpId="0" nodeType="withEffect">
+                                  <p:stCondLst>
+                                    <p:cond delay="0"/>
+                                  </p:stCondLst>
+                                  <p:childTnLst>
+                                    <p:set>
+                                      <p:cBhvr>
+                                        <p:cTn id="10" dur="1" fill="hold">
+                                          <p:stCondLst>
+                                            <p:cond delay="0"/>
+                                          </p:stCondLst>
+                                        </p:cTn>
+                                        <p:tgtEl>
+                                          <p:spTgt spid="3">
+                                            <p:txEl>
+                                              <p:pRg st="2" end="2"/>
+                                            </p:txEl>
+                                          </p:spTgt>
+                                        </p:tgtEl>
+                                        <p:attrNameLst>
+                                          <p:attrName>style.visibility</p:attrName>
+                                        </p:attrNameLst>
+                                      </p:cBhvr>
+                                      <p:to>
+                                        <p:strVal val="visible"/>
+                                      </p:to>
+                                    </p:set>
+                                  </p:childTnLst>
+                                </p:cTn>
+                              </p:par>
+                              <p:par>
+                                <p:cTn id="11" presetID="1" presetClass="entr" presetSubtype="0" fill="hold" grpId="0" nodeType="withEffect">
+                                  <p:stCondLst>
+                                    <p:cond delay="0"/>
+                                  </p:stCondLst>
+                                  <p:childTnLst>
+                                    <p:set>
+                                      <p:cBhvr>
+                                        <p:cTn id="12" dur="1" fill="hold">
+                                          <p:stCondLst>
+                                            <p:cond delay="0"/>
+                                          </p:stCondLst>
+                                        </p:cTn>
+                                        <p:tgtEl>
+                                          <p:spTgt spid="3">
+                                            <p:txEl>
+                                              <p:pRg st="3" end="3"/>
+                                            </p:txEl>
+                                          </p:spTgt>
+                                        </p:tgtEl>
+                                        <p:attrNameLst>
+                                          <p:attrName>style.visibility</p:attrName>
+                                        </p:attrNameLst>
+                                      </p:cBhvr>
+                                      <p:to>
+                                        <p:strVal val="visible"/>
+                                      </p:to>
+                                    </p:set>
+                                  </p:childTnLst>
+                                </p:cTn>
+                              </p:par>
+                              <p:par>
+                                <p:cTn id="13" presetID="1" presetClass="entr" presetSubtype="0" fill="hold" grpId="0" nodeType="withEffect">
+                                  <p:stCondLst>
+                                    <p:cond delay="0"/>
+                                  </p:stCondLst>
+                                  <p:childTnLst>
+                                    <p:set>
+                                      <p:cBhvr>
+                                        <p:cTn id="14" dur="1" fill="hold">
+                                          <p:stCondLst>
+                                            <p:cond delay="0"/>
+                                          </p:stCondLst>
+                                        </p:cTn>
+                                        <p:tgtEl>
+                                          <p:spTgt spid="3">
+                                            <p:txEl>
+                                              <p:pRg st="4" end="4"/>
+                                            </p:txEl>
+                                          </p:spTgt>
+                                        </p:tgtEl>
+                                        <p:attrNameLst>
+                                          <p:attrName>style.visibility</p:attrName>
+                                        </p:attrNameLst>
+                                      </p:cBhvr>
+                                      <p:to>
+                                        <p:strVal val="visible"/>
+                                      </p:to>
+                                    </p:set>
+                                  </p:childTnLst>
+                                </p:cTn>
+                              </p:par>
+                              <p:par>
+                                <p:cTn id="15" presetID="1" presetClass="entr" presetSubtype="0" fill="hold" grpId="0" nodeType="withEffect">
+                                  <p:stCondLst>
+                                    <p:cond delay="0"/>
+                                  </p:stCondLst>
+                                  <p:childTnLst>
+                                    <p:set>
+                                      <p:cBhvr>
+                                        <p:cTn id="16" dur="1" fill="hold">
+                                          <p:stCondLst>
+                                            <p:cond delay="0"/>
+                                          </p:stCondLst>
+                                        </p:cTn>
+                                        <p:tgtEl>
+                                          <p:spTgt spid="3">
+                                            <p:txEl>
+                                              <p:pRg st="5" end="5"/>
+                                            </p:txEl>
+                                          </p:spTgt>
+                                        </p:tgtEl>
+                                        <p:attrNameLst>
+                                          <p:attrName>style.visibility</p:attrName>
+                                        </p:attrNameLst>
+                                      </p:cBhvr>
+                                      <p:to>
+                                        <p:strVal val="visible"/>
+                                      </p:to>
+                                    </p:set>
+                                  </p:childTnLst>
+                                </p:cTn>
+                              </p:par>
+                              <p:par>
+                                <p:cTn id="17" presetID="1" presetClass="entr" presetSubtype="0" fill="hold" grpId="0" nodeType="withEffect">
+                                  <p:stCondLst>
+                                    <p:cond delay="0"/>
+                                  </p:stCondLst>
+                                  <p:childTnLst>
+                                    <p:set>
+                                      <p:cBhvr>
+                                        <p:cTn id="18" dur="1" fill="hold">
+                                          <p:stCondLst>
+                                            <p:cond delay="0"/>
+                                          </p:stCondLst>
+                                        </p:cTn>
+                                        <p:tgtEl>
+                                          <p:spTgt spid="3">
+                                            <p:txEl>
+                                              <p:pRg st="6" end="6"/>
+                                            </p:txEl>
+                                          </p:spTgt>
+                                        </p:tgtEl>
+                                        <p:attrNameLst>
+                                          <p:attrName>style.visibility</p:attrName>
+                                        </p:attrNameLst>
+                                      </p:cBhvr>
+                                      <p:to>
+                                        <p:strVal val="visible"/>
+                                      </p:to>
+                                    </p:set>
+                                  </p:childTnLst>
+                                </p:cTn>
+                              </p:par>
+                              <p:par>
+                                <p:cTn id="19" presetID="1" presetClass="entr" presetSubtype="0" fill="hold" grpId="0" nodeType="withEffect">
+                                  <p:stCondLst>
+                                    <p:cond delay="0"/>
+                                  </p:stCondLst>
+                                  <p:childTnLst>
+                                    <p:set>
+                                      <p:cBhvr>
+                                        <p:cTn id="20" dur="1" fill="hold">
+                                          <p:stCondLst>
+                                            <p:cond delay="0"/>
+                                          </p:stCondLst>
+                                        </p:cTn>
+                                        <p:tgtEl>
+                                          <p:spTgt spid="3">
+                                            <p:txEl>
+                                              <p:pRg st="7" end="7"/>
+                                            </p:txEl>
+                                          </p:spTgt>
+                                        </p:tgtEl>
+                                        <p:attrNameLst>
+                                          <p:attrName>style.visibility</p:attrName>
+                                        </p:attrNameLst>
+                                      </p:cBhvr>
+                                      <p:to>
+                                        <p:strVal val="visible"/>
+                                      </p:to>
+                                    </p:set>
+                                  </p:childTnLst>
+                                </p:cTn>
+                              </p:par>
+                              <p:par>
+                                <p:cTn id="21" presetID="1" presetClass="entr" presetSubtype="0" fill="hold" grpId="0" nodeType="withEffect">
+                                  <p:stCondLst>
+                                    <p:cond delay="0"/>
+                                  </p:stCondLst>
+                                  <p:childTnLst>
+                                    <p:set>
+                                      <p:cBhvr>
+                                        <p:cTn id="22" dur="1" fill="hold">
+                                          <p:stCondLst>
+                                            <p:cond delay="0"/>
+                                          </p:stCondLst>
+                                        </p:cTn>
+                                        <p:tgtEl>
+                                          <p:spTgt spid="3">
+                                            <p:txEl>
+                                              <p:pRg st="8" end="8"/>
+                                            </p:txEl>
+                                          </p:spTgt>
+                                        </p:tgtEl>
+                                        <p:attrNameLst>
+                                          <p:attrName>style.visibility</p:attrName>
+                                        </p:attrNameLst>
+                                      </p:cBhvr>
+                                      <p:to>
+                                        <p:strVal val="visible"/>
+                                      </p:to>
+                                    </p:set>
+                                  </p:childTnLst>
+                                </p:cTn>
+                              </p:par>
+                              <p:par>
+                                <p:cTn id="23" presetID="1" presetClass="entr" presetSubtype="0" fill="hold" grpId="0" nodeType="withEffect">
+                                  <p:stCondLst>
+                                    <p:cond delay="0"/>
+                                  </p:stCondLst>
+                                  <p:childTnLst>
+                                    <p:set>
+                                      <p:cBhvr>
+                                        <p:cTn id="24" dur="1" fill="hold">
+                                          <p:stCondLst>
+                                            <p:cond delay="0"/>
+                                          </p:stCondLst>
+                                        </p:cTn>
+                                        <p:tgtEl>
+                                          <p:spTgt spid="3">
+                                            <p:txEl>
+                                              <p:pRg st="9" end="9"/>
+                                            </p:txEl>
+                                          </p:spTgt>
+                                        </p:tgtEl>
+                                        <p:attrNameLst>
+                                          <p:attrName>style.visibility</p:attrName>
+                                        </p:attrNameLst>
+                                      </p:cBhvr>
+                                      <p:to>
+                                        <p:strVal val="visible"/>
+                                      </p:to>
+                                    </p:set>
+                                  </p:childTnLst>
+                                </p:cTn>
+                              </p:par>
+                              <p:par>
+                                <p:cTn id="25" presetID="1" presetClass="entr" presetSubtype="0" fill="hold" grpId="0" nodeType="withEffect">
+                                  <p:stCondLst>
+                                    <p:cond delay="0"/>
+                                  </p:stCondLst>
+                                  <p:childTnLst>
+                                    <p:set>
+                                      <p:cBhvr>
+                                        <p:cTn id="26" dur="1" fill="hold">
+                                          <p:stCondLst>
+                                            <p:cond delay="0"/>
+                                          </p:stCondLst>
+                                        </p:cTn>
+                                        <p:tgtEl>
+                                          <p:spTgt spid="3">
+                                            <p:txEl>
+                                              <p:pRg st="10" end="10"/>
+                                            </p:txEl>
+                                          </p:spTgt>
+                                        </p:tgtEl>
+                                        <p:attrNameLst>
+                                          <p:attrName>style.visibility</p:attrName>
+                                        </p:attrNameLst>
+                                      </p:cBhvr>
+                                      <p:to>
+                                        <p:strVal val="visible"/>
+                                      </p:to>
+                                    </p:set>
+                                  </p:childTnLst>
+                                </p:cTn>
+                              </p:par>
+                            </p:childTnLst>
+                          </p:cTn>
+                        </p:par>
+                      </p:childTnLst>
+                    </p:cTn>
+                  </p:par>
+                  <p:par>
+                    <p:cTn id="27" fill="hold">
+                      <p:stCondLst>
+                        <p:cond delay="indefinite"/>
+                      </p:stCondLst>
+                      <p:childTnLst>
+                        <p:par>
+                          <p:cTn id="28" fill="hold">
+                            <p:stCondLst>
+                              <p:cond delay="0"/>
+                            </p:stCondLst>
+                            <p:childTnLst>
+                              <p:par>
+                                <p:cTn id="29" presetID="1" presetClass="entr" presetSubtype="0" fill="hold" nodeType="clickEffect">
+                                  <p:stCondLst>
+                                    <p:cond delay="0"/>
+                                  </p:stCondLst>
+                                  <p:childTnLst>
+                                    <p:set>
+                                      <p:cBhvr>
+                                        <p:cTn id="30" dur="1" fill="hold">
+                                          <p:stCondLst>
+                                            <p:cond delay="0"/>
+                                          </p:stCondLst>
+                                        </p:cTn>
+                                        <p:tgtEl>
+                                          <p:spTgt spid="6"/>
+                                        </p:tgtEl>
+                                        <p:attrNameLst>
+                                          <p:attrName>style.visibility</p:attrName>
+                                        </p:attrNameLst>
+                                      </p:cBhvr>
+                                      <p:to>
+                                        <p:strVal val="visible"/>
+                                      </p:to>
+                                    </p:set>
+                                  </p:childTnLst>
+                                </p:cTn>
+                              </p:par>
+                              <p:par>
+                                <p:cTn id="31" presetID="1" presetClass="entr" presetSubtype="0" fill="hold" grpId="0" nodeType="withEffect">
+                                  <p:stCondLst>
+                                    <p:cond delay="0"/>
+                                  </p:stCondLst>
+                                  <p:childTnLst>
+                                    <p:set>
+                                      <p:cBhvr>
+                                        <p:cTn id="32" dur="1" fill="hold">
+                                          <p:stCondLst>
+                                            <p:cond delay="0"/>
+                                          </p:stCondLst>
+                                        </p:cTn>
+                                        <p:tgtEl>
+                                          <p:spTgt spid="4">
+                                            <p:txEl>
+                                              <p:pRg st="0" end="0"/>
+                                            </p:txEl>
+                                          </p:spTgt>
+                                        </p:tgtEl>
+                                        <p:attrNameLst>
+                                          <p:attrName>style.visibility</p:attrName>
+                                        </p:attrNameLst>
+                                      </p:cBhvr>
+                                      <p:to>
+                                        <p:strVal val="visible"/>
+                                      </p:to>
+                                    </p:set>
+                                  </p:childTnLst>
+                                </p:cTn>
+                              </p:par>
+                              <p:par>
+                                <p:cTn id="33" presetID="1" presetClass="entr" presetSubtype="0" fill="hold" grpId="0" nodeType="withEffect">
+                                  <p:stCondLst>
+                                    <p:cond delay="0"/>
+                                  </p:stCondLst>
+                                  <p:childTnLst>
+                                    <p:set>
+                                      <p:cBhvr>
+                                        <p:cTn id="34" dur="1" fill="hold">
+                                          <p:stCondLst>
+                                            <p:cond delay="0"/>
+                                          </p:stCondLst>
+                                        </p:cTn>
+                                        <p:tgtEl>
+                                          <p:spTgt spid="4">
+                                            <p:txEl>
+                                              <p:pRg st="1" end="1"/>
+                                            </p:txEl>
+                                          </p:spTgt>
+                                        </p:tgtEl>
+                                        <p:attrNameLst>
+                                          <p:attrName>style.visibility</p:attrName>
+                                        </p:attrNameLst>
+                                      </p:cBhvr>
+                                      <p:to>
+                                        <p:strVal val="visible"/>
+                                      </p:to>
+                                    </p:set>
+                                  </p:childTnLst>
+                                </p:cTn>
+                              </p:par>
+                              <p:par>
+                                <p:cTn id="35" presetID="1" presetClass="entr" presetSubtype="0" fill="hold" grpId="0" nodeType="withEffect">
+                                  <p:stCondLst>
+                                    <p:cond delay="0"/>
+                                  </p:stCondLst>
+                                  <p:childTnLst>
+                                    <p:set>
+                                      <p:cBhvr>
+                                        <p:cTn id="36" dur="1" fill="hold">
+                                          <p:stCondLst>
+                                            <p:cond delay="0"/>
+                                          </p:stCondLst>
+                                        </p:cTn>
+                                        <p:tgtEl>
+                                          <p:spTgt spid="4">
+                                            <p:txEl>
+                                              <p:pRg st="2" end="2"/>
+                                            </p:txEl>
+                                          </p:spTgt>
+                                        </p:tgtEl>
+                                        <p:attrNameLst>
+                                          <p:attrName>style.visibility</p:attrName>
+                                        </p:attrNameLst>
+                                      </p:cBhvr>
+                                      <p:to>
+                                        <p:strVal val="visible"/>
+                                      </p:to>
+                                    </p:set>
+                                  </p:childTnLst>
+                                </p:cTn>
+                              </p:par>
+                              <p:par>
+                                <p:cTn id="37" presetID="1" presetClass="entr" presetSubtype="0" fill="hold" grpId="0" nodeType="withEffect">
+                                  <p:stCondLst>
+                                    <p:cond delay="0"/>
+                                  </p:stCondLst>
+                                  <p:childTnLst>
+                                    <p:set>
+                                      <p:cBhvr>
+                                        <p:cTn id="38" dur="1" fill="hold">
+                                          <p:stCondLst>
+                                            <p:cond delay="0"/>
+                                          </p:stCondLst>
+                                        </p:cTn>
+                                        <p:tgtEl>
+                                          <p:spTgt spid="4">
+                                            <p:txEl>
+                                              <p:pRg st="3" end="3"/>
+                                            </p:txEl>
+                                          </p:spTgt>
+                                        </p:tgtEl>
+                                        <p:attrNameLst>
+                                          <p:attrName>style.visibility</p:attrName>
+                                        </p:attrNameLst>
+                                      </p:cBhvr>
+                                      <p:to>
+                                        <p:strVal val="visible"/>
+                                      </p:to>
+                                    </p:set>
+                                  </p:childTnLst>
+                                </p:cTn>
+                              </p:par>
+                              <p:par>
+                                <p:cTn id="39" presetID="1" presetClass="entr" presetSubtype="0" fill="hold" grpId="0" nodeType="withEffect">
+                                  <p:stCondLst>
+                                    <p:cond delay="0"/>
+                                  </p:stCondLst>
+                                  <p:childTnLst>
+                                    <p:set>
+                                      <p:cBhvr>
+                                        <p:cTn id="40" dur="1" fill="hold">
+                                          <p:stCondLst>
+                                            <p:cond delay="0"/>
+                                          </p:stCondLst>
+                                        </p:cTn>
+                                        <p:tgtEl>
+                                          <p:spTgt spid="4">
+                                            <p:txEl>
+                                              <p:pRg st="4" end="4"/>
+                                            </p:txEl>
+                                          </p:spTgt>
+                                        </p:tgtEl>
+                                        <p:attrNameLst>
+                                          <p:attrName>style.visibility</p:attrName>
+                                        </p:attrNameLst>
+                                      </p:cBhvr>
+                                      <p:to>
+                                        <p:strVal val="visible"/>
+                                      </p:to>
+                                    </p:set>
+                                  </p:childTnLst>
+                                </p:cTn>
+                              </p:par>
+                              <p:par>
+                                <p:cTn id="41" presetID="1" presetClass="entr" presetSubtype="0" fill="hold" grpId="0" nodeType="withEffect">
+                                  <p:stCondLst>
+                                    <p:cond delay="0"/>
+                                  </p:stCondLst>
+                                  <p:childTnLst>
+                                    <p:set>
+                                      <p:cBhvr>
+                                        <p:cTn id="42" dur="1" fill="hold">
+                                          <p:stCondLst>
+                                            <p:cond delay="0"/>
+                                          </p:stCondLst>
+                                        </p:cTn>
+                                        <p:tgtEl>
+                                          <p:spTgt spid="4">
+                                            <p:txEl>
+                                              <p:pRg st="5" end="5"/>
+                                            </p:txEl>
+                                          </p:spTgt>
+                                        </p:tgtEl>
+                                        <p:attrNameLst>
+                                          <p:attrName>style.visibility</p:attrName>
+                                        </p:attrNameLst>
+                                      </p:cBhvr>
+                                      <p:to>
+                                        <p:strVal val="visible"/>
+                                      </p:to>
+                                    </p:set>
+                                  </p:childTnLst>
+                                </p:cTn>
+                              </p:par>
+                              <p:par>
+                                <p:cTn id="43" presetID="1" presetClass="entr" presetSubtype="0" fill="hold" grpId="0" nodeType="withEffect">
+                                  <p:stCondLst>
+                                    <p:cond delay="0"/>
+                                  </p:stCondLst>
+                                  <p:childTnLst>
+                                    <p:set>
+                                      <p:cBhvr>
+                                        <p:cTn id="44" dur="1" fill="hold">
+                                          <p:stCondLst>
+                                            <p:cond delay="0"/>
+                                          </p:stCondLst>
+                                        </p:cTn>
+                                        <p:tgtEl>
+                                          <p:spTgt spid="4">
+                                            <p:txEl>
+                                              <p:pRg st="6" end="6"/>
+                                            </p:txEl>
+                                          </p:spTgt>
+                                        </p:tgtEl>
+                                        <p:attrNameLst>
+                                          <p:attrName>style.visibility</p:attrName>
+                                        </p:attrNameLst>
+                                      </p:cBhvr>
+                                      <p:to>
+                                        <p:strVal val="visible"/>
+                                      </p:to>
+                                    </p:set>
+                                  </p:childTnLst>
+                                </p:cTn>
+                              </p:par>
+                              <p:par>
+                                <p:cTn id="45" presetID="1" presetClass="entr" presetSubtype="0" fill="hold" grpId="0" nodeType="withEffect">
+                                  <p:stCondLst>
+                                    <p:cond delay="0"/>
+                                  </p:stCondLst>
+                                  <p:childTnLst>
+                                    <p:set>
+                                      <p:cBhvr>
+                                        <p:cTn id="46" dur="1" fill="hold">
+                                          <p:stCondLst>
+                                            <p:cond delay="0"/>
+                                          </p:stCondLst>
+                                        </p:cTn>
+                                        <p:tgtEl>
+                                          <p:spTgt spid="4">
+                                            <p:txEl>
+                                              <p:pRg st="7" end="7"/>
+                                            </p:txEl>
+                                          </p:spTgt>
+                                        </p:tgtEl>
+                                        <p:attrNameLst>
+                                          <p:attrName>style.visibility</p:attrName>
+                                        </p:attrNameLst>
+                                      </p:cBhvr>
+                                      <p:to>
+                                        <p:strVal val="visible"/>
+                                      </p:to>
+                                    </p:set>
+                                  </p:childTnLst>
+                                </p:cTn>
+                              </p:par>
+                              <p:par>
+                                <p:cTn id="47" presetID="1" presetClass="entr" presetSubtype="0" fill="hold" grpId="0" nodeType="withEffect">
+                                  <p:stCondLst>
+                                    <p:cond delay="0"/>
+                                  </p:stCondLst>
+                                  <p:childTnLst>
+                                    <p:set>
+                                      <p:cBhvr>
+                                        <p:cTn id="48" dur="1" fill="hold">
+                                          <p:stCondLst>
+                                            <p:cond delay="0"/>
+                                          </p:stCondLst>
+                                        </p:cTn>
+                                        <p:tgtEl>
+                                          <p:spTgt spid="4">
+                                            <p:txEl>
+                                              <p:pRg st="8" end="8"/>
+                                            </p:txEl>
+                                          </p:spTgt>
+                                        </p:tgtEl>
+                                        <p:attrNameLst>
+                                          <p:attrName>style.visibility</p:attrName>
+                                        </p:attrNameLst>
+                                      </p:cBhvr>
+                                      <p:to>
+                                        <p:strVal val="visible"/>
+                                      </p:to>
+                                    </p:set>
+                                  </p:childTnLst>
+                                </p:cTn>
+                              </p:par>
+                              <p:par>
+                                <p:cTn id="49" presetID="1" presetClass="entr" presetSubtype="0" fill="hold" grpId="0" nodeType="withEffect">
+                                  <p:stCondLst>
+                                    <p:cond delay="0"/>
+                                  </p:stCondLst>
+                                  <p:childTnLst>
+                                    <p:set>
+                                      <p:cBhvr>
+                                        <p:cTn id="50" dur="1" fill="hold">
+                                          <p:stCondLst>
+                                            <p:cond delay="0"/>
+                                          </p:stCondLst>
+                                        </p:cTn>
+                                        <p:tgtEl>
+                                          <p:spTgt spid="4">
+                                            <p:txEl>
+                                              <p:pRg st="9" end="9"/>
+                                            </p:txEl>
+                                          </p:spTgt>
+                                        </p:tgtEl>
+                                        <p:attrNameLst>
+                                          <p:attrName>style.visibility</p:attrName>
+                                        </p:attrNameLst>
+                                      </p:cBhvr>
+                                      <p:to>
+                                        <p:strVal val="visible"/>
+                                      </p:to>
+                                    </p:set>
+                                  </p:childTnLst>
+                                </p:cTn>
+                              </p:par>
+                              <p:par>
+                                <p:cTn id="51" presetID="1" presetClass="entr" presetSubtype="0" fill="hold" grpId="0" nodeType="withEffect">
+                                  <p:stCondLst>
+                                    <p:cond delay="0"/>
+                                  </p:stCondLst>
+                                  <p:childTnLst>
+                                    <p:set>
+                                      <p:cBhvr>
+                                        <p:cTn id="52" dur="1" fill="hold">
+                                          <p:stCondLst>
+                                            <p:cond delay="0"/>
+                                          </p:stCondLst>
+                                        </p:cTn>
+                                        <p:tgtEl>
+                                          <p:spTgt spid="4">
+                                            <p:txEl>
+                                              <p:pRg st="10" end="10"/>
+                                            </p:txEl>
+                                          </p:spTgt>
+                                        </p:tgtEl>
+                                        <p:attrNameLst>
+                                          <p:attrName>style.visibility</p:attrName>
+                                        </p:attrNameLst>
+                                      </p:cBhvr>
+                                      <p:to>
+                                        <p:strVal val="visible"/>
+                                      </p:to>
+                                    </p:set>
+                                  </p:childTnLst>
+                                </p:cTn>
+                              </p:par>
+                            </p:childTnLst>
+                          </p:cTn>
+                        </p:par>
+                      </p:childTnLst>
+                    </p:cTn>
+                  </p:par>
+                </p:childTnLst>
+              </p:cTn>
+              <p:prevCondLst>
+                <p:cond evt="onPrev" delay="0">
+                  <p:tgtEl>
+                    <p:sldTgt/>
+                  </p:tgtEl>
+                </p:cond>
+              </p:prevCondLst>
+              <p:nextCondLst>
+                <p:cond evt="onNext" delay="0">
+                  <p:tgtEl>
+                    <p:sldTgt/>
+                  </p:tgtEl>
+                </p:cond>
+              </p:nextCondLst>
+            </p:seq>
+          </p:childTnLst>
+        </p:cTn>
+      </p:par>
+    </p:tnLst>
+    <p:bldLst>
+      <p:bldP spid="3" grpId="0" build="p"/>
+      <p:bldP spid="4" grpId="0" uiExpand="1" build="p"/>
+    </p:bldLst>
+  </p:timing>
+</p:sld>
+</file>
+
+<file path=ppt/slides/slide9.xml><?xml version="1.0" encoding="utf-8"?>
 <p:sld xmlns:a="http://schemas.openxmlformats.org/drawingml/2006/main" xmlns:r="http://schemas.openxmlformats.org/officeDocument/2006/relationships" xmlns:p="http://schemas.openxmlformats.org/presentationml/2006/main">
   <p:cSld>
     <p:spTree>
@@ -11482,7 +15008,7 @@
           <a:p>
             <a:r>
               <a:rPr lang="en-DE" dirty="0"/>
-              <a:t>Models: Configuration</a:t>
+              <a:t>Models: Results</a:t>
             </a:r>
           </a:p>
         </p:txBody>
@@ -11503,12 +15029,46 @@
             <p:ph sz="half" idx="1"/>
           </p:nvPr>
         </p:nvSpPr>
-        <p:spPr/>
+        <p:spPr>
+          <a:noFill/>
+          <a:ln>
+            <a:noFill/>
+          </a:ln>
+          <a:extLst>
+            <a:ext uri="{909E8E84-426E-40DD-AFC4-6F175D3DCCD1}">
+              <a14:hiddenFill xmlns:a14="http://schemas.microsoft.com/office/drawing/2010/main">
+                <a:solidFill>
+                  <a:srgbClr val="FFFFFF"/>
+                </a:solidFill>
+              </a14:hiddenFill>
+            </a:ext>
+            <a:ext uri="{91240B29-F687-4F45-9708-019B960494DF}">
+              <a14:hiddenLine xmlns:a14="http://schemas.microsoft.com/office/drawing/2010/main" w="9525">
+                <a:solidFill>
+                  <a:srgbClr val="000000"/>
+                </a:solidFill>
+                <a:miter lim="800000"/>
+                <a:headEnd/>
+                <a:tailEnd/>
+              </a14:hiddenLine>
+            </a:ext>
+          </a:extLst>
+        </p:spPr>
         <p:txBody>
-          <a:bodyPr/>
+          <a:bodyPr vert="horz" wrap="square" lIns="0" tIns="45720" rIns="0" bIns="45720" numCol="1" anchor="t" anchorCtr="0" compatLnSpc="1">
+            <a:prstTxWarp prst="textNoShape">
+              <a:avLst/>
+            </a:prstTxWarp>
+          </a:bodyPr>
           <a:lstStyle/>
           <a:p>
-            <a:endParaRPr lang="en-DE"/>
+            <a:r>
+              <a:rPr lang="en-DE" sz="1600" dirty="0"/>
+              <a:t>ResNet:</a:t>
+            </a:r>
+          </a:p>
+          <a:p>
+            <a:endParaRPr lang="en-DE" sz="1600" dirty="0"/>
           </a:p>
         </p:txBody>
       </p:sp>
@@ -11528,15 +15088,87 @@
             <p:ph sz="half" idx="10"/>
           </p:nvPr>
         </p:nvSpPr>
-        <p:spPr/>
+        <p:spPr>
+          <a:noFill/>
+          <a:ln>
+            <a:noFill/>
+          </a:ln>
+          <a:extLst>
+            <a:ext uri="{909E8E84-426E-40DD-AFC4-6F175D3DCCD1}">
+              <a14:hiddenFill xmlns:a14="http://schemas.microsoft.com/office/drawing/2010/main">
+                <a:solidFill>
+                  <a:srgbClr val="FFFFFF"/>
+                </a:solidFill>
+              </a14:hiddenFill>
+            </a:ext>
+            <a:ext uri="{91240B29-F687-4F45-9708-019B960494DF}">
+              <a14:hiddenLine xmlns:a14="http://schemas.microsoft.com/office/drawing/2010/main" w="9525">
+                <a:solidFill>
+                  <a:srgbClr val="000000"/>
+                </a:solidFill>
+                <a:miter lim="800000"/>
+                <a:headEnd/>
+                <a:tailEnd/>
+              </a14:hiddenLine>
+            </a:ext>
+          </a:extLst>
+        </p:spPr>
         <p:txBody>
-          <a:bodyPr/>
+          <a:bodyPr vert="horz" wrap="square" lIns="0" tIns="45720" rIns="0" bIns="45720" numCol="1" anchor="t" anchorCtr="0" compatLnSpc="1">
+            <a:prstTxWarp prst="textNoShape">
+              <a:avLst/>
+            </a:prstTxWarp>
+          </a:bodyPr>
           <a:lstStyle/>
           <a:p>
-            <a:endParaRPr lang="en-DE"/>
+            <a:r>
+              <a:rPr lang="en-DE" sz="1600" dirty="0"/>
+              <a:t>AlexNet (ToolNet):</a:t>
+            </a:r>
+          </a:p>
+          <a:p>
+            <a:endParaRPr lang="en-DE" sz="1600" dirty="0"/>
           </a:p>
         </p:txBody>
       </p:sp>
+      <p:cxnSp>
+        <p:nvCxnSpPr>
+          <p:cNvPr id="5" name="Straight Connector 4">
+            <a:extLst>
+              <a:ext uri="{FF2B5EF4-FFF2-40B4-BE49-F238E27FC236}">
+                <a16:creationId xmlns:a16="http://schemas.microsoft.com/office/drawing/2014/main" id="{E4EE441E-9D80-6C47-9213-460A8CADEBB5}"/>
+              </a:ext>
+            </a:extLst>
+          </p:cNvPr>
+          <p:cNvCxnSpPr>
+            <a:cxnSpLocks/>
+          </p:cNvCxnSpPr>
+          <p:nvPr/>
+        </p:nvCxnSpPr>
+        <p:spPr>
+          <a:xfrm flipV="1">
+            <a:off x="4572000" y="1131590"/>
+            <a:ext cx="0" cy="3600000"/>
+          </a:xfrm>
+          <a:prstGeom prst="line">
+            <a:avLst/>
+          </a:prstGeom>
+        </p:spPr>
+        <p:style>
+          <a:lnRef idx="1">
+            <a:schemeClr val="dk1"/>
+          </a:lnRef>
+          <a:fillRef idx="0">
+            <a:schemeClr val="dk1"/>
+          </a:fillRef>
+          <a:effectRef idx="0">
+            <a:schemeClr val="dk1"/>
+          </a:effectRef>
+          <a:fontRef idx="minor">
+            <a:schemeClr val="tx1"/>
+          </a:fontRef>
+        </p:style>
+      </p:cxnSp>
     </p:spTree>
     <p:extLst>
       <p:ext uri="{BB962C8B-B14F-4D97-AF65-F5344CB8AC3E}">
@@ -11547,114 +15179,165 @@
   <p:clrMapOvr>
     <a:masterClrMapping/>
   </p:clrMapOvr>
-</p:sld>
-</file>
-
-<file path=ppt/slides/slide9.xml><?xml version="1.0" encoding="utf-8"?>
-<p:sld xmlns:a="http://schemas.openxmlformats.org/drawingml/2006/main" xmlns:r="http://schemas.openxmlformats.org/officeDocument/2006/relationships" xmlns:p="http://schemas.openxmlformats.org/presentationml/2006/main">
-  <p:cSld>
-    <p:spTree>
-      <p:nvGrpSpPr>
-        <p:cNvPr id="1" name=""/>
-        <p:cNvGrpSpPr/>
-        <p:nvPr/>
-      </p:nvGrpSpPr>
-      <p:grpSpPr>
-        <a:xfrm>
-          <a:off x="0" y="0"/>
-          <a:ext cx="0" cy="0"/>
-          <a:chOff x="0" y="0"/>
-          <a:chExt cx="0" cy="0"/>
-        </a:xfrm>
-      </p:grpSpPr>
-      <p:sp>
-        <p:nvSpPr>
-          <p:cNvPr id="2" name="Title 1">
-            <a:extLst>
-              <a:ext uri="{FF2B5EF4-FFF2-40B4-BE49-F238E27FC236}">
-                <a16:creationId xmlns:a16="http://schemas.microsoft.com/office/drawing/2014/main" id="{DD40011F-06A9-3041-9E22-112104FE6225}"/>
-              </a:ext>
-            </a:extLst>
-          </p:cNvPr>
-          <p:cNvSpPr>
-            <a:spLocks noGrp="1"/>
-          </p:cNvSpPr>
-          <p:nvPr>
-            <p:ph type="title"/>
-          </p:nvPr>
-        </p:nvSpPr>
-        <p:spPr/>
-        <p:txBody>
-          <a:bodyPr/>
-          <a:lstStyle/>
-          <a:p>
-            <a:r>
-              <a:rPr lang="en-DE" dirty="0"/>
-              <a:t>Models: Results</a:t>
-            </a:r>
-          </a:p>
-        </p:txBody>
-      </p:sp>
-      <p:sp>
-        <p:nvSpPr>
-          <p:cNvPr id="3" name="Content Placeholder 2">
-            <a:extLst>
-              <a:ext uri="{FF2B5EF4-FFF2-40B4-BE49-F238E27FC236}">
-                <a16:creationId xmlns:a16="http://schemas.microsoft.com/office/drawing/2014/main" id="{0DD3F2C9-63B8-3449-A98F-BF228194AEC7}"/>
-              </a:ext>
-            </a:extLst>
-          </p:cNvPr>
-          <p:cNvSpPr>
-            <a:spLocks noGrp="1"/>
-          </p:cNvSpPr>
-          <p:nvPr>
-            <p:ph sz="half" idx="1"/>
-          </p:nvPr>
-        </p:nvSpPr>
-        <p:spPr/>
-        <p:txBody>
-          <a:bodyPr/>
-          <a:lstStyle/>
-          <a:p>
-            <a:endParaRPr lang="en-DE"/>
-          </a:p>
-        </p:txBody>
-      </p:sp>
-      <p:sp>
-        <p:nvSpPr>
-          <p:cNvPr id="4" name="Content Placeholder 3">
-            <a:extLst>
-              <a:ext uri="{FF2B5EF4-FFF2-40B4-BE49-F238E27FC236}">
-                <a16:creationId xmlns:a16="http://schemas.microsoft.com/office/drawing/2014/main" id="{8C28C196-AC2B-744D-9978-282DEC170246}"/>
-              </a:ext>
-            </a:extLst>
-          </p:cNvPr>
-          <p:cNvSpPr>
-            <a:spLocks noGrp="1"/>
-          </p:cNvSpPr>
-          <p:nvPr>
-            <p:ph sz="half" idx="10"/>
-          </p:nvPr>
-        </p:nvSpPr>
-        <p:spPr/>
-        <p:txBody>
-          <a:bodyPr/>
-          <a:lstStyle/>
-          <a:p>
-            <a:endParaRPr lang="en-DE"/>
-          </a:p>
-        </p:txBody>
-      </p:sp>
-    </p:spTree>
-    <p:extLst>
-      <p:ext uri="{BB962C8B-B14F-4D97-AF65-F5344CB8AC3E}">
-        <p14:creationId xmlns:p14="http://schemas.microsoft.com/office/powerpoint/2010/main" val="2185779400"/>
-      </p:ext>
-    </p:extLst>
-  </p:cSld>
-  <p:clrMapOvr>
-    <a:masterClrMapping/>
-  </p:clrMapOvr>
+  <p:timing>
+    <p:tnLst>
+      <p:par>
+        <p:cTn id="1" dur="indefinite" restart="never" nodeType="tmRoot">
+          <p:childTnLst>
+            <p:seq concurrent="1" nextAc="seek">
+              <p:cTn id="2" dur="indefinite" nodeType="mainSeq">
+                <p:childTnLst>
+                  <p:par>
+                    <p:cTn id="3" fill="hold">
+                      <p:stCondLst>
+                        <p:cond delay="indefinite"/>
+                      </p:stCondLst>
+                      <p:childTnLst>
+                        <p:par>
+                          <p:cTn id="4" fill="hold">
+                            <p:stCondLst>
+                              <p:cond delay="0"/>
+                            </p:stCondLst>
+                            <p:childTnLst>
+                              <p:par>
+                                <p:cTn id="5" presetID="1" presetClass="entr" presetSubtype="0" fill="hold" grpId="0" nodeType="clickEffect">
+                                  <p:stCondLst>
+                                    <p:cond delay="0"/>
+                                  </p:stCondLst>
+                                  <p:childTnLst>
+                                    <p:set>
+                                      <p:cBhvr>
+                                        <p:cTn id="6" dur="1" fill="hold">
+                                          <p:stCondLst>
+                                            <p:cond delay="0"/>
+                                          </p:stCondLst>
+                                        </p:cTn>
+                                        <p:tgtEl>
+                                          <p:spTgt spid="3">
+                                            <p:txEl>
+                                              <p:pRg st="0" end="0"/>
+                                            </p:txEl>
+                                          </p:spTgt>
+                                        </p:tgtEl>
+                                        <p:attrNameLst>
+                                          <p:attrName>style.visibility</p:attrName>
+                                        </p:attrNameLst>
+                                      </p:cBhvr>
+                                      <p:to>
+                                        <p:strVal val="visible"/>
+                                      </p:to>
+                                    </p:set>
+                                  </p:childTnLst>
+                                </p:cTn>
+                              </p:par>
+                            </p:childTnLst>
+                          </p:cTn>
+                        </p:par>
+                      </p:childTnLst>
+                    </p:cTn>
+                  </p:par>
+                  <p:par>
+                    <p:cTn id="7" fill="hold">
+                      <p:stCondLst>
+                        <p:cond delay="indefinite"/>
+                      </p:stCondLst>
+                      <p:childTnLst>
+                        <p:par>
+                          <p:cTn id="8" fill="hold">
+                            <p:stCondLst>
+                              <p:cond delay="0"/>
+                            </p:stCondLst>
+                            <p:childTnLst>
+                              <p:par>
+                                <p:cTn id="9" presetID="1" presetClass="entr" presetSubtype="0" fill="hold" nodeType="clickEffect">
+                                  <p:stCondLst>
+                                    <p:cond delay="0"/>
+                                  </p:stCondLst>
+                                  <p:childTnLst>
+                                    <p:set>
+                                      <p:cBhvr>
+                                        <p:cTn id="10" dur="1" fill="hold">
+                                          <p:stCondLst>
+                                            <p:cond delay="0"/>
+                                          </p:stCondLst>
+                                        </p:cTn>
+                                        <p:tgtEl>
+                                          <p:spTgt spid="5"/>
+                                        </p:tgtEl>
+                                        <p:attrNameLst>
+                                          <p:attrName>style.visibility</p:attrName>
+                                        </p:attrNameLst>
+                                      </p:cBhvr>
+                                      <p:to>
+                                        <p:strVal val="visible"/>
+                                      </p:to>
+                                    </p:set>
+                                  </p:childTnLst>
+                                </p:cTn>
+                              </p:par>
+                              <p:par>
+                                <p:cTn id="11" presetID="1" presetClass="entr" presetSubtype="0" fill="hold" grpId="0" nodeType="withEffect">
+                                  <p:stCondLst>
+                                    <p:cond delay="0"/>
+                                  </p:stCondLst>
+                                  <p:childTnLst>
+                                    <p:set>
+                                      <p:cBhvr>
+                                        <p:cTn id="12" dur="1" fill="hold">
+                                          <p:stCondLst>
+                                            <p:cond delay="0"/>
+                                          </p:stCondLst>
+                                        </p:cTn>
+                                        <p:tgtEl>
+                                          <p:spTgt spid="4">
+                                            <p:txEl>
+                                              <p:pRg st="0" end="0"/>
+                                            </p:txEl>
+                                          </p:spTgt>
+                                        </p:tgtEl>
+                                        <p:attrNameLst>
+                                          <p:attrName>style.visibility</p:attrName>
+                                        </p:attrNameLst>
+                                      </p:cBhvr>
+                                      <p:to>
+                                        <p:strVal val="visible"/>
+                                      </p:to>
+                                    </p:set>
+                                  </p:childTnLst>
+                                </p:cTn>
+                              </p:par>
+                            </p:childTnLst>
+                          </p:cTn>
+                        </p:par>
+                      </p:childTnLst>
+                    </p:cTn>
+                  </p:par>
+                </p:childTnLst>
+              </p:cTn>
+              <p:prevCondLst>
+                <p:cond evt="onPrev" delay="0">
+                  <p:tgtEl>
+                    <p:sldTgt/>
+                  </p:tgtEl>
+                </p:cond>
+              </p:prevCondLst>
+              <p:nextCondLst>
+                <p:cond evt="onNext" delay="0">
+                  <p:tgtEl>
+                    <p:sldTgt/>
+                  </p:tgtEl>
+                </p:cond>
+              </p:nextCondLst>
+            </p:seq>
+          </p:childTnLst>
+        </p:cTn>
+      </p:par>
+    </p:tnLst>
+    <p:bldLst>
+      <p:bldP spid="3" grpId="0" build="p"/>
+      <p:bldP spid="4" grpId="0" build="p"/>
+    </p:bldLst>
+  </p:timing>
 </p:sld>
 </file>
 

</xml_diff>

<commit_message>
Modified presentation. --> Still plots need to be added.
</commit_message>
<xml_diff>
--- a/docs/presentation/SurgeryRecognitionTool.pptx
+++ b/docs/presentation/SurgeryRecognitionTool.pptx
@@ -5,10 +5,10 @@
     <p:sldMasterId id="2147483648" r:id="rId1"/>
   </p:sldMasterIdLst>
   <p:notesMasterIdLst>
-    <p:notesMasterId r:id="rId21"/>
+    <p:notesMasterId r:id="rId22"/>
   </p:notesMasterIdLst>
   <p:handoutMasterIdLst>
-    <p:handoutMasterId r:id="rId22"/>
+    <p:handoutMasterId r:id="rId23"/>
   </p:handoutMasterIdLst>
   <p:sldIdLst>
     <p:sldId id="256" r:id="rId2"/>
@@ -20,16 +20,17 @@
     <p:sldId id="259" r:id="rId8"/>
     <p:sldId id="258" r:id="rId9"/>
     <p:sldId id="257" r:id="rId10"/>
-    <p:sldId id="263" r:id="rId11"/>
-    <p:sldId id="261" r:id="rId12"/>
-    <p:sldId id="268" r:id="rId13"/>
-    <p:sldId id="269" r:id="rId14"/>
-    <p:sldId id="270" r:id="rId15"/>
-    <p:sldId id="271" r:id="rId16"/>
-    <p:sldId id="272" r:id="rId17"/>
-    <p:sldId id="273" r:id="rId18"/>
-    <p:sldId id="274" r:id="rId19"/>
-    <p:sldId id="276" r:id="rId20"/>
+    <p:sldId id="277" r:id="rId11"/>
+    <p:sldId id="263" r:id="rId12"/>
+    <p:sldId id="261" r:id="rId13"/>
+    <p:sldId id="268" r:id="rId14"/>
+    <p:sldId id="269" r:id="rId15"/>
+    <p:sldId id="270" r:id="rId16"/>
+    <p:sldId id="271" r:id="rId17"/>
+    <p:sldId id="272" r:id="rId18"/>
+    <p:sldId id="273" r:id="rId19"/>
+    <p:sldId id="274" r:id="rId20"/>
+    <p:sldId id="276" r:id="rId21"/>
   </p:sldIdLst>
   <p:sldSz cx="9144000" cy="5143500" type="screen16x9"/>
   <p:notesSz cx="6858000" cy="9144000"/>
@@ -4642,7 +4643,7 @@
               <a:pPr>
                 <a:defRPr/>
               </a:pPr>
-              <a:t>10. Februar 2021</a:t>
+              <a:t>16. Februar 2021</a:t>
             </a:fld>
             <a:endParaRPr lang="de-DE"/>
           </a:p>
@@ -5271,7 +5272,7 @@
               <a:pPr>
                 <a:defRPr/>
               </a:pPr>
-              <a:t>10. Februar 2021</a:t>
+              <a:t>16. Februar 2021</a:t>
             </a:fld>
             <a:endParaRPr lang="de-DE"/>
           </a:p>
@@ -6218,7 +6219,7 @@
               <a:pPr>
                 <a:defRPr/>
               </a:pPr>
-              <a:t>10. Februar 2021</a:t>
+              <a:t>16. Februar 2021</a:t>
             </a:fld>
             <a:endParaRPr lang="de-DE"/>
           </a:p>
@@ -8906,7 +8907,7 @@
                 <a:cs typeface="Tahoma" panose="020B0604030504040204" pitchFamily="34" charset="0"/>
               </a:rPr>
               <a:pPr eaLnBrk="1" hangingPunct="1"/>
-              <a:t>10.02.21</a:t>
+              <a:t>16.02.21</a:t>
             </a:fld>
             <a:r>
               <a:rPr lang="de-DE" altLang="de-DE" sz="1000" dirty="0">
@@ -9706,6 +9707,124 @@
           <p:cNvPr id="2" name="Title 1">
             <a:extLst>
               <a:ext uri="{FF2B5EF4-FFF2-40B4-BE49-F238E27FC236}">
+                <a16:creationId xmlns:a16="http://schemas.microsoft.com/office/drawing/2014/main" id="{27D933A2-B84D-2F43-A324-612D87928E96}"/>
+              </a:ext>
+            </a:extLst>
+          </p:cNvPr>
+          <p:cNvSpPr>
+            <a:spLocks noGrp="1"/>
+          </p:cNvSpPr>
+          <p:nvPr>
+            <p:ph type="title"/>
+          </p:nvPr>
+        </p:nvSpPr>
+        <p:spPr/>
+        <p:txBody>
+          <a:bodyPr/>
+          <a:lstStyle/>
+          <a:p>
+            <a:r>
+              <a:rPr lang="en-DE" dirty="0"/>
+              <a:t>Models: Results (AlexNet)</a:t>
+            </a:r>
+          </a:p>
+        </p:txBody>
+      </p:sp>
+      <p:sp>
+        <p:nvSpPr>
+          <p:cNvPr id="8" name="Content Placeholder 7">
+            <a:extLst>
+              <a:ext uri="{FF2B5EF4-FFF2-40B4-BE49-F238E27FC236}">
+                <a16:creationId xmlns:a16="http://schemas.microsoft.com/office/drawing/2014/main" id="{7650128B-B784-AD44-9494-349A1FB851CD}"/>
+              </a:ext>
+            </a:extLst>
+          </p:cNvPr>
+          <p:cNvSpPr>
+            <a:spLocks noGrp="1"/>
+          </p:cNvSpPr>
+          <p:nvPr>
+            <p:ph sz="half" idx="1"/>
+          </p:nvPr>
+        </p:nvSpPr>
+        <p:spPr>
+          <a:xfrm>
+            <a:off x="181121" y="1194198"/>
+            <a:ext cx="4357220" cy="1737592"/>
+          </a:xfrm>
+        </p:spPr>
+        <p:txBody>
+          <a:bodyPr/>
+          <a:lstStyle/>
+          <a:p>
+            <a:endParaRPr lang="en-DE" dirty="0"/>
+          </a:p>
+        </p:txBody>
+      </p:sp>
+      <p:sp>
+        <p:nvSpPr>
+          <p:cNvPr id="9" name="Content Placeholder 8">
+            <a:extLst>
+              <a:ext uri="{FF2B5EF4-FFF2-40B4-BE49-F238E27FC236}">
+                <a16:creationId xmlns:a16="http://schemas.microsoft.com/office/drawing/2014/main" id="{E8CDA327-2E37-CC40-AE8F-E23D06706428}"/>
+              </a:ext>
+            </a:extLst>
+          </p:cNvPr>
+          <p:cNvSpPr>
+            <a:spLocks noGrp="1"/>
+          </p:cNvSpPr>
+          <p:nvPr>
+            <p:ph sz="half" idx="10"/>
+          </p:nvPr>
+        </p:nvSpPr>
+        <p:spPr>
+          <a:xfrm>
+            <a:off x="4605661" y="1194198"/>
+            <a:ext cx="4300870" cy="1737592"/>
+          </a:xfrm>
+        </p:spPr>
+        <p:txBody>
+          <a:bodyPr/>
+          <a:lstStyle/>
+          <a:p>
+            <a:endParaRPr lang="en-DE" dirty="0"/>
+          </a:p>
+        </p:txBody>
+      </p:sp>
+    </p:spTree>
+    <p:extLst>
+      <p:ext uri="{BB962C8B-B14F-4D97-AF65-F5344CB8AC3E}">
+        <p14:creationId xmlns:p14="http://schemas.microsoft.com/office/powerpoint/2010/main" val="2882010265"/>
+      </p:ext>
+    </p:extLst>
+  </p:cSld>
+  <p:clrMapOvr>
+    <a:masterClrMapping/>
+  </p:clrMapOvr>
+</p:sld>
+</file>
+
+<file path=ppt/slides/slide11.xml><?xml version="1.0" encoding="utf-8"?>
+<p:sld xmlns:a="http://schemas.openxmlformats.org/drawingml/2006/main" xmlns:r="http://schemas.openxmlformats.org/officeDocument/2006/relationships" xmlns:p="http://schemas.openxmlformats.org/presentationml/2006/main">
+  <p:cSld>
+    <p:spTree>
+      <p:nvGrpSpPr>
+        <p:cNvPr id="1" name=""/>
+        <p:cNvGrpSpPr/>
+        <p:nvPr/>
+      </p:nvGrpSpPr>
+      <p:grpSpPr>
+        <a:xfrm>
+          <a:off x="0" y="0"/>
+          <a:ext cx="0" cy="0"/>
+          <a:chOff x="0" y="0"/>
+          <a:chExt cx="0" cy="0"/>
+        </a:xfrm>
+      </p:grpSpPr>
+      <p:sp>
+        <p:nvSpPr>
+          <p:cNvPr id="2" name="Title 1">
+            <a:extLst>
+              <a:ext uri="{FF2B5EF4-FFF2-40B4-BE49-F238E27FC236}">
                 <a16:creationId xmlns:a16="http://schemas.microsoft.com/office/drawing/2014/main" id="{B9B100ED-2C27-054F-B06A-7A8B12453074}"/>
               </a:ext>
             </a:extLst>
@@ -9742,7 +9861,7 @@
 </p:sld>
 </file>
 
-<file path=ppt/slides/slide11.xml><?xml version="1.0" encoding="utf-8"?>
+<file path=ppt/slides/slide12.xml><?xml version="1.0" encoding="utf-8"?>
 <p:sld xmlns:a="http://schemas.openxmlformats.org/drawingml/2006/main" xmlns:r="http://schemas.openxmlformats.org/officeDocument/2006/relationships" xmlns:p="http://schemas.openxmlformats.org/presentationml/2006/main">
   <p:cSld>
     <p:spTree>
@@ -9803,12 +9922,7 @@
             <p:ph idx="11"/>
           </p:nvPr>
         </p:nvSpPr>
-        <p:spPr>
-          <a:xfrm>
-            <a:off x="180490" y="1185475"/>
-            <a:ext cx="8783998" cy="378163"/>
-          </a:xfrm>
-        </p:spPr>
+        <p:spPr/>
         <p:txBody>
           <a:bodyPr/>
           <a:lstStyle/>
@@ -9837,7 +9951,7 @@
 </p:sld>
 </file>
 
-<file path=ppt/slides/slide12.xml><?xml version="1.0" encoding="utf-8"?>
+<file path=ppt/slides/slide13.xml><?xml version="1.0" encoding="utf-8"?>
 <p:sld xmlns:a="http://schemas.openxmlformats.org/drawingml/2006/main" xmlns:r="http://schemas.openxmlformats.org/officeDocument/2006/relationships" xmlns:p="http://schemas.openxmlformats.org/presentationml/2006/main">
   <p:cSld>
     <p:spTree>
@@ -9958,7 +10072,7 @@
 </p:sld>
 </file>
 
-<file path=ppt/slides/slide13.xml><?xml version="1.0" encoding="utf-8"?>
+<file path=ppt/slides/slide14.xml><?xml version="1.0" encoding="utf-8"?>
 <p:sld xmlns:a="http://schemas.openxmlformats.org/drawingml/2006/main" xmlns:r="http://schemas.openxmlformats.org/officeDocument/2006/relationships" xmlns:p="http://schemas.openxmlformats.org/presentationml/2006/main">
   <p:cSld>
     <p:spTree>
@@ -10095,7 +10209,7 @@
 </p:sld>
 </file>
 
-<file path=ppt/slides/slide14.xml><?xml version="1.0" encoding="utf-8"?>
+<file path=ppt/slides/slide15.xml><?xml version="1.0" encoding="utf-8"?>
 <p:sld xmlns:a="http://schemas.openxmlformats.org/drawingml/2006/main" xmlns:r="http://schemas.openxmlformats.org/officeDocument/2006/relationships" xmlns:p="http://schemas.openxmlformats.org/presentationml/2006/main">
   <p:cSld>
     <p:spTree>
@@ -10193,7 +10307,7 @@
 </p:sld>
 </file>
 
-<file path=ppt/slides/slide15.xml><?xml version="1.0" encoding="utf-8"?>
+<file path=ppt/slides/slide16.xml><?xml version="1.0" encoding="utf-8"?>
 <p:sld xmlns:a="http://schemas.openxmlformats.org/drawingml/2006/main" xmlns:r="http://schemas.openxmlformats.org/officeDocument/2006/relationships" xmlns:p="http://schemas.openxmlformats.org/presentationml/2006/main">
   <p:cSld>
     <p:spTree>
@@ -10243,77 +10357,6 @@
           </a:p>
         </p:txBody>
       </p:sp>
-      <p:pic>
-        <p:nvPicPr>
-          <p:cNvPr id="7" name="Content Placeholder 6">
-            <a:extLst>
-              <a:ext uri="{FF2B5EF4-FFF2-40B4-BE49-F238E27FC236}">
-                <a16:creationId xmlns:a16="http://schemas.microsoft.com/office/drawing/2014/main" id="{DA789B8C-1AEF-964E-9C62-279FFA15FD1A}"/>
-              </a:ext>
-            </a:extLst>
-          </p:cNvPr>
-          <p:cNvPicPr>
-            <a:picLocks noGrp="1" noChangeAspect="1"/>
-          </p:cNvPicPr>
-          <p:nvPr>
-            <p:ph sz="half" idx="10"/>
-          </p:nvPr>
-        </p:nvPicPr>
-        <p:blipFill>
-          <a:blip r:embed="rId2">
-            <a:extLst>
-              <a:ext uri="{28A0092B-C50C-407E-A947-70E740481C1C}">
-                <a14:useLocalDpi xmlns:a14="http://schemas.microsoft.com/office/drawing/2010/main" val="0"/>
-              </a:ext>
-            </a:extLst>
-          </a:blip>
-          <a:stretch>
-            <a:fillRect/>
-          </a:stretch>
-        </p:blipFill>
-        <p:spPr>
-          <a:xfrm>
-            <a:off x="180974" y="1731089"/>
-            <a:ext cx="4302000" cy="2358396"/>
-          </a:xfrm>
-        </p:spPr>
-      </p:pic>
-      <p:pic>
-        <p:nvPicPr>
-          <p:cNvPr id="13" name="Picture 12">
-            <a:extLst>
-              <a:ext uri="{FF2B5EF4-FFF2-40B4-BE49-F238E27FC236}">
-                <a16:creationId xmlns:a16="http://schemas.microsoft.com/office/drawing/2014/main" id="{E682320B-262D-3E41-AF60-4B33EBBABBE4}"/>
-              </a:ext>
-            </a:extLst>
-          </p:cNvPr>
-          <p:cNvPicPr>
-            <a:picLocks noChangeAspect="1"/>
-          </p:cNvPicPr>
-          <p:nvPr/>
-        </p:nvPicPr>
-        <p:blipFill>
-          <a:blip r:embed="rId3">
-            <a:extLst>
-              <a:ext uri="{28A0092B-C50C-407E-A947-70E740481C1C}">
-                <a14:useLocalDpi xmlns:a14="http://schemas.microsoft.com/office/drawing/2010/main" val="0"/>
-              </a:ext>
-            </a:extLst>
-          </a:blip>
-          <a:stretch>
-            <a:fillRect/>
-          </a:stretch>
-        </p:blipFill>
-        <p:spPr>
-          <a:xfrm>
-            <a:off x="4658430" y="1577022"/>
-            <a:ext cx="4302000" cy="2666529"/>
-          </a:xfrm>
-          <a:prstGeom prst="rect">
-            <a:avLst/>
-          </a:prstGeom>
-        </p:spPr>
-      </p:pic>
       <p:sp>
         <p:nvSpPr>
           <p:cNvPr id="14" name="TextBox 13">
@@ -10428,55 +10471,99 @@
           </a:p>
         </p:txBody>
       </p:sp>
-      <p:sp>
-        <p:nvSpPr>
-          <p:cNvPr id="18" name="Rounded Rectangle 17">
+      <p:pic>
+        <p:nvPicPr>
+          <p:cNvPr id="8" name="Content Placeholder 7">
             <a:extLst>
               <a:ext uri="{FF2B5EF4-FFF2-40B4-BE49-F238E27FC236}">
-                <a16:creationId xmlns:a16="http://schemas.microsoft.com/office/drawing/2014/main" id="{1614D991-0E91-D240-A72A-E18921678363}"/>
+                <a16:creationId xmlns:a16="http://schemas.microsoft.com/office/drawing/2014/main" id="{5CA3DFC3-5AE8-A74C-93F4-E7FB8E5610BC}"/>
               </a:ext>
             </a:extLst>
           </p:cNvPr>
-          <p:cNvSpPr/>
-          <p:nvPr/>
-        </p:nvSpPr>
+          <p:cNvPicPr>
+            <a:picLocks noGrp="1" noChangeAspect="1"/>
+          </p:cNvPicPr>
+          <p:nvPr>
+            <p:ph sz="half" idx="10"/>
+          </p:nvPr>
+        </p:nvPicPr>
+        <p:blipFill>
+          <a:blip r:embed="rId2">
+            <a:extLst>
+              <a:ext uri="{28A0092B-C50C-407E-A947-70E740481C1C}">
+                <a14:useLocalDpi xmlns:a14="http://schemas.microsoft.com/office/drawing/2010/main" val="0"/>
+              </a:ext>
+            </a:extLst>
+          </a:blip>
+          <a:stretch>
+            <a:fillRect/>
+          </a:stretch>
+        </p:blipFill>
         <p:spPr>
           <a:xfrm>
-            <a:off x="6876256" y="366712"/>
-            <a:ext cx="1745048" cy="1025644"/>
+            <a:off x="184150" y="1730655"/>
+            <a:ext cx="4302125" cy="2358465"/>
           </a:xfrm>
-          <a:prstGeom prst="roundRect">
+        </p:spPr>
+      </p:pic>
+      <p:pic>
+        <p:nvPicPr>
+          <p:cNvPr id="15" name="Content Placeholder 7">
+            <a:extLst>
+              <a:ext uri="{FF2B5EF4-FFF2-40B4-BE49-F238E27FC236}">
+                <a16:creationId xmlns:a16="http://schemas.microsoft.com/office/drawing/2014/main" id="{2D1A9CB9-37FF-3747-A26F-8EA7839E076C}"/>
+              </a:ext>
+            </a:extLst>
+          </p:cNvPr>
+          <p:cNvPicPr>
+            <a:picLocks noChangeAspect="1"/>
+          </p:cNvPicPr>
+          <p:nvPr/>
+        </p:nvPicPr>
+        <p:blipFill>
+          <a:blip r:embed="rId3">
+            <a:extLst>
+              <a:ext uri="{28A0092B-C50C-407E-A947-70E740481C1C}">
+                <a14:useLocalDpi xmlns:a14="http://schemas.microsoft.com/office/drawing/2010/main" val="0"/>
+              </a:ext>
+            </a:extLst>
+          </a:blip>
+          <a:srcRect/>
+          <a:stretch/>
+        </p:blipFill>
+        <p:spPr bwMode="auto">
+          <a:xfrm>
+            <a:off x="4906934" y="1761688"/>
+            <a:ext cx="3804990" cy="2358465"/>
+          </a:xfrm>
+          <a:prstGeom prst="rect">
             <a:avLst/>
           </a:prstGeom>
+          <a:noFill/>
+          <a:ln>
+            <a:noFill/>
+          </a:ln>
+          <a:extLst>
+            <a:ext uri="{909E8E84-426E-40DD-AFC4-6F175D3DCCD1}">
+              <a14:hiddenFill xmlns:a14="http://schemas.microsoft.com/office/drawing/2010/main">
+                <a:solidFill>
+                  <a:srgbClr val="FFFFFF"/>
+                </a:solidFill>
+              </a14:hiddenFill>
+            </a:ext>
+            <a:ext uri="{91240B29-F687-4F45-9708-019B960494DF}">
+              <a14:hiddenLine xmlns:a14="http://schemas.microsoft.com/office/drawing/2010/main" w="9525">
+                <a:solidFill>
+                  <a:srgbClr val="000000"/>
+                </a:solidFill>
+                <a:miter lim="800000"/>
+                <a:headEnd/>
+                <a:tailEnd/>
+              </a14:hiddenLine>
+            </a:ext>
+          </a:extLst>
         </p:spPr>
-        <p:style>
-          <a:lnRef idx="2">
-            <a:schemeClr val="accent1">
-              <a:shade val="50000"/>
-            </a:schemeClr>
-          </a:lnRef>
-          <a:fillRef idx="1">
-            <a:schemeClr val="accent1"/>
-          </a:fillRef>
-          <a:effectRef idx="0">
-            <a:schemeClr val="accent1"/>
-          </a:effectRef>
-          <a:fontRef idx="minor">
-            <a:schemeClr val="lt1"/>
-          </a:fontRef>
-        </p:style>
-        <p:txBody>
-          <a:bodyPr rtlCol="0" anchor="ctr"/>
-          <a:lstStyle/>
-          <a:p>
-            <a:pPr algn="ctr"/>
-            <a:r>
-              <a:rPr lang="en-DE" dirty="0"/>
-              <a:t>Change screenshots – Title is wrong!</a:t>
-            </a:r>
-          </a:p>
-        </p:txBody>
-      </p:sp>
+      </p:pic>
     </p:spTree>
     <p:extLst>
       <p:ext uri="{BB962C8B-B14F-4D97-AF65-F5344CB8AC3E}">
@@ -10548,7 +10635,7 @@
                                           </p:stCondLst>
                                         </p:cTn>
                                         <p:tgtEl>
-                                          <p:spTgt spid="7"/>
+                                          <p:spTgt spid="8"/>
                                         </p:tgtEl>
                                         <p:attrNameLst>
                                           <p:attrName>style.visibility</p:attrName>
@@ -10647,7 +10734,7 @@
                                           </p:stCondLst>
                                         </p:cTn>
                                         <p:tgtEl>
-                                          <p:spTgt spid="13"/>
+                                          <p:spTgt spid="15"/>
                                         </p:tgtEl>
                                         <p:attrNameLst>
                                           <p:attrName>style.visibility</p:attrName>
@@ -10695,7 +10782,7 @@
 </p:sld>
 </file>
 
-<file path=ppt/slides/slide16.xml><?xml version="1.0" encoding="utf-8"?>
+<file path=ppt/slides/slide17.xml><?xml version="1.0" encoding="utf-8"?>
 <p:sld xmlns:a="http://schemas.openxmlformats.org/drawingml/2006/main" xmlns:r="http://schemas.openxmlformats.org/officeDocument/2006/relationships" xmlns:p="http://schemas.openxmlformats.org/presentationml/2006/main">
   <p:cSld>
     <p:spTree>
@@ -10774,14 +10861,13 @@
               </a:ext>
             </a:extLst>
           </a:blip>
-          <a:stretch>
-            <a:fillRect/>
-          </a:stretch>
+          <a:srcRect/>
+          <a:stretch/>
         </p:blipFill>
         <p:spPr>
           <a:xfrm>
-            <a:off x="2421731" y="1619862"/>
-            <a:ext cx="4300538" cy="2562588"/>
+            <a:off x="2421732" y="1619862"/>
+            <a:ext cx="4300536" cy="2562588"/>
           </a:xfrm>
         </p:spPr>
       </p:pic>
@@ -10789,153 +10875,6 @@
     <p:extLst>
       <p:ext uri="{BB962C8B-B14F-4D97-AF65-F5344CB8AC3E}">
         <p14:creationId xmlns:p14="http://schemas.microsoft.com/office/powerpoint/2010/main" val="3860221759"/>
-      </p:ext>
-    </p:extLst>
-  </p:cSld>
-  <p:clrMapOvr>
-    <a:masterClrMapping/>
-  </p:clrMapOvr>
-</p:sld>
-</file>
-
-<file path=ppt/slides/slide17.xml><?xml version="1.0" encoding="utf-8"?>
-<p:sld xmlns:a="http://schemas.openxmlformats.org/drawingml/2006/main" xmlns:r="http://schemas.openxmlformats.org/officeDocument/2006/relationships" xmlns:p="http://schemas.openxmlformats.org/presentationml/2006/main">
-  <p:cSld>
-    <p:spTree>
-      <p:nvGrpSpPr>
-        <p:cNvPr id="1" name=""/>
-        <p:cNvGrpSpPr/>
-        <p:nvPr/>
-      </p:nvGrpSpPr>
-      <p:grpSpPr>
-        <a:xfrm>
-          <a:off x="0" y="0"/>
-          <a:ext cx="0" cy="0"/>
-          <a:chOff x="0" y="0"/>
-          <a:chExt cx="0" cy="0"/>
-        </a:xfrm>
-      </p:grpSpPr>
-      <p:sp>
-        <p:nvSpPr>
-          <p:cNvPr id="2" name="Title 1">
-            <a:extLst>
-              <a:ext uri="{FF2B5EF4-FFF2-40B4-BE49-F238E27FC236}">
-                <a16:creationId xmlns:a16="http://schemas.microsoft.com/office/drawing/2014/main" id="{05F1E304-987A-524A-AD6E-CF09A0BFAD55}"/>
-              </a:ext>
-            </a:extLst>
-          </p:cNvPr>
-          <p:cNvSpPr>
-            <a:spLocks noGrp="1"/>
-          </p:cNvSpPr>
-          <p:nvPr>
-            <p:ph type="title"/>
-          </p:nvPr>
-        </p:nvSpPr>
-        <p:spPr/>
-        <p:txBody>
-          <a:bodyPr/>
-          <a:lstStyle/>
-          <a:p>
-            <a:r>
-              <a:rPr lang="en-DE" dirty="0"/>
-              <a:t>Graphical User Interface: </a:t>
-            </a:r>
-            <a:r>
-              <a:rPr lang="en-GB" dirty="0" err="1"/>
-              <a:t>ModelSpecs</a:t>
-            </a:r>
-            <a:endParaRPr lang="en-DE" dirty="0"/>
-          </a:p>
-        </p:txBody>
-      </p:sp>
-      <p:pic>
-        <p:nvPicPr>
-          <p:cNvPr id="5" name="Content Placeholder 4">
-            <a:extLst>
-              <a:ext uri="{FF2B5EF4-FFF2-40B4-BE49-F238E27FC236}">
-                <a16:creationId xmlns:a16="http://schemas.microsoft.com/office/drawing/2014/main" id="{3F9F3144-4ECD-0840-A0ED-EC773C4B2E49}"/>
-              </a:ext>
-            </a:extLst>
-          </p:cNvPr>
-          <p:cNvPicPr>
-            <a:picLocks noGrp="1" noChangeAspect="1"/>
-          </p:cNvPicPr>
-          <p:nvPr>
-            <p:ph sz="half" idx="10"/>
-          </p:nvPr>
-        </p:nvPicPr>
-        <p:blipFill>
-          <a:blip r:embed="rId2">
-            <a:extLst>
-              <a:ext uri="{28A0092B-C50C-407E-A947-70E740481C1C}">
-                <a14:useLocalDpi xmlns:a14="http://schemas.microsoft.com/office/drawing/2010/main" val="0"/>
-              </a:ext>
-            </a:extLst>
-          </a:blip>
-          <a:stretch>
-            <a:fillRect/>
-          </a:stretch>
-        </p:blipFill>
-        <p:spPr>
-          <a:xfrm>
-            <a:off x="3064283" y="1193800"/>
-            <a:ext cx="3015435" cy="3414713"/>
-          </a:xfrm>
-        </p:spPr>
-      </p:pic>
-      <p:sp>
-        <p:nvSpPr>
-          <p:cNvPr id="7" name="Rounded Rectangle 6">
-            <a:extLst>
-              <a:ext uri="{FF2B5EF4-FFF2-40B4-BE49-F238E27FC236}">
-                <a16:creationId xmlns:a16="http://schemas.microsoft.com/office/drawing/2014/main" id="{9D547D32-C4B5-A246-BEF2-AA833D6E9B36}"/>
-              </a:ext>
-            </a:extLst>
-          </p:cNvPr>
-          <p:cNvSpPr/>
-          <p:nvPr/>
-        </p:nvSpPr>
-        <p:spPr>
-          <a:xfrm>
-            <a:off x="6876256" y="366712"/>
-            <a:ext cx="1745048" cy="1025644"/>
-          </a:xfrm>
-          <a:prstGeom prst="roundRect">
-            <a:avLst/>
-          </a:prstGeom>
-        </p:spPr>
-        <p:style>
-          <a:lnRef idx="2">
-            <a:schemeClr val="accent1">
-              <a:shade val="50000"/>
-            </a:schemeClr>
-          </a:lnRef>
-          <a:fillRef idx="1">
-            <a:schemeClr val="accent1"/>
-          </a:fillRef>
-          <a:effectRef idx="0">
-            <a:schemeClr val="accent1"/>
-          </a:effectRef>
-          <a:fontRef idx="minor">
-            <a:schemeClr val="lt1"/>
-          </a:fontRef>
-        </p:style>
-        <p:txBody>
-          <a:bodyPr rtlCol="0" anchor="ctr"/>
-          <a:lstStyle/>
-          <a:p>
-            <a:pPr algn="ctr"/>
-            <a:r>
-              <a:rPr lang="en-DE" dirty="0"/>
-              <a:t>Change screenshot – Model param settingswrong</a:t>
-            </a:r>
-          </a:p>
-        </p:txBody>
-      </p:sp>
-    </p:spTree>
-    <p:extLst>
-      <p:ext uri="{BB962C8B-B14F-4D97-AF65-F5344CB8AC3E}">
-        <p14:creationId xmlns:p14="http://schemas.microsoft.com/office/powerpoint/2010/main" val="2747204293"/>
       </p:ext>
     </p:extLst>
   </p:cSld>
@@ -10989,7 +10928,7 @@
             </a:r>
             <a:r>
               <a:rPr lang="en-GB" dirty="0" err="1"/>
-              <a:t>PredictVideoTools</a:t>
+              <a:t>ModelSpecs</a:t>
             </a:r>
             <a:endParaRPr lang="en-DE" dirty="0"/>
           </a:p>
@@ -11000,7 +10939,7 @@
           <p:cNvPr id="5" name="Content Placeholder 4">
             <a:extLst>
               <a:ext uri="{FF2B5EF4-FFF2-40B4-BE49-F238E27FC236}">
-                <a16:creationId xmlns:a16="http://schemas.microsoft.com/office/drawing/2014/main" id="{1A084323-82D8-7E48-BCDA-5AEE85F65D61}"/>
+                <a16:creationId xmlns:a16="http://schemas.microsoft.com/office/drawing/2014/main" id="{3F9F3144-4ECD-0840-A0ED-EC773C4B2E49}"/>
               </a:ext>
             </a:extLst>
           </p:cNvPr>
@@ -11019,21 +10958,20 @@
               </a:ext>
             </a:extLst>
           </a:blip>
-          <a:stretch>
-            <a:fillRect/>
-          </a:stretch>
+          <a:srcRect/>
+          <a:stretch/>
         </p:blipFill>
         <p:spPr>
           <a:xfrm>
-            <a:off x="2421731" y="1724044"/>
-            <a:ext cx="4300538" cy="2354224"/>
+            <a:off x="3064283" y="1246133"/>
+            <a:ext cx="3015435" cy="3310046"/>
           </a:xfrm>
         </p:spPr>
       </p:pic>
     </p:spTree>
     <p:extLst>
       <p:ext uri="{BB962C8B-B14F-4D97-AF65-F5344CB8AC3E}">
-        <p14:creationId xmlns:p14="http://schemas.microsoft.com/office/powerpoint/2010/main" val="4105111904"/>
+        <p14:creationId xmlns:p14="http://schemas.microsoft.com/office/powerpoint/2010/main" val="2747204293"/>
       </p:ext>
     </p:extLst>
   </p:cSld>
@@ -11087,7 +11025,7 @@
             </a:r>
             <a:r>
               <a:rPr lang="en-GB" dirty="0" err="1"/>
-              <a:t>ResultWindow</a:t>
+              <a:t>PredictVideoTools</a:t>
             </a:r>
             <a:endParaRPr lang="en-DE" dirty="0"/>
           </a:p>
@@ -11095,10 +11033,10 @@
       </p:sp>
       <p:pic>
         <p:nvPicPr>
-          <p:cNvPr id="7" name="Content Placeholder 6">
+          <p:cNvPr id="5" name="Content Placeholder 4">
             <a:extLst>
               <a:ext uri="{FF2B5EF4-FFF2-40B4-BE49-F238E27FC236}">
-                <a16:creationId xmlns:a16="http://schemas.microsoft.com/office/drawing/2014/main" id="{F618EBCF-7D68-8042-BA74-E57E87AF566D}"/>
+                <a16:creationId xmlns:a16="http://schemas.microsoft.com/office/drawing/2014/main" id="{1A084323-82D8-7E48-BCDA-5AEE85F65D61}"/>
               </a:ext>
             </a:extLst>
           </p:cNvPr>
@@ -11123,15 +11061,15 @@
         </p:blipFill>
         <p:spPr>
           <a:xfrm>
-            <a:off x="2421731" y="1268092"/>
-            <a:ext cx="4300538" cy="3266128"/>
+            <a:off x="2421731" y="1724044"/>
+            <a:ext cx="4300538" cy="2354224"/>
           </a:xfrm>
         </p:spPr>
       </p:pic>
     </p:spTree>
     <p:extLst>
       <p:ext uri="{BB962C8B-B14F-4D97-AF65-F5344CB8AC3E}">
-        <p14:creationId xmlns:p14="http://schemas.microsoft.com/office/powerpoint/2010/main" val="2613544693"/>
+        <p14:creationId xmlns:p14="http://schemas.microsoft.com/office/powerpoint/2010/main" val="4105111904"/>
       </p:ext>
     </p:extLst>
   </p:cSld>
@@ -12134,6 +12072,153 @@
 </p:sld>
 </file>
 
+<file path=ppt/slides/slide20.xml><?xml version="1.0" encoding="utf-8"?>
+<p:sld xmlns:a="http://schemas.openxmlformats.org/drawingml/2006/main" xmlns:r="http://schemas.openxmlformats.org/officeDocument/2006/relationships" xmlns:p="http://schemas.openxmlformats.org/presentationml/2006/main">
+  <p:cSld>
+    <p:spTree>
+      <p:nvGrpSpPr>
+        <p:cNvPr id="1" name=""/>
+        <p:cNvGrpSpPr/>
+        <p:nvPr/>
+      </p:nvGrpSpPr>
+      <p:grpSpPr>
+        <a:xfrm>
+          <a:off x="0" y="0"/>
+          <a:ext cx="0" cy="0"/>
+          <a:chOff x="0" y="0"/>
+          <a:chExt cx="0" cy="0"/>
+        </a:xfrm>
+      </p:grpSpPr>
+      <p:sp>
+        <p:nvSpPr>
+          <p:cNvPr id="2" name="Title 1">
+            <a:extLst>
+              <a:ext uri="{FF2B5EF4-FFF2-40B4-BE49-F238E27FC236}">
+                <a16:creationId xmlns:a16="http://schemas.microsoft.com/office/drawing/2014/main" id="{05F1E304-987A-524A-AD6E-CF09A0BFAD55}"/>
+              </a:ext>
+            </a:extLst>
+          </p:cNvPr>
+          <p:cNvSpPr>
+            <a:spLocks noGrp="1"/>
+          </p:cNvSpPr>
+          <p:nvPr>
+            <p:ph type="title"/>
+          </p:nvPr>
+        </p:nvSpPr>
+        <p:spPr/>
+        <p:txBody>
+          <a:bodyPr/>
+          <a:lstStyle/>
+          <a:p>
+            <a:r>
+              <a:rPr lang="en-DE" dirty="0"/>
+              <a:t>Graphical User Interface: </a:t>
+            </a:r>
+            <a:r>
+              <a:rPr lang="en-GB" dirty="0" err="1"/>
+              <a:t>ResultWindow</a:t>
+            </a:r>
+            <a:endParaRPr lang="en-DE" dirty="0"/>
+          </a:p>
+        </p:txBody>
+      </p:sp>
+      <p:pic>
+        <p:nvPicPr>
+          <p:cNvPr id="7" name="Content Placeholder 6">
+            <a:extLst>
+              <a:ext uri="{FF2B5EF4-FFF2-40B4-BE49-F238E27FC236}">
+                <a16:creationId xmlns:a16="http://schemas.microsoft.com/office/drawing/2014/main" id="{F618EBCF-7D68-8042-BA74-E57E87AF566D}"/>
+              </a:ext>
+            </a:extLst>
+          </p:cNvPr>
+          <p:cNvPicPr>
+            <a:picLocks noGrp="1" noChangeAspect="1"/>
+          </p:cNvPicPr>
+          <p:nvPr>
+            <p:ph sz="half" idx="10"/>
+          </p:nvPr>
+        </p:nvPicPr>
+        <p:blipFill>
+          <a:blip r:embed="rId2">
+            <a:extLst>
+              <a:ext uri="{28A0092B-C50C-407E-A947-70E740481C1C}">
+                <a14:useLocalDpi xmlns:a14="http://schemas.microsoft.com/office/drawing/2010/main" val="0"/>
+              </a:ext>
+            </a:extLst>
+          </a:blip>
+          <a:stretch>
+            <a:fillRect/>
+          </a:stretch>
+        </p:blipFill>
+        <p:spPr>
+          <a:xfrm>
+            <a:off x="2421731" y="1268092"/>
+            <a:ext cx="4300538" cy="3266128"/>
+          </a:xfrm>
+        </p:spPr>
+      </p:pic>
+      <p:sp>
+        <p:nvSpPr>
+          <p:cNvPr id="4" name="Rounded Rectangle 3">
+            <a:extLst>
+              <a:ext uri="{FF2B5EF4-FFF2-40B4-BE49-F238E27FC236}">
+                <a16:creationId xmlns:a16="http://schemas.microsoft.com/office/drawing/2014/main" id="{8C828780-5E17-B848-8D50-768E76587317}"/>
+              </a:ext>
+            </a:extLst>
+          </p:cNvPr>
+          <p:cNvSpPr/>
+          <p:nvPr/>
+        </p:nvSpPr>
+        <p:spPr>
+          <a:xfrm>
+            <a:off x="6876256" y="366712"/>
+            <a:ext cx="1745048" cy="1025644"/>
+          </a:xfrm>
+          <a:prstGeom prst="roundRect">
+            <a:avLst/>
+          </a:prstGeom>
+        </p:spPr>
+        <p:style>
+          <a:lnRef idx="2">
+            <a:schemeClr val="accent1">
+              <a:shade val="50000"/>
+            </a:schemeClr>
+          </a:lnRef>
+          <a:fillRef idx="1">
+            <a:schemeClr val="accent1"/>
+          </a:fillRef>
+          <a:effectRef idx="0">
+            <a:schemeClr val="accent1"/>
+          </a:effectRef>
+          <a:fontRef idx="minor">
+            <a:schemeClr val="lt1"/>
+          </a:fontRef>
+        </p:style>
+        <p:txBody>
+          <a:bodyPr rtlCol="0" anchor="ctr"/>
+          <a:lstStyle/>
+          <a:p>
+            <a:pPr algn="ctr"/>
+            <a:r>
+              <a:rPr lang="en-DE" dirty="0"/>
+              <a:t>Change screenshot – Model param settingswrong</a:t>
+            </a:r>
+          </a:p>
+        </p:txBody>
+      </p:sp>
+    </p:spTree>
+    <p:extLst>
+      <p:ext uri="{BB962C8B-B14F-4D97-AF65-F5344CB8AC3E}">
+        <p14:creationId xmlns:p14="http://schemas.microsoft.com/office/powerpoint/2010/main" val="2613544693"/>
+      </p:ext>
+    </p:extLst>
+  </p:cSld>
+  <p:clrMapOvr>
+    <a:masterClrMapping/>
+  </p:clrMapOvr>
+</p:sld>
+</file>
+
 <file path=ppt/slides/slide3.xml><?xml version="1.0" encoding="utf-8"?>
 <p:sld xmlns:a="http://schemas.openxmlformats.org/drawingml/2006/main" xmlns:r="http://schemas.openxmlformats.org/officeDocument/2006/relationships" xmlns:p="http://schemas.openxmlformats.org/presentationml/2006/main">
   <p:cSld>
@@ -13659,7 +13744,7 @@
             </a:r>
             <a:r>
               <a:rPr lang="en-DE" sz="1400" dirty="0"/>
-              <a:t>r: 0.0001</a:t>
+              <a:t>r: 0.001</a:t>
             </a:r>
           </a:p>
           <a:p>
@@ -13682,7 +13767,7 @@
             </a:r>
             <a:r>
               <a:rPr lang="en-DE" sz="1400" dirty="0"/>
-              <a:t>eight_decay: 0.001</a:t>
+              <a:t>eight_decay: 0.00005</a:t>
             </a:r>
           </a:p>
           <a:p>
@@ -13705,7 +13790,7 @@
             </a:r>
             <a:r>
               <a:rPr lang="en-DE" sz="1400" dirty="0"/>
-              <a:t>atch_size: 32</a:t>
+              <a:t>atch_size: 62</a:t>
             </a:r>
           </a:p>
           <a:p>
@@ -13728,7 +13813,17 @@
             </a:r>
             <a:r>
               <a:rPr lang="en-DE" sz="1400" dirty="0"/>
-              <a:t>r_epochs: 300</a:t>
+              <a:t>r_epochs: 40 (stopped at 25 </a:t>
+            </a:r>
+            <a:r>
+              <a:rPr lang="en-DE" sz="1400" dirty="0">
+                <a:sym typeface="Wingdings" pitchFamily="2" charset="2"/>
+              </a:rPr>
+              <a:t></a:t>
+            </a:r>
+            <a:r>
+              <a:rPr lang="en-DE" sz="1400" dirty="0"/>
+              <a:t> bad results)</a:t>
             </a:r>
           </a:p>
           <a:p>
@@ -13774,7 +13869,7 @@
             </a:r>
             <a:r>
               <a:rPr lang="en-DE" sz="1400" dirty="0"/>
-              <a:t>r_video: 40</a:t>
+              <a:t>r_video: 80</a:t>
             </a:r>
           </a:p>
           <a:p>
@@ -13820,7 +13915,7 @@
             </a:r>
             <a:r>
               <a:rPr lang="en-DE" sz="1400" dirty="0"/>
-              <a:t>al_ratio: 0.1</a:t>
+              <a:t>al_ratio: 0.2</a:t>
             </a:r>
           </a:p>
           <a:p>
@@ -13843,7 +13938,7 @@
             </a:r>
             <a:r>
               <a:rPr lang="en-DE" sz="1400" dirty="0"/>
-              <a:t>est_ratio: 0.025</a:t>
+              <a:t>est_ratio: 0.3</a:t>
             </a:r>
           </a:p>
           <a:p>
@@ -14018,7 +14113,7 @@
             </a:r>
             <a:r>
               <a:rPr lang="en-DE" sz="1400" dirty="0"/>
-              <a:t>r_epochs: 300</a:t>
+              <a:t>r_epochs: 40</a:t>
             </a:r>
           </a:p>
           <a:p>
@@ -14064,7 +14159,7 @@
             </a:r>
             <a:r>
               <a:rPr lang="en-DE" sz="1400" dirty="0"/>
-              <a:t>r_video: 40</a:t>
+              <a:t>r_video: 80</a:t>
             </a:r>
           </a:p>
           <a:p>
@@ -14110,7 +14205,7 @@
             </a:r>
             <a:r>
               <a:rPr lang="en-DE" sz="1400" dirty="0"/>
-              <a:t>al_ratio: 0.1</a:t>
+              <a:t>al_ratio: 0.2</a:t>
             </a:r>
           </a:p>
           <a:p>
@@ -14133,7 +14228,7 @@
             </a:r>
             <a:r>
               <a:rPr lang="en-DE" sz="1400" dirty="0"/>
-              <a:t>est_ratio: 0.025</a:t>
+              <a:t>est_ratio: 0.3</a:t>
             </a:r>
           </a:p>
         </p:txBody>
@@ -15068,6 +15163,94 @@
             </a:r>
           </a:p>
           <a:p>
+            <a:pPr marL="285750" indent="-285750">
+              <a:buFont typeface="Arial" panose="020B0604020202020204" pitchFamily="34" charset="0"/>
+              <a:buChar char="•"/>
+            </a:pPr>
+            <a:r>
+              <a:rPr lang="en-DE" sz="1600" dirty="0"/>
+              <a:t>Training of this approach has been stopped, since the training and validation accuracies were not as promised, although model overfitted on small dataset (see reports):</a:t>
+            </a:r>
+          </a:p>
+          <a:p>
+            <a:pPr marL="465138" lvl="1" indent="-285750">
+              <a:lnSpc>
+                <a:spcPct val="100000"/>
+              </a:lnSpc>
+              <a:buFont typeface="Arial" panose="020B0604020202020204" pitchFamily="34" charset="0"/>
+              <a:buChar char="•"/>
+            </a:pPr>
+            <a:r>
+              <a:rPr lang="en-DE" sz="1600" dirty="0"/>
+              <a:t>Epoch 10:</a:t>
+            </a:r>
+          </a:p>
+          <a:p>
+            <a:pPr marL="823913" lvl="2" indent="-285750">
+              <a:lnSpc>
+                <a:spcPct val="100000"/>
+              </a:lnSpc>
+              <a:buFont typeface="Arial" panose="020B0604020202020204" pitchFamily="34" charset="0"/>
+              <a:buChar char="•"/>
+            </a:pPr>
+            <a:r>
+              <a:rPr lang="en-DE" sz="1600" dirty="0"/>
+              <a:t>train_acc = 30.37%</a:t>
+            </a:r>
+          </a:p>
+          <a:p>
+            <a:pPr marL="823913" lvl="2" indent="-285750">
+              <a:lnSpc>
+                <a:spcPct val="100000"/>
+              </a:lnSpc>
+              <a:buFont typeface="Arial" panose="020B0604020202020204" pitchFamily="34" charset="0"/>
+              <a:buChar char="•"/>
+            </a:pPr>
+            <a:r>
+              <a:rPr lang="en-DE" sz="1600" dirty="0"/>
+              <a:t>val_acc = 30.96%</a:t>
+            </a:r>
+          </a:p>
+          <a:p>
+            <a:pPr marL="465138" lvl="1" indent="-285750">
+              <a:lnSpc>
+                <a:spcPct val="100000"/>
+              </a:lnSpc>
+              <a:buFont typeface="Arial" panose="020B0604020202020204" pitchFamily="34" charset="0"/>
+              <a:buChar char="•"/>
+            </a:pPr>
+            <a:r>
+              <a:rPr lang="en-DE" sz="1600" dirty="0"/>
+              <a:t>Epoch 20:</a:t>
+            </a:r>
+          </a:p>
+          <a:p>
+            <a:pPr marL="823913" lvl="2" indent="-285750">
+              <a:lnSpc>
+                <a:spcPct val="100000"/>
+              </a:lnSpc>
+              <a:buFont typeface="Arial" panose="020B0604020202020204" pitchFamily="34" charset="0"/>
+              <a:buChar char="•"/>
+            </a:pPr>
+            <a:r>
+              <a:rPr lang="en-DE" sz="1600" dirty="0"/>
+              <a:t>train_acc = 30.37%</a:t>
+            </a:r>
+          </a:p>
+          <a:p>
+            <a:pPr marL="823913" lvl="2" indent="-285750">
+              <a:lnSpc>
+                <a:spcPct val="100000"/>
+              </a:lnSpc>
+              <a:buFont typeface="Arial" panose="020B0604020202020204" pitchFamily="34" charset="0"/>
+              <a:buChar char="•"/>
+            </a:pPr>
+            <a:r>
+              <a:rPr lang="en-DE" sz="1600" dirty="0"/>
+              <a:t>val_acc = 30.97%</a:t>
+            </a:r>
+          </a:p>
+          <a:p>
             <a:endParaRPr lang="en-DE" sz="1600" dirty="0"/>
           </a:p>
         </p:txBody>
@@ -15124,6 +15307,26 @@
             <a:r>
               <a:rPr lang="en-DE" sz="1600" dirty="0"/>
               <a:t>AlexNet (ToolNet):</a:t>
+            </a:r>
+          </a:p>
+          <a:p>
+            <a:pPr marL="285750" indent="-285750">
+              <a:buFont typeface="Arial" panose="020B0604020202020204" pitchFamily="34" charset="0"/>
+              <a:buChar char="•"/>
+            </a:pPr>
+            <a:r>
+              <a:rPr lang="en-DE" sz="1600" dirty="0"/>
+              <a:t>Training after 40 epochs resulted in an averaged (test) accuracy of 67%</a:t>
+            </a:r>
+          </a:p>
+          <a:p>
+            <a:pPr marL="285750" indent="-285750">
+              <a:buFont typeface="Arial" panose="020B0604020202020204" pitchFamily="34" charset="0"/>
+              <a:buChar char="•"/>
+            </a:pPr>
+            <a:r>
+              <a:rPr lang="en-DE" sz="1600" dirty="0"/>
+              <a:t>See corresponding plots on following slide</a:t>
             </a:r>
           </a:p>
           <a:p>
@@ -15230,26 +15433,39 @@
                                   </p:childTnLst>
                                 </p:cTn>
                               </p:par>
-                            </p:childTnLst>
-                          </p:cTn>
-                        </p:par>
-                      </p:childTnLst>
-                    </p:cTn>
-                  </p:par>
-                  <p:par>
-                    <p:cTn id="7" fill="hold">
-                      <p:stCondLst>
-                        <p:cond delay="indefinite"/>
-                      </p:stCondLst>
-                      <p:childTnLst>
-                        <p:par>
-                          <p:cTn id="8" fill="hold">
-                            <p:stCondLst>
-                              <p:cond delay="0"/>
-                            </p:stCondLst>
-                            <p:childTnLst>
                               <p:par>
-                                <p:cTn id="9" presetID="1" presetClass="entr" presetSubtype="0" fill="hold" nodeType="clickEffect">
+                                <p:cTn id="7" presetID="1" presetClass="entr" presetSubtype="0" fill="hold" grpId="0" nodeType="withEffect">
+                                  <p:stCondLst>
+                                    <p:cond delay="0"/>
+                                  </p:stCondLst>
+                                  <p:childTnLst>
+                                    <p:set>
+                                      <p:cBhvr>
+                                        <p:cTn id="8" dur="1" fill="hold">
+                                          <p:stCondLst>
+                                            <p:cond delay="0"/>
+                                          </p:stCondLst>
+                                        </p:cTn>
+                                        <p:tgtEl>
+                                          <p:spTgt spid="3">
+                                            <p:txEl>
+                                              <p:pRg st="1" end="1"/>
+                                            </p:txEl>
+                                          </p:spTgt>
+                                        </p:tgtEl>
+                                        <p:attrNameLst>
+                                          <p:attrName>style.visibility</p:attrName>
+                                        </p:attrNameLst>
+                                      </p:cBhvr>
+                                      <p:to>
+                                        <p:strVal val="visible"/>
+                                      </p:to>
+                                    </p:set>
+                                  </p:childTnLst>
+                                </p:cTn>
+                              </p:par>
+                              <p:par>
+                                <p:cTn id="9" presetID="1" presetClass="entr" presetSubtype="0" fill="hold" grpId="0" nodeType="withEffect">
                                   <p:stCondLst>
                                     <p:cond delay="0"/>
                                   </p:stCondLst>
@@ -15262,7 +15478,11 @@
                                           </p:stCondLst>
                                         </p:cTn>
                                         <p:tgtEl>
-                                          <p:spTgt spid="5"/>
+                                          <p:spTgt spid="3">
+                                            <p:txEl>
+                                              <p:pRg st="2" end="2"/>
+                                            </p:txEl>
+                                          </p:spTgt>
                                         </p:tgtEl>
                                         <p:attrNameLst>
                                           <p:attrName>style.visibility</p:attrName>
@@ -15289,9 +15509,271 @@
                                           </p:stCondLst>
                                         </p:cTn>
                                         <p:tgtEl>
+                                          <p:spTgt spid="3">
+                                            <p:txEl>
+                                              <p:pRg st="3" end="3"/>
+                                            </p:txEl>
+                                          </p:spTgt>
+                                        </p:tgtEl>
+                                        <p:attrNameLst>
+                                          <p:attrName>style.visibility</p:attrName>
+                                        </p:attrNameLst>
+                                      </p:cBhvr>
+                                      <p:to>
+                                        <p:strVal val="visible"/>
+                                      </p:to>
+                                    </p:set>
+                                  </p:childTnLst>
+                                </p:cTn>
+                              </p:par>
+                              <p:par>
+                                <p:cTn id="13" presetID="1" presetClass="entr" presetSubtype="0" fill="hold" grpId="0" nodeType="withEffect">
+                                  <p:stCondLst>
+                                    <p:cond delay="0"/>
+                                  </p:stCondLst>
+                                  <p:childTnLst>
+                                    <p:set>
+                                      <p:cBhvr>
+                                        <p:cTn id="14" dur="1" fill="hold">
+                                          <p:stCondLst>
+                                            <p:cond delay="0"/>
+                                          </p:stCondLst>
+                                        </p:cTn>
+                                        <p:tgtEl>
+                                          <p:spTgt spid="3">
+                                            <p:txEl>
+                                              <p:pRg st="4" end="4"/>
+                                            </p:txEl>
+                                          </p:spTgt>
+                                        </p:tgtEl>
+                                        <p:attrNameLst>
+                                          <p:attrName>style.visibility</p:attrName>
+                                        </p:attrNameLst>
+                                      </p:cBhvr>
+                                      <p:to>
+                                        <p:strVal val="visible"/>
+                                      </p:to>
+                                    </p:set>
+                                  </p:childTnLst>
+                                </p:cTn>
+                              </p:par>
+                              <p:par>
+                                <p:cTn id="15" presetID="1" presetClass="entr" presetSubtype="0" fill="hold" grpId="0" nodeType="withEffect">
+                                  <p:stCondLst>
+                                    <p:cond delay="0"/>
+                                  </p:stCondLst>
+                                  <p:childTnLst>
+                                    <p:set>
+                                      <p:cBhvr>
+                                        <p:cTn id="16" dur="1" fill="hold">
+                                          <p:stCondLst>
+                                            <p:cond delay="0"/>
+                                          </p:stCondLst>
+                                        </p:cTn>
+                                        <p:tgtEl>
+                                          <p:spTgt spid="3">
+                                            <p:txEl>
+                                              <p:pRg st="5" end="5"/>
+                                            </p:txEl>
+                                          </p:spTgt>
+                                        </p:tgtEl>
+                                        <p:attrNameLst>
+                                          <p:attrName>style.visibility</p:attrName>
+                                        </p:attrNameLst>
+                                      </p:cBhvr>
+                                      <p:to>
+                                        <p:strVal val="visible"/>
+                                      </p:to>
+                                    </p:set>
+                                  </p:childTnLst>
+                                </p:cTn>
+                              </p:par>
+                              <p:par>
+                                <p:cTn id="17" presetID="1" presetClass="entr" presetSubtype="0" fill="hold" grpId="0" nodeType="withEffect">
+                                  <p:stCondLst>
+                                    <p:cond delay="0"/>
+                                  </p:stCondLst>
+                                  <p:childTnLst>
+                                    <p:set>
+                                      <p:cBhvr>
+                                        <p:cTn id="18" dur="1" fill="hold">
+                                          <p:stCondLst>
+                                            <p:cond delay="0"/>
+                                          </p:stCondLst>
+                                        </p:cTn>
+                                        <p:tgtEl>
+                                          <p:spTgt spid="3">
+                                            <p:txEl>
+                                              <p:pRg st="6" end="6"/>
+                                            </p:txEl>
+                                          </p:spTgt>
+                                        </p:tgtEl>
+                                        <p:attrNameLst>
+                                          <p:attrName>style.visibility</p:attrName>
+                                        </p:attrNameLst>
+                                      </p:cBhvr>
+                                      <p:to>
+                                        <p:strVal val="visible"/>
+                                      </p:to>
+                                    </p:set>
+                                  </p:childTnLst>
+                                </p:cTn>
+                              </p:par>
+                              <p:par>
+                                <p:cTn id="19" presetID="1" presetClass="entr" presetSubtype="0" fill="hold" grpId="0" nodeType="withEffect">
+                                  <p:stCondLst>
+                                    <p:cond delay="0"/>
+                                  </p:stCondLst>
+                                  <p:childTnLst>
+                                    <p:set>
+                                      <p:cBhvr>
+                                        <p:cTn id="20" dur="1" fill="hold">
+                                          <p:stCondLst>
+                                            <p:cond delay="0"/>
+                                          </p:stCondLst>
+                                        </p:cTn>
+                                        <p:tgtEl>
+                                          <p:spTgt spid="3">
+                                            <p:txEl>
+                                              <p:pRg st="7" end="7"/>
+                                            </p:txEl>
+                                          </p:spTgt>
+                                        </p:tgtEl>
+                                        <p:attrNameLst>
+                                          <p:attrName>style.visibility</p:attrName>
+                                        </p:attrNameLst>
+                                      </p:cBhvr>
+                                      <p:to>
+                                        <p:strVal val="visible"/>
+                                      </p:to>
+                                    </p:set>
+                                  </p:childTnLst>
+                                </p:cTn>
+                              </p:par>
+                            </p:childTnLst>
+                          </p:cTn>
+                        </p:par>
+                      </p:childTnLst>
+                    </p:cTn>
+                  </p:par>
+                  <p:par>
+                    <p:cTn id="21" fill="hold">
+                      <p:stCondLst>
+                        <p:cond delay="indefinite"/>
+                      </p:stCondLst>
+                      <p:childTnLst>
+                        <p:par>
+                          <p:cTn id="22" fill="hold">
+                            <p:stCondLst>
+                              <p:cond delay="0"/>
+                            </p:stCondLst>
+                            <p:childTnLst>
+                              <p:par>
+                                <p:cTn id="23" presetID="1" presetClass="entr" presetSubtype="0" fill="hold" nodeType="clickEffect">
+                                  <p:stCondLst>
+                                    <p:cond delay="0"/>
+                                  </p:stCondLst>
+                                  <p:childTnLst>
+                                    <p:set>
+                                      <p:cBhvr>
+                                        <p:cTn id="24" dur="1" fill="hold">
+                                          <p:stCondLst>
+                                            <p:cond delay="0"/>
+                                          </p:stCondLst>
+                                        </p:cTn>
+                                        <p:tgtEl>
+                                          <p:spTgt spid="5"/>
+                                        </p:tgtEl>
+                                        <p:attrNameLst>
+                                          <p:attrName>style.visibility</p:attrName>
+                                        </p:attrNameLst>
+                                      </p:cBhvr>
+                                      <p:to>
+                                        <p:strVal val="visible"/>
+                                      </p:to>
+                                    </p:set>
+                                  </p:childTnLst>
+                                </p:cTn>
+                              </p:par>
+                              <p:par>
+                                <p:cTn id="25" presetID="1" presetClass="entr" presetSubtype="0" fill="hold" grpId="0" nodeType="withEffect">
+                                  <p:stCondLst>
+                                    <p:cond delay="0"/>
+                                  </p:stCondLst>
+                                  <p:childTnLst>
+                                    <p:set>
+                                      <p:cBhvr>
+                                        <p:cTn id="26" dur="1" fill="hold">
+                                          <p:stCondLst>
+                                            <p:cond delay="0"/>
+                                          </p:stCondLst>
+                                        </p:cTn>
+                                        <p:tgtEl>
                                           <p:spTgt spid="4">
                                             <p:txEl>
                                               <p:pRg st="0" end="0"/>
+                                            </p:txEl>
+                                          </p:spTgt>
+                                        </p:tgtEl>
+                                        <p:attrNameLst>
+                                          <p:attrName>style.visibility</p:attrName>
+                                        </p:attrNameLst>
+                                      </p:cBhvr>
+                                      <p:to>
+                                        <p:strVal val="visible"/>
+                                      </p:to>
+                                    </p:set>
+                                  </p:childTnLst>
+                                </p:cTn>
+                              </p:par>
+                              <p:par>
+                                <p:cTn id="27" presetID="1" presetClass="entr" presetSubtype="0" fill="hold" grpId="0" nodeType="withEffect">
+                                  <p:stCondLst>
+                                    <p:cond delay="0"/>
+                                  </p:stCondLst>
+                                  <p:childTnLst>
+                                    <p:set>
+                                      <p:cBhvr>
+                                        <p:cTn id="28" dur="1" fill="hold">
+                                          <p:stCondLst>
+                                            <p:cond delay="0"/>
+                                          </p:stCondLst>
+                                        </p:cTn>
+                                        <p:tgtEl>
+                                          <p:spTgt spid="4">
+                                            <p:txEl>
+                                              <p:pRg st="1" end="1"/>
+                                            </p:txEl>
+                                          </p:spTgt>
+                                        </p:tgtEl>
+                                        <p:attrNameLst>
+                                          <p:attrName>style.visibility</p:attrName>
+                                        </p:attrNameLst>
+                                      </p:cBhvr>
+                                      <p:to>
+                                        <p:strVal val="visible"/>
+                                      </p:to>
+                                    </p:set>
+                                  </p:childTnLst>
+                                </p:cTn>
+                              </p:par>
+                              <p:par>
+                                <p:cTn id="29" presetID="1" presetClass="entr" presetSubtype="0" fill="hold" grpId="0" nodeType="withEffect">
+                                  <p:stCondLst>
+                                    <p:cond delay="0"/>
+                                  </p:stCondLst>
+                                  <p:childTnLst>
+                                    <p:set>
+                                      <p:cBhvr>
+                                        <p:cTn id="30" dur="1" fill="hold">
+                                          <p:stCondLst>
+                                            <p:cond delay="0"/>
+                                          </p:stCondLst>
+                                        </p:cTn>
+                                        <p:tgtEl>
+                                          <p:spTgt spid="4">
+                                            <p:txEl>
+                                              <p:pRg st="2" end="2"/>
                                             </p:txEl>
                                           </p:spTgt>
                                         </p:tgtEl>
@@ -15334,7 +15816,7 @@
       </p:par>
     </p:tnLst>
     <p:bldLst>
-      <p:bldP spid="3" grpId="0" build="p"/>
+      <p:bldP spid="3" grpId="0" uiExpand="1" build="p"/>
       <p:bldP spid="4" grpId="0" build="p"/>
     </p:bldLst>
   </p:timing>

</xml_diff>